<commit_message>
Edit - use cases
- Add frecce use cases
- Remove labels
</commit_message>
<xml_diff>
--- a/Febbraio 2015.pptx
+++ b/Febbraio 2015.pptx
@@ -320,11 +320,11 @@
           <c:showPercent val="0"/>
           <c:showBubbleSize val="0"/>
         </c:dLbls>
-        <c:axId val="150950496"/>
-        <c:axId val="150951056"/>
+        <c:axId val="117200848"/>
+        <c:axId val="117201408"/>
       </c:radarChart>
       <c:catAx>
-        <c:axId val="150950496"/>
+        <c:axId val="117200848"/>
         <c:scaling>
           <c:orientation val="minMax"/>
         </c:scaling>
@@ -367,7 +367,7 @@
             <a:endParaRPr lang="it-IT"/>
           </a:p>
         </c:txPr>
-        <c:crossAx val="150951056"/>
+        <c:crossAx val="117201408"/>
         <c:crosses val="autoZero"/>
         <c:auto val="1"/>
         <c:lblAlgn val="ctr"/>
@@ -375,7 +375,7 @@
         <c:noMultiLvlLbl val="0"/>
       </c:catAx>
       <c:valAx>
-        <c:axId val="150951056"/>
+        <c:axId val="117201408"/>
         <c:scaling>
           <c:orientation val="minMax"/>
           <c:max val="100"/>
@@ -426,7 +426,7 @@
             <a:endParaRPr lang="it-IT"/>
           </a:p>
         </c:txPr>
-        <c:crossAx val="150950496"/>
+        <c:crossAx val="117200848"/>
         <c:crosses val="autoZero"/>
         <c:crossBetween val="between"/>
         <c:majorUnit val="10"/>
@@ -582,11 +582,11 @@
           <c:showPercent val="0"/>
           <c:showBubbleSize val="0"/>
         </c:dLbls>
-        <c:axId val="150953296"/>
-        <c:axId val="150953856"/>
+        <c:axId val="117203648"/>
+        <c:axId val="117204208"/>
       </c:radarChart>
       <c:catAx>
-        <c:axId val="150953296"/>
+        <c:axId val="117203648"/>
         <c:scaling>
           <c:orientation val="minMax"/>
         </c:scaling>
@@ -629,7 +629,7 @@
             <a:endParaRPr lang="it-IT"/>
           </a:p>
         </c:txPr>
-        <c:crossAx val="150953856"/>
+        <c:crossAx val="117204208"/>
         <c:crosses val="autoZero"/>
         <c:auto val="1"/>
         <c:lblAlgn val="ctr"/>
@@ -637,7 +637,7 @@
         <c:noMultiLvlLbl val="0"/>
       </c:catAx>
       <c:valAx>
-        <c:axId val="150953856"/>
+        <c:axId val="117204208"/>
         <c:scaling>
           <c:orientation val="minMax"/>
         </c:scaling>
@@ -687,7 +687,7 @@
             <a:endParaRPr lang="it-IT"/>
           </a:p>
         </c:txPr>
-        <c:crossAx val="150953296"/>
+        <c:crossAx val="117203648"/>
         <c:crosses val="autoZero"/>
         <c:crossBetween val="between"/>
         <c:majorUnit val="10"/>
@@ -833,11 +833,11 @@
           <c:showPercent val="0"/>
           <c:showBubbleSize val="0"/>
         </c:dLbls>
-        <c:axId val="150956096"/>
-        <c:axId val="151527184"/>
+        <c:axId val="117206448"/>
+        <c:axId val="115460816"/>
       </c:radarChart>
       <c:catAx>
-        <c:axId val="150956096"/>
+        <c:axId val="117206448"/>
         <c:scaling>
           <c:orientation val="minMax"/>
         </c:scaling>
@@ -880,7 +880,7 @@
             <a:endParaRPr lang="it-IT"/>
           </a:p>
         </c:txPr>
-        <c:crossAx val="151527184"/>
+        <c:crossAx val="115460816"/>
         <c:crosses val="autoZero"/>
         <c:auto val="1"/>
         <c:lblAlgn val="ctr"/>
@@ -888,7 +888,7 @@
         <c:noMultiLvlLbl val="0"/>
       </c:catAx>
       <c:valAx>
-        <c:axId val="151527184"/>
+        <c:axId val="115460816"/>
         <c:scaling>
           <c:orientation val="minMax"/>
         </c:scaling>
@@ -938,7 +938,7 @@
             <a:endParaRPr lang="it-IT"/>
           </a:p>
         </c:txPr>
-        <c:crossAx val="150956096"/>
+        <c:crossAx val="117206448"/>
         <c:crosses val="autoZero"/>
         <c:crossBetween val="between"/>
         <c:majorUnit val="10"/>
@@ -2695,7 +2695,7 @@
           <a:p>
             <a:fld id="{4DC00536-3C86-400C-9F50-1275C6A29586}" type="datetimeFigureOut">
               <a:rPr lang="it-IT" smtClean="0"/>
-              <a:t>21/02/2015</a:t>
+              <a:t>22/02/2015</a:t>
             </a:fld>
             <a:endParaRPr lang="it-IT"/>
           </a:p>
@@ -3178,7 +3178,7 @@
           <a:p>
             <a:fld id="{0809BC95-6AD5-4D34-9000-81E21223B4F6}" type="datetimeFigureOut">
               <a:rPr lang="it-IT" smtClean="0"/>
-              <a:t>21/02/2015</a:t>
+              <a:t>22/02/2015</a:t>
             </a:fld>
             <a:endParaRPr lang="it-IT"/>
           </a:p>
@@ -3236,9 +3236,14 @@
   <p:clrMapOvr>
     <a:masterClrMapping/>
   </p:clrMapOvr>
-  <p:transition spd="slow">
-    <p:push dir="u"/>
-  </p:transition>
+  <mc:AlternateContent xmlns:mc="http://schemas.openxmlformats.org/markup-compatibility/2006">
+    <mc:Choice xmlns:p14="http://schemas.microsoft.com/office/powerpoint/2010/main" Requires="p14">
+      <p:transition p14:dur="10"/>
+    </mc:Choice>
+    <mc:Fallback>
+      <p:transition/>
+    </mc:Fallback>
+  </mc:AlternateContent>
 </p:sldLayout>
 </file>
 
@@ -3351,7 +3356,7 @@
           <a:p>
             <a:fld id="{0809BC95-6AD5-4D34-9000-81E21223B4F6}" type="datetimeFigureOut">
               <a:rPr lang="it-IT" smtClean="0"/>
-              <a:t>21/02/2015</a:t>
+              <a:t>22/02/2015</a:t>
             </a:fld>
             <a:endParaRPr lang="it-IT"/>
           </a:p>
@@ -3409,9 +3414,14 @@
   <p:clrMapOvr>
     <a:masterClrMapping/>
   </p:clrMapOvr>
-  <p:transition spd="slow">
-    <p:push dir="u"/>
-  </p:transition>
+  <mc:AlternateContent xmlns:mc="http://schemas.openxmlformats.org/markup-compatibility/2006">
+    <mc:Choice xmlns:p14="http://schemas.microsoft.com/office/powerpoint/2010/main" Requires="p14">
+      <p:transition p14:dur="10"/>
+    </mc:Choice>
+    <mc:Fallback>
+      <p:transition/>
+    </mc:Fallback>
+  </mc:AlternateContent>
 </p:sldLayout>
 </file>
 
@@ -3534,7 +3544,7 @@
           <a:p>
             <a:fld id="{0809BC95-6AD5-4D34-9000-81E21223B4F6}" type="datetimeFigureOut">
               <a:rPr lang="it-IT" smtClean="0"/>
-              <a:t>21/02/2015</a:t>
+              <a:t>22/02/2015</a:t>
             </a:fld>
             <a:endParaRPr lang="it-IT"/>
           </a:p>
@@ -3592,9 +3602,14 @@
   <p:clrMapOvr>
     <a:masterClrMapping/>
   </p:clrMapOvr>
-  <p:transition spd="slow">
-    <p:push dir="u"/>
-  </p:transition>
+  <mc:AlternateContent xmlns:mc="http://schemas.openxmlformats.org/markup-compatibility/2006">
+    <mc:Choice xmlns:p14="http://schemas.microsoft.com/office/powerpoint/2010/main" Requires="p14">
+      <p:transition p14:dur="10"/>
+    </mc:Choice>
+    <mc:Fallback>
+      <p:transition/>
+    </mc:Fallback>
+  </mc:AlternateContent>
 </p:sldLayout>
 </file>
 
@@ -3707,7 +3722,7 @@
           <a:p>
             <a:fld id="{0809BC95-6AD5-4D34-9000-81E21223B4F6}" type="datetimeFigureOut">
               <a:rPr lang="it-IT" smtClean="0"/>
-              <a:t>21/02/2015</a:t>
+              <a:t>22/02/2015</a:t>
             </a:fld>
             <a:endParaRPr lang="it-IT"/>
           </a:p>
@@ -3765,9 +3780,14 @@
   <p:clrMapOvr>
     <a:masterClrMapping/>
   </p:clrMapOvr>
-  <p:transition spd="slow">
-    <p:push dir="u"/>
-  </p:transition>
+  <mc:AlternateContent xmlns:mc="http://schemas.openxmlformats.org/markup-compatibility/2006">
+    <mc:Choice xmlns:p14="http://schemas.microsoft.com/office/powerpoint/2010/main" Requires="p14">
+      <p:transition p14:dur="10"/>
+    </mc:Choice>
+    <mc:Fallback>
+      <p:transition/>
+    </mc:Fallback>
+  </mc:AlternateContent>
 </p:sldLayout>
 </file>
 
@@ -3956,7 +3976,7 @@
           <a:p>
             <a:fld id="{0809BC95-6AD5-4D34-9000-81E21223B4F6}" type="datetimeFigureOut">
               <a:rPr lang="it-IT" smtClean="0"/>
-              <a:t>21/02/2015</a:t>
+              <a:t>22/02/2015</a:t>
             </a:fld>
             <a:endParaRPr lang="it-IT"/>
           </a:p>
@@ -4014,9 +4034,14 @@
   <p:clrMapOvr>
     <a:masterClrMapping/>
   </p:clrMapOvr>
-  <p:transition spd="slow">
-    <p:push dir="u"/>
-  </p:transition>
+  <mc:AlternateContent xmlns:mc="http://schemas.openxmlformats.org/markup-compatibility/2006">
+    <mc:Choice xmlns:p14="http://schemas.microsoft.com/office/powerpoint/2010/main" Requires="p14">
+      <p:transition p14:dur="10"/>
+    </mc:Choice>
+    <mc:Fallback>
+      <p:transition/>
+    </mc:Fallback>
+  </mc:AlternateContent>
 </p:sldLayout>
 </file>
 
@@ -4191,7 +4216,7 @@
           <a:p>
             <a:fld id="{0809BC95-6AD5-4D34-9000-81E21223B4F6}" type="datetimeFigureOut">
               <a:rPr lang="it-IT" smtClean="0"/>
-              <a:t>21/02/2015</a:t>
+              <a:t>22/02/2015</a:t>
             </a:fld>
             <a:endParaRPr lang="it-IT"/>
           </a:p>
@@ -4249,9 +4274,14 @@
   <p:clrMapOvr>
     <a:masterClrMapping/>
   </p:clrMapOvr>
-  <p:transition spd="slow">
-    <p:push dir="u"/>
-  </p:transition>
+  <mc:AlternateContent xmlns:mc="http://schemas.openxmlformats.org/markup-compatibility/2006">
+    <mc:Choice xmlns:p14="http://schemas.microsoft.com/office/powerpoint/2010/main" Requires="p14">
+      <p:transition p14:dur="10"/>
+    </mc:Choice>
+    <mc:Fallback>
+      <p:transition/>
+    </mc:Fallback>
+  </mc:AlternateContent>
 </p:sldLayout>
 </file>
 
@@ -4561,7 +4591,7 @@
           <a:p>
             <a:fld id="{0809BC95-6AD5-4D34-9000-81E21223B4F6}" type="datetimeFigureOut">
               <a:rPr lang="it-IT" smtClean="0"/>
-              <a:t>21/02/2015</a:t>
+              <a:t>22/02/2015</a:t>
             </a:fld>
             <a:endParaRPr lang="it-IT"/>
           </a:p>
@@ -4619,9 +4649,14 @@
   <p:clrMapOvr>
     <a:masterClrMapping/>
   </p:clrMapOvr>
-  <p:transition spd="slow">
-    <p:push dir="u"/>
-  </p:transition>
+  <mc:AlternateContent xmlns:mc="http://schemas.openxmlformats.org/markup-compatibility/2006">
+    <mc:Choice xmlns:p14="http://schemas.microsoft.com/office/powerpoint/2010/main" Requires="p14">
+      <p:transition p14:dur="10"/>
+    </mc:Choice>
+    <mc:Fallback>
+      <p:transition/>
+    </mc:Fallback>
+  </mc:AlternateContent>
 </p:sldLayout>
 </file>
 
@@ -4682,7 +4717,7 @@
           <a:p>
             <a:fld id="{0809BC95-6AD5-4D34-9000-81E21223B4F6}" type="datetimeFigureOut">
               <a:rPr lang="it-IT" smtClean="0"/>
-              <a:t>21/02/2015</a:t>
+              <a:t>22/02/2015</a:t>
             </a:fld>
             <a:endParaRPr lang="it-IT"/>
           </a:p>
@@ -4740,9 +4775,14 @@
   <p:clrMapOvr>
     <a:masterClrMapping/>
   </p:clrMapOvr>
-  <p:transition spd="slow">
-    <p:push dir="u"/>
-  </p:transition>
+  <mc:AlternateContent xmlns:mc="http://schemas.openxmlformats.org/markup-compatibility/2006">
+    <mc:Choice xmlns:p14="http://schemas.microsoft.com/office/powerpoint/2010/main" Requires="p14">
+      <p:transition p14:dur="10"/>
+    </mc:Choice>
+    <mc:Fallback>
+      <p:transition/>
+    </mc:Fallback>
+  </mc:AlternateContent>
 </p:sldLayout>
 </file>
 
@@ -4780,7 +4820,7 @@
           <a:p>
             <a:fld id="{0809BC95-6AD5-4D34-9000-81E21223B4F6}" type="datetimeFigureOut">
               <a:rPr lang="it-IT" smtClean="0"/>
-              <a:t>21/02/2015</a:t>
+              <a:t>22/02/2015</a:t>
             </a:fld>
             <a:endParaRPr lang="it-IT"/>
           </a:p>
@@ -4838,9 +4878,14 @@
   <p:clrMapOvr>
     <a:masterClrMapping/>
   </p:clrMapOvr>
-  <p:transition spd="slow">
-    <p:push dir="u"/>
-  </p:transition>
+  <mc:AlternateContent xmlns:mc="http://schemas.openxmlformats.org/markup-compatibility/2006">
+    <mc:Choice xmlns:p14="http://schemas.microsoft.com/office/powerpoint/2010/main" Requires="p14">
+      <p:transition p14:dur="10"/>
+    </mc:Choice>
+    <mc:Fallback>
+      <p:transition/>
+    </mc:Fallback>
+  </mc:AlternateContent>
 </p:sldLayout>
 </file>
 
@@ -5060,7 +5105,7 @@
           <a:p>
             <a:fld id="{0809BC95-6AD5-4D34-9000-81E21223B4F6}" type="datetimeFigureOut">
               <a:rPr lang="it-IT" smtClean="0"/>
-              <a:t>21/02/2015</a:t>
+              <a:t>22/02/2015</a:t>
             </a:fld>
             <a:endParaRPr lang="it-IT"/>
           </a:p>
@@ -5118,9 +5163,14 @@
   <p:clrMapOvr>
     <a:masterClrMapping/>
   </p:clrMapOvr>
-  <p:transition spd="slow">
-    <p:push dir="u"/>
-  </p:transition>
+  <mc:AlternateContent xmlns:mc="http://schemas.openxmlformats.org/markup-compatibility/2006">
+    <mc:Choice xmlns:p14="http://schemas.microsoft.com/office/powerpoint/2010/main" Requires="p14">
+      <p:transition p14:dur="10"/>
+    </mc:Choice>
+    <mc:Fallback>
+      <p:transition/>
+    </mc:Fallback>
+  </mc:AlternateContent>
 </p:sldLayout>
 </file>
 
@@ -5316,7 +5366,7 @@
           <a:p>
             <a:fld id="{0809BC95-6AD5-4D34-9000-81E21223B4F6}" type="datetimeFigureOut">
               <a:rPr lang="it-IT" smtClean="0"/>
-              <a:t>21/02/2015</a:t>
+              <a:t>22/02/2015</a:t>
             </a:fld>
             <a:endParaRPr lang="it-IT"/>
           </a:p>
@@ -5374,9 +5424,14 @@
   <p:clrMapOvr>
     <a:masterClrMapping/>
   </p:clrMapOvr>
-  <p:transition spd="slow">
-    <p:push dir="u"/>
-  </p:transition>
+  <mc:AlternateContent xmlns:mc="http://schemas.openxmlformats.org/markup-compatibility/2006">
+    <mc:Choice xmlns:p14="http://schemas.microsoft.com/office/powerpoint/2010/main" Requires="p14">
+      <p:transition p14:dur="10"/>
+    </mc:Choice>
+    <mc:Fallback>
+      <p:transition/>
+    </mc:Fallback>
+  </mc:AlternateContent>
 </p:sldLayout>
 </file>
 
@@ -5532,7 +5587,7 @@
           <a:p>
             <a:fld id="{0809BC95-6AD5-4D34-9000-81E21223B4F6}" type="datetimeFigureOut">
               <a:rPr lang="it-IT" smtClean="0"/>
-              <a:t>21/02/2015</a:t>
+              <a:t>22/02/2015</a:t>
             </a:fld>
             <a:endParaRPr lang="it-IT"/>
           </a:p>
@@ -5637,9 +5692,14 @@
     <p:sldLayoutId id="2147483658" r:id="rId10"/>
     <p:sldLayoutId id="2147483659" r:id="rId11"/>
   </p:sldLayoutIdLst>
-  <p:transition spd="slow">
-    <p:push dir="u"/>
-  </p:transition>
+  <mc:AlternateContent xmlns:mc="http://schemas.openxmlformats.org/markup-compatibility/2006">
+    <mc:Choice xmlns:p14="http://schemas.microsoft.com/office/powerpoint/2010/main" Requires="p14">
+      <p:transition p14:dur="10"/>
+    </mc:Choice>
+    <mc:Fallback>
+      <p:transition/>
+    </mc:Fallback>
+  </mc:AlternateContent>
   <p:txStyles>
     <p:titleStyle>
       <a:lvl1pPr algn="l" defTabSz="914400" rtl="0" eaLnBrk="1" latinLnBrk="0" hangingPunct="1">
@@ -6237,9 +6297,14 @@
   <p:clrMapOvr>
     <a:masterClrMapping/>
   </p:clrMapOvr>
-  <p:transition spd="slow">
-    <p:push dir="u"/>
-  </p:transition>
+  <mc:AlternateContent xmlns:mc="http://schemas.openxmlformats.org/markup-compatibility/2006">
+    <mc:Choice xmlns:p14="http://schemas.microsoft.com/office/powerpoint/2010/main" Requires="p14">
+      <p:transition p14:dur="10"/>
+    </mc:Choice>
+    <mc:Fallback>
+      <p:transition/>
+    </mc:Fallback>
+  </mc:AlternateContent>
   <p:timing>
     <p:tnLst>
       <p:par>
@@ -6654,9 +6719,14 @@
   <p:clrMapOvr>
     <a:masterClrMapping/>
   </p:clrMapOvr>
-  <p:transition spd="slow">
-    <p:push dir="u"/>
-  </p:transition>
+  <mc:AlternateContent xmlns:mc="http://schemas.openxmlformats.org/markup-compatibility/2006">
+    <mc:Choice xmlns:p14="http://schemas.microsoft.com/office/powerpoint/2010/main" Requires="p14">
+      <p:transition p14:dur="10"/>
+    </mc:Choice>
+    <mc:Fallback>
+      <p:transition/>
+    </mc:Fallback>
+  </mc:AlternateContent>
   <p:timing>
     <p:tnLst>
       <p:par>
@@ -7158,9 +7228,14 @@
   <p:clrMapOvr>
     <a:masterClrMapping/>
   </p:clrMapOvr>
-  <p:transition spd="slow">
-    <p:push dir="u"/>
-  </p:transition>
+  <mc:AlternateContent xmlns:mc="http://schemas.openxmlformats.org/markup-compatibility/2006">
+    <mc:Choice xmlns:p14="http://schemas.microsoft.com/office/powerpoint/2010/main" Requires="p14">
+      <p:transition p14:dur="10"/>
+    </mc:Choice>
+    <mc:Fallback>
+      <p:transition/>
+    </mc:Fallback>
+  </mc:AlternateContent>
   <p:timing>
     <p:tnLst>
       <p:par>
@@ -7495,9 +7570,14 @@
   <p:clrMapOvr>
     <a:masterClrMapping/>
   </p:clrMapOvr>
-  <p:transition spd="slow">
-    <p:push dir="u"/>
-  </p:transition>
+  <mc:AlternateContent xmlns:mc="http://schemas.openxmlformats.org/markup-compatibility/2006">
+    <mc:Choice xmlns:p14="http://schemas.microsoft.com/office/powerpoint/2010/main" Requires="p14">
+      <p:transition p14:dur="10"/>
+    </mc:Choice>
+    <mc:Fallback>
+      <p:transition/>
+    </mc:Fallback>
+  </mc:AlternateContent>
   <p:timing>
     <p:tnLst>
       <p:par>
@@ -8024,9 +8104,14 @@
   <p:clrMapOvr>
     <a:masterClrMapping/>
   </p:clrMapOvr>
-  <p:transition spd="slow">
-    <p:push dir="u"/>
-  </p:transition>
+  <mc:AlternateContent xmlns:mc="http://schemas.openxmlformats.org/markup-compatibility/2006">
+    <mc:Choice xmlns:p14="http://schemas.microsoft.com/office/powerpoint/2010/main" Requires="p14">
+      <p:transition p14:dur="10"/>
+    </mc:Choice>
+    <mc:Fallback>
+      <p:transition/>
+    </mc:Fallback>
+  </mc:AlternateContent>
   <p:timing>
     <p:tnLst>
       <p:par>
@@ -8437,9 +8522,14 @@
   <p:clrMapOvr>
     <a:masterClrMapping/>
   </p:clrMapOvr>
-  <p:transition spd="slow">
-    <p:push dir="u"/>
-  </p:transition>
+  <mc:AlternateContent xmlns:mc="http://schemas.openxmlformats.org/markup-compatibility/2006">
+    <mc:Choice xmlns:p14="http://schemas.microsoft.com/office/powerpoint/2010/main" Requires="p14">
+      <p:transition p14:dur="10"/>
+    </mc:Choice>
+    <mc:Fallback>
+      <p:transition/>
+    </mc:Fallback>
+  </mc:AlternateContent>
   <p:timing>
     <p:tnLst>
       <p:par>
@@ -8753,9 +8843,14 @@
   <p:clrMapOvr>
     <a:masterClrMapping/>
   </p:clrMapOvr>
-  <p:transition spd="slow">
-    <p:push dir="u"/>
-  </p:transition>
+  <mc:AlternateContent xmlns:mc="http://schemas.openxmlformats.org/markup-compatibility/2006">
+    <mc:Choice xmlns:p14="http://schemas.microsoft.com/office/powerpoint/2010/main" Requires="p14">
+      <p:transition p14:dur="10"/>
+    </mc:Choice>
+    <mc:Fallback>
+      <p:transition/>
+    </mc:Fallback>
+  </mc:AlternateContent>
   <p:timing>
     <p:tnLst>
       <p:par>
@@ -8828,103 +8923,6 @@
       </p:sp>
       <p:sp>
         <p:nvSpPr>
-          <p:cNvPr id="9" name="CasellaDiTesto 8"/>
-          <p:cNvSpPr txBox="1"/>
-          <p:nvPr/>
-        </p:nvSpPr>
-        <p:spPr>
-          <a:xfrm>
-            <a:off x="415529" y="314326"/>
-            <a:ext cx="11613357" cy="2308324"/>
-          </a:xfrm>
-          <a:prstGeom prst="rect">
-            <a:avLst/>
-          </a:prstGeom>
-          <a:noFill/>
-        </p:spPr>
-        <p:txBody>
-          <a:bodyPr wrap="square" rtlCol="0">
-            <a:spAutoFit/>
-          </a:bodyPr>
-          <a:lstStyle/>
-          <a:p>
-            <a:r>
-              <a:rPr lang="it-IT" sz="5400" b="1" spc="-100" dirty="0" smtClean="0">
-                <a:ln w="3175">
-                  <a:noFill/>
-                </a:ln>
-                <a:solidFill>
-                  <a:srgbClr val="0072C6"/>
-                </a:solidFill>
-                <a:latin typeface="+mj-lt"/>
-                <a:cs typeface="Arial" charset="0"/>
-              </a:rPr>
-              <a:t>Use </a:t>
-            </a:r>
-            <a:r>
-              <a:rPr lang="it-IT" sz="5400" b="1" spc="-100" dirty="0" err="1" smtClean="0">
-                <a:ln w="3175">
-                  <a:noFill/>
-                </a:ln>
-                <a:solidFill>
-                  <a:srgbClr val="0072C6"/>
-                </a:solidFill>
-                <a:latin typeface="+mj-lt"/>
-                <a:cs typeface="Arial" charset="0"/>
-              </a:rPr>
-              <a:t>cases</a:t>
-            </a:r>
-            <a:endParaRPr lang="it-IT" sz="5400" b="1" spc="-100" dirty="0">
-              <a:ln w="3175">
-                <a:noFill/>
-              </a:ln>
-              <a:solidFill>
-                <a:srgbClr val="0072C6"/>
-              </a:solidFill>
-              <a:latin typeface="+mj-lt"/>
-              <a:cs typeface="Arial" charset="0"/>
-            </a:endParaRPr>
-          </a:p>
-          <a:p>
-            <a:endParaRPr lang="it-IT" sz="3000" b="1" spc="-100" dirty="0" smtClean="0">
-              <a:ln w="3175">
-                <a:noFill/>
-              </a:ln>
-              <a:solidFill>
-                <a:srgbClr val="0072C6"/>
-              </a:solidFill>
-              <a:latin typeface="+mj-lt"/>
-              <a:cs typeface="Arial" charset="0"/>
-            </a:endParaRPr>
-          </a:p>
-          <a:p>
-            <a:endParaRPr lang="it-IT" sz="3000" b="1" spc="-100" dirty="0">
-              <a:ln w="3175">
-                <a:noFill/>
-              </a:ln>
-              <a:solidFill>
-                <a:srgbClr val="0072C6"/>
-              </a:solidFill>
-              <a:latin typeface="+mj-lt"/>
-              <a:cs typeface="Arial" charset="0"/>
-            </a:endParaRPr>
-          </a:p>
-          <a:p>
-            <a:endParaRPr lang="it-IT" sz="3000" b="1" spc="-100" dirty="0">
-              <a:ln w="3175">
-                <a:noFill/>
-              </a:ln>
-              <a:solidFill>
-                <a:srgbClr val="0072C6"/>
-              </a:solidFill>
-              <a:latin typeface="+mj-lt"/>
-              <a:cs typeface="Arial" charset="0"/>
-            </a:endParaRPr>
-          </a:p>
-        </p:txBody>
-      </p:sp>
-      <p:sp>
-        <p:nvSpPr>
           <p:cNvPr id="4" name="Rettangolo 3"/>
           <p:cNvSpPr/>
           <p:nvPr/>
@@ -8966,36 +8964,6 @@
           </a:p>
         </p:txBody>
       </p:sp>
-      <p:pic>
-        <p:nvPicPr>
-          <p:cNvPr id="3" name="Immagine 2" descr="Schermata 2015-02-19 alle 14.35.01.png"/>
-          <p:cNvPicPr>
-            <a:picLocks noChangeAspect="1"/>
-          </p:cNvPicPr>
-          <p:nvPr/>
-        </p:nvPicPr>
-        <p:blipFill>
-          <a:blip r:embed="rId2">
-            <a:extLst>
-              <a:ext uri="{28A0092B-C50C-407E-A947-70E740481C1C}">
-                <a14:useLocalDpi xmlns:a14="http://schemas.microsoft.com/office/drawing/2010/main" val="0"/>
-              </a:ext>
-            </a:extLst>
-          </a:blip>
-          <a:stretch>
-            <a:fillRect/>
-          </a:stretch>
-        </p:blipFill>
-        <p:spPr>
-          <a:xfrm>
-            <a:off x="308912" y="1064099"/>
-            <a:ext cx="11361084" cy="5446353"/>
-          </a:xfrm>
-          <a:prstGeom prst="rect">
-            <a:avLst/>
-          </a:prstGeom>
-        </p:spPr>
-      </p:pic>
       <p:sp>
         <p:nvSpPr>
           <p:cNvPr id="2" name="Rettangolo 1"/>
@@ -9086,16 +9054,143 @@
           </a:p>
         </p:txBody>
       </p:sp>
+      <p:pic>
+        <p:nvPicPr>
+          <p:cNvPr id="7" name="Immagine 6"/>
+          <p:cNvPicPr>
+            <a:picLocks noChangeAspect="1"/>
+          </p:cNvPicPr>
+          <p:nvPr/>
+        </p:nvPicPr>
+        <p:blipFill>
+          <a:blip r:embed="rId2">
+            <a:extLst>
+              <a:ext uri="{28A0092B-C50C-407E-A947-70E740481C1C}">
+                <a14:useLocalDpi xmlns:a14="http://schemas.microsoft.com/office/drawing/2010/main" val="0"/>
+              </a:ext>
+            </a:extLst>
+          </a:blip>
+          <a:stretch>
+            <a:fillRect/>
+          </a:stretch>
+        </p:blipFill>
+        <p:spPr>
+          <a:xfrm>
+            <a:off x="1593817" y="657226"/>
+            <a:ext cx="10232137" cy="5864464"/>
+          </a:xfrm>
+          <a:prstGeom prst="rect">
+            <a:avLst/>
+          </a:prstGeom>
+        </p:spPr>
+      </p:pic>
       <p:sp>
         <p:nvSpPr>
-          <p:cNvPr id="8" name="Triangolo isoscele 7"/>
+          <p:cNvPr id="9" name="CasellaDiTesto 8"/>
+          <p:cNvSpPr txBox="1"/>
+          <p:nvPr/>
+        </p:nvSpPr>
+        <p:spPr>
+          <a:xfrm>
+            <a:off x="415529" y="314326"/>
+            <a:ext cx="10813303" cy="2308324"/>
+          </a:xfrm>
+          <a:prstGeom prst="rect">
+            <a:avLst/>
+          </a:prstGeom>
+          <a:noFill/>
+        </p:spPr>
+        <p:txBody>
+          <a:bodyPr wrap="square" rtlCol="0">
+            <a:spAutoFit/>
+          </a:bodyPr>
+          <a:lstStyle/>
+          <a:p>
+            <a:r>
+              <a:rPr lang="it-IT" sz="5400" b="1" spc="-100" dirty="0" smtClean="0">
+                <a:ln w="3175">
+                  <a:noFill/>
+                </a:ln>
+                <a:solidFill>
+                  <a:srgbClr val="0072C6"/>
+                </a:solidFill>
+                <a:latin typeface="+mj-lt"/>
+                <a:cs typeface="Arial" charset="0"/>
+              </a:rPr>
+              <a:t>Use </a:t>
+            </a:r>
+            <a:r>
+              <a:rPr lang="it-IT" sz="5400" b="1" spc="-100" dirty="0" err="1" smtClean="0">
+                <a:ln w="3175">
+                  <a:noFill/>
+                </a:ln>
+                <a:solidFill>
+                  <a:srgbClr val="0072C6"/>
+                </a:solidFill>
+                <a:latin typeface="+mj-lt"/>
+                <a:cs typeface="Arial" charset="0"/>
+              </a:rPr>
+              <a:t>cases</a:t>
+            </a:r>
+            <a:endParaRPr lang="it-IT" sz="5400" b="1" spc="-100" dirty="0">
+              <a:ln w="3175">
+                <a:noFill/>
+              </a:ln>
+              <a:solidFill>
+                <a:srgbClr val="0072C6"/>
+              </a:solidFill>
+              <a:latin typeface="+mj-lt"/>
+              <a:cs typeface="Arial" charset="0"/>
+            </a:endParaRPr>
+          </a:p>
+          <a:p>
+            <a:endParaRPr lang="it-IT" sz="3000" b="1" spc="-100" dirty="0" smtClean="0">
+              <a:ln w="3175">
+                <a:noFill/>
+              </a:ln>
+              <a:solidFill>
+                <a:srgbClr val="0072C6"/>
+              </a:solidFill>
+              <a:latin typeface="+mj-lt"/>
+              <a:cs typeface="Arial" charset="0"/>
+            </a:endParaRPr>
+          </a:p>
+          <a:p>
+            <a:endParaRPr lang="it-IT" sz="3000" b="1" spc="-100" dirty="0">
+              <a:ln w="3175">
+                <a:noFill/>
+              </a:ln>
+              <a:solidFill>
+                <a:srgbClr val="0072C6"/>
+              </a:solidFill>
+              <a:latin typeface="+mj-lt"/>
+              <a:cs typeface="Arial" charset="0"/>
+            </a:endParaRPr>
+          </a:p>
+          <a:p>
+            <a:endParaRPr lang="it-IT" sz="3000" b="1" spc="-100" dirty="0">
+              <a:ln w="3175">
+                <a:noFill/>
+              </a:ln>
+              <a:solidFill>
+                <a:srgbClr val="0072C6"/>
+              </a:solidFill>
+              <a:latin typeface="+mj-lt"/>
+              <a:cs typeface="Arial" charset="0"/>
+            </a:endParaRPr>
+          </a:p>
+        </p:txBody>
+      </p:sp>
+      <p:sp>
+        <p:nvSpPr>
+          <p:cNvPr id="19" name="Triangolo isoscele 18"/>
           <p:cNvSpPr/>
           <p:nvPr/>
         </p:nvSpPr>
         <p:spPr>
-          <a:xfrm rot="5228276">
-            <a:off x="2907339" y="1344153"/>
-            <a:ext cx="189303" cy="136476"/>
+          <a:xfrm rot="4892389">
+            <a:off x="4001834" y="954389"/>
+            <a:ext cx="156796" cy="123234"/>
           </a:xfrm>
           <a:prstGeom prst="triangle">
             <a:avLst/>
@@ -9128,14 +9223,14 @@
       </p:sp>
       <p:sp>
         <p:nvSpPr>
-          <p:cNvPr id="12" name="Triangolo isoscele 11"/>
+          <p:cNvPr id="21" name="Triangolo isoscele 20"/>
           <p:cNvSpPr/>
           <p:nvPr/>
         </p:nvSpPr>
         <p:spPr>
-          <a:xfrm rot="5228276">
-            <a:off x="3090737" y="1827478"/>
-            <a:ext cx="189303" cy="136476"/>
+          <a:xfrm rot="5764653">
+            <a:off x="4179716" y="1494391"/>
+            <a:ext cx="143455" cy="145051"/>
           </a:xfrm>
           <a:prstGeom prst="triangle">
             <a:avLst/>
@@ -9168,14 +9263,14 @@
       </p:sp>
       <p:sp>
         <p:nvSpPr>
-          <p:cNvPr id="13" name="Triangolo isoscele 12"/>
+          <p:cNvPr id="22" name="Triangolo isoscele 21"/>
           <p:cNvSpPr/>
           <p:nvPr/>
         </p:nvSpPr>
         <p:spPr>
-          <a:xfrm rot="4085872">
-            <a:off x="8058463" y="1461214"/>
-            <a:ext cx="169678" cy="155348"/>
+          <a:xfrm rot="16384888">
+            <a:off x="5221564" y="4505181"/>
+            <a:ext cx="152137" cy="190916"/>
           </a:xfrm>
           <a:prstGeom prst="triangle">
             <a:avLst/>
@@ -9208,14 +9303,14 @@
       </p:sp>
       <p:sp>
         <p:nvSpPr>
-          <p:cNvPr id="14" name="Triangolo isoscele 13"/>
+          <p:cNvPr id="23" name="Triangolo isoscele 22"/>
           <p:cNvSpPr/>
           <p:nvPr/>
         </p:nvSpPr>
         <p:spPr>
-          <a:xfrm rot="4085872">
-            <a:off x="7792851" y="2215388"/>
-            <a:ext cx="169678" cy="155348"/>
+          <a:xfrm rot="17068366">
+            <a:off x="4859539" y="5501750"/>
+            <a:ext cx="149738" cy="171489"/>
           </a:xfrm>
           <a:prstGeom prst="triangle">
             <a:avLst/>
@@ -9248,14 +9343,14 @@
       </p:sp>
       <p:sp>
         <p:nvSpPr>
-          <p:cNvPr id="15" name="Triangolo isoscele 14"/>
+          <p:cNvPr id="24" name="Triangolo isoscele 23"/>
           <p:cNvSpPr/>
           <p:nvPr/>
         </p:nvSpPr>
         <p:spPr>
-          <a:xfrm rot="5400000">
-            <a:off x="4739146" y="2775644"/>
-            <a:ext cx="233596" cy="146217"/>
+          <a:xfrm rot="11209492">
+            <a:off x="1869521" y="3816753"/>
+            <a:ext cx="147730" cy="120242"/>
           </a:xfrm>
           <a:prstGeom prst="triangle">
             <a:avLst/>
@@ -9288,14 +9383,14 @@
       </p:sp>
       <p:sp>
         <p:nvSpPr>
-          <p:cNvPr id="16" name="Triangolo isoscele 15"/>
+          <p:cNvPr id="25" name="Triangolo isoscele 24"/>
           <p:cNvSpPr/>
           <p:nvPr/>
         </p:nvSpPr>
         <p:spPr>
-          <a:xfrm rot="5905167">
-            <a:off x="3698470" y="3086518"/>
-            <a:ext cx="233596" cy="146217"/>
+          <a:xfrm>
+            <a:off x="2267712" y="5261913"/>
+            <a:ext cx="170255" cy="102567"/>
           </a:xfrm>
           <a:prstGeom prst="triangle">
             <a:avLst/>
@@ -9328,14 +9423,14 @@
       </p:sp>
       <p:sp>
         <p:nvSpPr>
-          <p:cNvPr id="17" name="Triangolo isoscele 16"/>
+          <p:cNvPr id="26" name="Triangolo isoscele 25"/>
           <p:cNvSpPr/>
           <p:nvPr/>
         </p:nvSpPr>
         <p:spPr>
-          <a:xfrm rot="11200206">
-            <a:off x="602572" y="3901370"/>
-            <a:ext cx="233596" cy="146217"/>
+          <a:xfrm rot="5962915">
+            <a:off x="4720873" y="2906421"/>
+            <a:ext cx="141168" cy="149328"/>
           </a:xfrm>
           <a:prstGeom prst="triangle">
             <a:avLst/>
@@ -9368,14 +9463,14 @@
       </p:sp>
       <p:sp>
         <p:nvSpPr>
-          <p:cNvPr id="18" name="Triangolo isoscele 17"/>
+          <p:cNvPr id="27" name="Triangolo isoscele 26"/>
           <p:cNvSpPr/>
           <p:nvPr/>
         </p:nvSpPr>
         <p:spPr>
-          <a:xfrm>
-            <a:off x="1036526" y="5151051"/>
-            <a:ext cx="233596" cy="146217"/>
+          <a:xfrm rot="5080462">
+            <a:off x="5665185" y="2557938"/>
+            <a:ext cx="160632" cy="143586"/>
           </a:xfrm>
           <a:prstGeom prst="triangle">
             <a:avLst/>
@@ -9408,14 +9503,14 @@
       </p:sp>
       <p:sp>
         <p:nvSpPr>
-          <p:cNvPr id="19" name="Triangolo isoscele 18"/>
+          <p:cNvPr id="28" name="Triangolo isoscele 27"/>
           <p:cNvSpPr/>
           <p:nvPr/>
         </p:nvSpPr>
         <p:spPr>
-          <a:xfrm rot="17144326">
-            <a:off x="3904854" y="5460206"/>
-            <a:ext cx="233596" cy="146217"/>
+          <a:xfrm rot="5080462">
+            <a:off x="8329994" y="1968861"/>
+            <a:ext cx="150490" cy="97444"/>
           </a:xfrm>
           <a:prstGeom prst="triangle">
             <a:avLst/>
@@ -9448,14 +9543,14 @@
       </p:sp>
       <p:sp>
         <p:nvSpPr>
-          <p:cNvPr id="20" name="Triangolo isoscele 19"/>
+          <p:cNvPr id="29" name="Triangolo isoscele 28"/>
           <p:cNvSpPr/>
           <p:nvPr/>
         </p:nvSpPr>
         <p:spPr>
-          <a:xfrm rot="7625111">
-            <a:off x="3005420" y="4132821"/>
-            <a:ext cx="279928" cy="147908"/>
+          <a:xfrm rot="4011855">
+            <a:off x="8677860" y="1084429"/>
+            <a:ext cx="149930" cy="114851"/>
           </a:xfrm>
           <a:prstGeom prst="triangle">
             <a:avLst/>
@@ -9496,9 +9591,14 @@
   <p:clrMapOvr>
     <a:masterClrMapping/>
   </p:clrMapOvr>
-  <p:transition spd="slow">
-    <p:push dir="u"/>
-  </p:transition>
+  <mc:AlternateContent xmlns:mc="http://schemas.openxmlformats.org/markup-compatibility/2006">
+    <mc:Choice xmlns:p14="http://schemas.microsoft.com/office/powerpoint/2010/main" Requires="p14">
+      <p:transition p14:dur="10"/>
+    </mc:Choice>
+    <mc:Fallback>
+      <p:transition/>
+    </mc:Fallback>
+  </mc:AlternateContent>
   <p:timing>
     <p:tnLst>
       <p:par>
@@ -9724,9 +9824,14 @@
   <p:clrMapOvr>
     <a:masterClrMapping/>
   </p:clrMapOvr>
-  <p:transition spd="slow">
-    <p:push dir="u"/>
-  </p:transition>
+  <mc:AlternateContent xmlns:mc="http://schemas.openxmlformats.org/markup-compatibility/2006">
+    <mc:Choice xmlns:p14="http://schemas.microsoft.com/office/powerpoint/2010/main" Requires="p14">
+      <p:transition p14:dur="10"/>
+    </mc:Choice>
+    <mc:Fallback>
+      <p:transition/>
+    </mc:Fallback>
+  </mc:AlternateContent>
   <p:timing>
     <p:tnLst>
       <p:par>
@@ -9952,9 +10057,14 @@
   <p:clrMapOvr>
     <a:masterClrMapping/>
   </p:clrMapOvr>
-  <p:transition spd="slow">
-    <p:push dir="u"/>
-  </p:transition>
+  <mc:AlternateContent xmlns:mc="http://schemas.openxmlformats.org/markup-compatibility/2006">
+    <mc:Choice xmlns:p14="http://schemas.microsoft.com/office/powerpoint/2010/main" Requires="p14">
+      <p:transition p14:dur="10"/>
+    </mc:Choice>
+    <mc:Fallback>
+      <p:transition/>
+    </mc:Fallback>
+  </mc:AlternateContent>
   <p:timing>
     <p:tnLst>
       <p:par>
@@ -10179,9 +10289,14 @@
   <p:clrMapOvr>
     <a:masterClrMapping/>
   </p:clrMapOvr>
-  <p:transition spd="slow">
-    <p:push dir="u"/>
-  </p:transition>
+  <mc:AlternateContent xmlns:mc="http://schemas.openxmlformats.org/markup-compatibility/2006">
+    <mc:Choice xmlns:p14="http://schemas.microsoft.com/office/powerpoint/2010/main" Requires="p14">
+      <p:transition p14:dur="10"/>
+    </mc:Choice>
+    <mc:Fallback>
+      <p:transition/>
+    </mc:Fallback>
+  </mc:AlternateContent>
   <p:timing>
     <p:tnLst>
       <p:par>
@@ -10434,9 +10549,14 @@
   <p:clrMapOvr>
     <a:masterClrMapping/>
   </p:clrMapOvr>
-  <p:transition spd="slow">
-    <p:push dir="u"/>
-  </p:transition>
+  <mc:AlternateContent xmlns:mc="http://schemas.openxmlformats.org/markup-compatibility/2006">
+    <mc:Choice xmlns:p14="http://schemas.microsoft.com/office/powerpoint/2010/main" Requires="p14">
+      <p:transition p14:dur="10"/>
+    </mc:Choice>
+    <mc:Fallback>
+      <p:transition/>
+    </mc:Fallback>
+  </mc:AlternateContent>
   <p:timing>
     <p:tnLst>
       <p:par>
@@ -10661,9 +10781,14 @@
   <p:clrMapOvr>
     <a:masterClrMapping/>
   </p:clrMapOvr>
-  <p:transition spd="slow">
-    <p:push dir="u"/>
-  </p:transition>
+  <mc:AlternateContent xmlns:mc="http://schemas.openxmlformats.org/markup-compatibility/2006">
+    <mc:Choice xmlns:p14="http://schemas.microsoft.com/office/powerpoint/2010/main" Requires="p14">
+      <p:transition p14:dur="10"/>
+    </mc:Choice>
+    <mc:Fallback>
+      <p:transition/>
+    </mc:Fallback>
+  </mc:AlternateContent>
   <p:timing>
     <p:tnLst>
       <p:par>
@@ -10889,9 +11014,14 @@
   <p:clrMapOvr>
     <a:masterClrMapping/>
   </p:clrMapOvr>
-  <p:transition spd="slow">
-    <p:push dir="u"/>
-  </p:transition>
+  <mc:AlternateContent xmlns:mc="http://schemas.openxmlformats.org/markup-compatibility/2006">
+    <mc:Choice xmlns:p14="http://schemas.microsoft.com/office/powerpoint/2010/main" Requires="p14">
+      <p:transition p14:dur="10"/>
+    </mc:Choice>
+    <mc:Fallback>
+      <p:transition/>
+    </mc:Fallback>
+  </mc:AlternateContent>
   <p:timing>
     <p:tnLst>
       <p:par>
@@ -11117,9 +11247,14 @@
   <p:clrMapOvr>
     <a:masterClrMapping/>
   </p:clrMapOvr>
-  <p:transition spd="slow">
-    <p:push dir="u"/>
-  </p:transition>
+  <mc:AlternateContent xmlns:mc="http://schemas.openxmlformats.org/markup-compatibility/2006">
+    <mc:Choice xmlns:p14="http://schemas.microsoft.com/office/powerpoint/2010/main" Requires="p14">
+      <p:transition p14:dur="10"/>
+    </mc:Choice>
+    <mc:Fallback>
+      <p:transition/>
+    </mc:Fallback>
+  </mc:AlternateContent>
   <p:timing>
     <p:tnLst>
       <p:par>
@@ -11345,9 +11480,14 @@
   <p:clrMapOvr>
     <a:masterClrMapping/>
   </p:clrMapOvr>
-  <p:transition spd="slow">
-    <p:push dir="u"/>
-  </p:transition>
+  <mc:AlternateContent xmlns:mc="http://schemas.openxmlformats.org/markup-compatibility/2006">
+    <mc:Choice xmlns:p14="http://schemas.microsoft.com/office/powerpoint/2010/main" Requires="p14">
+      <p:transition p14:dur="10"/>
+    </mc:Choice>
+    <mc:Fallback>
+      <p:transition/>
+    </mc:Fallback>
+  </mc:AlternateContent>
   <p:timing>
     <p:tnLst>
       <p:par>
@@ -11573,9 +11713,14 @@
   <p:clrMapOvr>
     <a:masterClrMapping/>
   </p:clrMapOvr>
-  <p:transition spd="slow">
-    <p:push dir="u"/>
-  </p:transition>
+  <mc:AlternateContent xmlns:mc="http://schemas.openxmlformats.org/markup-compatibility/2006">
+    <mc:Choice xmlns:p14="http://schemas.microsoft.com/office/powerpoint/2010/main" Requires="p14">
+      <p:transition p14:dur="10"/>
+    </mc:Choice>
+    <mc:Fallback>
+      <p:transition/>
+    </mc:Fallback>
+  </mc:AlternateContent>
   <p:timing>
     <p:tnLst>
       <p:par>
@@ -11801,9 +11946,14 @@
   <p:clrMapOvr>
     <a:masterClrMapping/>
   </p:clrMapOvr>
-  <p:transition spd="slow">
-    <p:push dir="u"/>
-  </p:transition>
+  <mc:AlternateContent xmlns:mc="http://schemas.openxmlformats.org/markup-compatibility/2006">
+    <mc:Choice xmlns:p14="http://schemas.microsoft.com/office/powerpoint/2010/main" Requires="p14">
+      <p:transition p14:dur="10"/>
+    </mc:Choice>
+    <mc:Fallback>
+      <p:transition/>
+    </mc:Fallback>
+  </mc:AlternateContent>
   <p:timing>
     <p:tnLst>
       <p:par>
@@ -12029,9 +12179,14 @@
   <p:clrMapOvr>
     <a:masterClrMapping/>
   </p:clrMapOvr>
-  <p:transition spd="slow">
-    <p:push dir="u"/>
-  </p:transition>
+  <mc:AlternateContent xmlns:mc="http://schemas.openxmlformats.org/markup-compatibility/2006">
+    <mc:Choice xmlns:p14="http://schemas.microsoft.com/office/powerpoint/2010/main" Requires="p14">
+      <p:transition p14:dur="10"/>
+    </mc:Choice>
+    <mc:Fallback>
+      <p:transition/>
+    </mc:Fallback>
+  </mc:AlternateContent>
   <p:timing>
     <p:tnLst>
       <p:par>
@@ -12296,9 +12451,14 @@
   <p:clrMapOvr>
     <a:masterClrMapping/>
   </p:clrMapOvr>
-  <p:transition spd="slow">
-    <p:push dir="u"/>
-  </p:transition>
+  <mc:AlternateContent xmlns:mc="http://schemas.openxmlformats.org/markup-compatibility/2006">
+    <mc:Choice xmlns:p14="http://schemas.microsoft.com/office/powerpoint/2010/main" Requires="p14">
+      <p:transition p14:dur="10"/>
+    </mc:Choice>
+    <mc:Fallback>
+      <p:transition/>
+    </mc:Fallback>
+  </mc:AlternateContent>
   <p:timing>
     <p:tnLst>
       <p:par>
@@ -12563,9 +12723,14 @@
   <p:clrMapOvr>
     <a:masterClrMapping/>
   </p:clrMapOvr>
-  <p:transition spd="slow">
-    <p:push dir="u"/>
-  </p:transition>
+  <mc:AlternateContent xmlns:mc="http://schemas.openxmlformats.org/markup-compatibility/2006">
+    <mc:Choice xmlns:p14="http://schemas.microsoft.com/office/powerpoint/2010/main" Requires="p14">
+      <p:transition p14:dur="10"/>
+    </mc:Choice>
+    <mc:Fallback>
+      <p:transition/>
+    </mc:Fallback>
+  </mc:AlternateContent>
   <p:timing>
     <p:tnLst>
       <p:par>
@@ -12830,9 +12995,14 @@
   <p:clrMapOvr>
     <a:masterClrMapping/>
   </p:clrMapOvr>
-  <p:transition spd="slow">
-    <p:push dir="u"/>
-  </p:transition>
+  <mc:AlternateContent xmlns:mc="http://schemas.openxmlformats.org/markup-compatibility/2006">
+    <mc:Choice xmlns:p14="http://schemas.microsoft.com/office/powerpoint/2010/main" Requires="p14">
+      <p:transition p14:dur="10"/>
+    </mc:Choice>
+    <mc:Fallback>
+      <p:transition/>
+    </mc:Fallback>
+  </mc:AlternateContent>
   <p:timing>
     <p:tnLst>
       <p:par>
@@ -13184,9 +13354,14 @@
   <p:clrMapOvr>
     <a:masterClrMapping/>
   </p:clrMapOvr>
-  <p:transition spd="slow">
-    <p:push dir="u"/>
-  </p:transition>
+  <mc:AlternateContent xmlns:mc="http://schemas.openxmlformats.org/markup-compatibility/2006">
+    <mc:Choice xmlns:p14="http://schemas.microsoft.com/office/powerpoint/2010/main" Requires="p14">
+      <p:transition p14:dur="10"/>
+    </mc:Choice>
+    <mc:Fallback>
+      <p:transition/>
+    </mc:Fallback>
+  </mc:AlternateContent>
   <p:timing>
     <p:tnLst>
       <p:par>
@@ -13451,9 +13626,14 @@
   <p:clrMapOvr>
     <a:masterClrMapping/>
   </p:clrMapOvr>
-  <p:transition spd="slow">
-    <p:push dir="u"/>
-  </p:transition>
+  <mc:AlternateContent xmlns:mc="http://schemas.openxmlformats.org/markup-compatibility/2006">
+    <mc:Choice xmlns:p14="http://schemas.microsoft.com/office/powerpoint/2010/main" Requires="p14">
+      <p:transition p14:dur="10"/>
+    </mc:Choice>
+    <mc:Fallback>
+      <p:transition/>
+    </mc:Fallback>
+  </mc:AlternateContent>
   <p:timing>
     <p:tnLst>
       <p:par>
@@ -13717,9 +13897,14 @@
   <p:clrMapOvr>
     <a:masterClrMapping/>
   </p:clrMapOvr>
-  <p:transition spd="slow">
-    <p:push dir="u"/>
-  </p:transition>
+  <mc:AlternateContent xmlns:mc="http://schemas.openxmlformats.org/markup-compatibility/2006">
+    <mc:Choice xmlns:p14="http://schemas.microsoft.com/office/powerpoint/2010/main" Requires="p14">
+      <p:transition p14:dur="10"/>
+    </mc:Choice>
+    <mc:Fallback>
+      <p:transition/>
+    </mc:Fallback>
+  </mc:AlternateContent>
   <p:timing>
     <p:tnLst>
       <p:par>
@@ -13984,9 +14169,14 @@
   <p:clrMapOvr>
     <a:masterClrMapping/>
   </p:clrMapOvr>
-  <p:transition spd="slow">
-    <p:push dir="u"/>
-  </p:transition>
+  <mc:AlternateContent xmlns:mc="http://schemas.openxmlformats.org/markup-compatibility/2006">
+    <mc:Choice xmlns:p14="http://schemas.microsoft.com/office/powerpoint/2010/main" Requires="p14">
+      <p:transition p14:dur="10"/>
+    </mc:Choice>
+    <mc:Fallback>
+      <p:transition/>
+    </mc:Fallback>
+  </mc:AlternateContent>
   <p:timing>
     <p:tnLst>
       <p:par>
@@ -14238,9 +14428,14 @@
   <p:clrMapOvr>
     <a:masterClrMapping/>
   </p:clrMapOvr>
-  <p:transition spd="slow">
-    <p:push dir="u"/>
-  </p:transition>
+  <mc:AlternateContent xmlns:mc="http://schemas.openxmlformats.org/markup-compatibility/2006">
+    <mc:Choice xmlns:p14="http://schemas.microsoft.com/office/powerpoint/2010/main" Requires="p14">
+      <p:transition p14:dur="10"/>
+    </mc:Choice>
+    <mc:Fallback>
+      <p:transition/>
+    </mc:Fallback>
+  </mc:AlternateContent>
   <p:timing>
     <p:tnLst>
       <p:par>
@@ -15140,9 +15335,14 @@
   <p:clrMapOvr>
     <a:masterClrMapping/>
   </p:clrMapOvr>
-  <p:transition spd="slow">
-    <p:push dir="u"/>
-  </p:transition>
+  <mc:AlternateContent xmlns:mc="http://schemas.openxmlformats.org/markup-compatibility/2006">
+    <mc:Choice xmlns:p14="http://schemas.microsoft.com/office/powerpoint/2010/main" Requires="p14">
+      <p:transition p14:dur="10"/>
+    </mc:Choice>
+    <mc:Fallback>
+      <p:transition/>
+    </mc:Fallback>
+  </mc:AlternateContent>
   <p:timing>
     <p:tnLst>
       <p:par>
@@ -15394,9 +15594,14 @@
   <p:clrMapOvr>
     <a:masterClrMapping/>
   </p:clrMapOvr>
-  <p:transition spd="slow">
-    <p:push dir="u"/>
-  </p:transition>
+  <mc:AlternateContent xmlns:mc="http://schemas.openxmlformats.org/markup-compatibility/2006">
+    <mc:Choice xmlns:p14="http://schemas.microsoft.com/office/powerpoint/2010/main" Requires="p14">
+      <p:transition p14:dur="10"/>
+    </mc:Choice>
+    <mc:Fallback>
+      <p:transition/>
+    </mc:Fallback>
+  </mc:AlternateContent>
   <p:timing>
     <p:tnLst>
       <p:par>
@@ -16228,9 +16433,14 @@
   <p:clrMapOvr>
     <a:masterClrMapping/>
   </p:clrMapOvr>
-  <p:transition spd="slow">
-    <p:push dir="u"/>
-  </p:transition>
+  <mc:AlternateContent xmlns:mc="http://schemas.openxmlformats.org/markup-compatibility/2006">
+    <mc:Choice xmlns:p14="http://schemas.microsoft.com/office/powerpoint/2010/main" Requires="p14">
+      <p:transition p14:dur="10"/>
+    </mc:Choice>
+    <mc:Fallback>
+      <p:transition/>
+    </mc:Fallback>
+  </mc:AlternateContent>
   <p:timing>
     <p:tnLst>
       <p:par>
@@ -16482,9 +16692,14 @@
   <p:clrMapOvr>
     <a:masterClrMapping/>
   </p:clrMapOvr>
-  <p:transition spd="slow">
-    <p:push dir="u"/>
-  </p:transition>
+  <mc:AlternateContent xmlns:mc="http://schemas.openxmlformats.org/markup-compatibility/2006">
+    <mc:Choice xmlns:p14="http://schemas.microsoft.com/office/powerpoint/2010/main" Requires="p14">
+      <p:transition p14:dur="10"/>
+    </mc:Choice>
+    <mc:Fallback>
+      <p:transition/>
+    </mc:Fallback>
+  </mc:AlternateContent>
   <p:timing>
     <p:tnLst>
       <p:par>
@@ -17370,9 +17585,14 @@
   <p:clrMapOvr>
     <a:masterClrMapping/>
   </p:clrMapOvr>
-  <p:transition spd="slow">
-    <p:push dir="u"/>
-  </p:transition>
+  <mc:AlternateContent xmlns:mc="http://schemas.openxmlformats.org/markup-compatibility/2006">
+    <mc:Choice xmlns:p14="http://schemas.microsoft.com/office/powerpoint/2010/main" Requires="p14">
+      <p:transition p14:dur="10"/>
+    </mc:Choice>
+    <mc:Fallback>
+      <p:transition/>
+    </mc:Fallback>
+  </mc:AlternateContent>
   <p:timing>
     <p:tnLst>
       <p:par>
@@ -17713,9 +17933,14 @@
   <p:clrMapOvr>
     <a:masterClrMapping/>
   </p:clrMapOvr>
-  <p:transition spd="slow">
-    <p:push dir="u"/>
-  </p:transition>
+  <mc:AlternateContent xmlns:mc="http://schemas.openxmlformats.org/markup-compatibility/2006">
+    <mc:Choice xmlns:p14="http://schemas.microsoft.com/office/powerpoint/2010/main" Requires="p14">
+      <p:transition p14:dur="10"/>
+    </mc:Choice>
+    <mc:Fallback>
+      <p:transition/>
+    </mc:Fallback>
+  </mc:AlternateContent>
   <p:timing>
     <p:tnLst>
       <p:par>
@@ -17941,17 +18166,7 @@
                 <a:latin typeface="+mj-lt"/>
                 <a:cs typeface="Arial" charset="0"/>
               </a:rPr>
-              <a:t>La memorizzazione </a:t>
-            </a:r>
-            <a:r>
-              <a:rPr lang="it-IT" sz="3200" spc="-100" dirty="0" smtClean="0">
-                <a:ln w="3175">
-                  <a:noFill/>
-                </a:ln>
-                <a:latin typeface="+mj-lt"/>
-                <a:cs typeface="Arial" charset="0"/>
-              </a:rPr>
-              <a:t>della pianificazione di squadre </a:t>
+              <a:t>La memorizzazione della pianificazione di squadre </a:t>
             </a:r>
             <a:r>
               <a:rPr lang="it-IT" sz="3200" spc="-100" dirty="0">
@@ -18078,9 +18293,14 @@
   <p:clrMapOvr>
     <a:masterClrMapping/>
   </p:clrMapOvr>
-  <p:transition spd="slow">
-    <p:push dir="u"/>
-  </p:transition>
+  <mc:AlternateContent xmlns:mc="http://schemas.openxmlformats.org/markup-compatibility/2006">
+    <mc:Choice xmlns:p14="http://schemas.microsoft.com/office/powerpoint/2010/main" Requires="p14">
+      <p:transition p14:dur="10"/>
+    </mc:Choice>
+    <mc:Fallback>
+      <p:transition/>
+    </mc:Fallback>
+  </mc:AlternateContent>
   <p:timing>
     <p:tnLst>
       <p:par>
@@ -18619,17 +18839,7 @@
                 <a:latin typeface="+mj-lt"/>
                 <a:cs typeface="Arial" charset="0"/>
               </a:rPr>
-              <a:t> </a:t>
-            </a:r>
-            <a:r>
-              <a:rPr lang="it-IT" sz="2000" i="1" spc="-100" dirty="0" smtClean="0">
-                <a:ln w="3175">
-                  <a:noFill/>
-                </a:ln>
-                <a:latin typeface="+mj-lt"/>
-                <a:cs typeface="Arial" charset="0"/>
-              </a:rPr>
-              <a:t>Control </a:t>
+              <a:t> Control </a:t>
             </a:r>
             <a:r>
               <a:rPr lang="it-IT" sz="2000" i="1" spc="-100" dirty="0" err="1" smtClean="0">
@@ -18821,9 +19031,14 @@
   <p:clrMapOvr>
     <a:masterClrMapping/>
   </p:clrMapOvr>
-  <p:transition spd="slow">
-    <p:push dir="u"/>
-  </p:transition>
+  <mc:AlternateContent xmlns:mc="http://schemas.openxmlformats.org/markup-compatibility/2006">
+    <mc:Choice xmlns:p14="http://schemas.microsoft.com/office/powerpoint/2010/main" Requires="p14">
+      <p:transition p14:dur="10"/>
+    </mc:Choice>
+    <mc:Fallback>
+      <p:transition/>
+    </mc:Fallback>
+  </mc:AlternateContent>
   <p:timing>
     <p:tnLst>
       <p:par>
@@ -19220,33 +19435,7 @@
                 <a:latin typeface="+mj-lt"/>
                 <a:cs typeface="Arial" charset="0"/>
               </a:rPr>
-              <a:t>Strumenti – </a:t>
-            </a:r>
-            <a:r>
-              <a:rPr lang="it-IT" sz="3000" b="1" i="1" spc="-100" dirty="0" smtClean="0">
-                <a:ln w="3175">
-                  <a:noFill/>
-                </a:ln>
-                <a:solidFill>
-                  <a:srgbClr val="0072C6"/>
-                </a:solidFill>
-                <a:latin typeface="+mj-lt"/>
-                <a:cs typeface="Arial" charset="0"/>
-              </a:rPr>
-              <a:t>2 </a:t>
-            </a:r>
-            <a:r>
-              <a:rPr lang="it-IT" sz="3000" b="1" i="1" spc="-100" dirty="0" smtClean="0">
-                <a:ln w="3175">
-                  <a:noFill/>
-                </a:ln>
-                <a:solidFill>
-                  <a:srgbClr val="0072C6"/>
-                </a:solidFill>
-                <a:latin typeface="+mj-lt"/>
-                <a:cs typeface="Arial" charset="0"/>
-              </a:rPr>
-              <a:t>funzionamento sensore</a:t>
+              <a:t>Strumenti – 2 funzionamento sensore</a:t>
             </a:r>
             <a:endParaRPr lang="it-IT" sz="3000" b="1" i="1" spc="-100" dirty="0">
               <a:ln w="3175">
@@ -19571,9 +19760,14 @@
   <p:clrMapOvr>
     <a:masterClrMapping/>
   </p:clrMapOvr>
-  <p:transition spd="slow">
-    <p:push dir="u"/>
-  </p:transition>
+  <mc:AlternateContent xmlns:mc="http://schemas.openxmlformats.org/markup-compatibility/2006">
+    <mc:Choice xmlns:p14="http://schemas.microsoft.com/office/powerpoint/2010/main" Requires="p14">
+      <p:transition p14:dur="10"/>
+    </mc:Choice>
+    <mc:Fallback>
+      <p:transition/>
+    </mc:Fallback>
+  </mc:AlternateContent>
   <p:timing>
     <p:tnLst>
       <p:par>
@@ -19767,15 +19961,7 @@
                   <a:srgbClr val="0072C6"/>
                 </a:solidFill>
               </a:rPr>
-              <a:t>Strumenti - </a:t>
-            </a:r>
-            <a:r>
-              <a:rPr lang="it-IT" sz="3000" b="1" i="1" dirty="0" smtClean="0">
-                <a:solidFill>
-                  <a:srgbClr val="0072C6"/>
-                </a:solidFill>
-              </a:rPr>
-              <a:t>3</a:t>
+              <a:t>Strumenti - 3</a:t>
             </a:r>
             <a:endParaRPr lang="it-IT" sz="3000" b="1" i="1" dirty="0">
               <a:solidFill>
@@ -19979,9 +20165,14 @@
   <p:clrMapOvr>
     <a:masterClrMapping/>
   </p:clrMapOvr>
-  <p:transition spd="slow">
-    <p:push dir="u"/>
-  </p:transition>
+  <mc:AlternateContent xmlns:mc="http://schemas.openxmlformats.org/markup-compatibility/2006">
+    <mc:Choice xmlns:p14="http://schemas.microsoft.com/office/powerpoint/2010/main" Requires="p14">
+      <p:transition p14:dur="10"/>
+    </mc:Choice>
+    <mc:Fallback>
+      <p:transition/>
+    </mc:Fallback>
+  </mc:AlternateContent>
   <p:timing>
     <p:tnLst>
       <p:par>
@@ -20175,15 +20366,7 @@
                   <a:srgbClr val="0072C6"/>
                 </a:solidFill>
               </a:rPr>
-              <a:t>Strumenti - </a:t>
-            </a:r>
-            <a:r>
-              <a:rPr lang="it-IT" sz="3000" b="1" i="1" dirty="0" smtClean="0">
-                <a:solidFill>
-                  <a:srgbClr val="0072C6"/>
-                </a:solidFill>
-              </a:rPr>
-              <a:t>4</a:t>
+              <a:t>Strumenti - 4</a:t>
             </a:r>
             <a:endParaRPr lang="it-IT" sz="3000" b="1" i="1" dirty="0">
               <a:solidFill>
@@ -20358,9 +20541,14 @@
   <p:clrMapOvr>
     <a:masterClrMapping/>
   </p:clrMapOvr>
-  <p:transition spd="slow">
-    <p:push dir="u"/>
-  </p:transition>
+  <mc:AlternateContent xmlns:mc="http://schemas.openxmlformats.org/markup-compatibility/2006">
+    <mc:Choice xmlns:p14="http://schemas.microsoft.com/office/powerpoint/2010/main" Requires="p14">
+      <p:transition p14:dur="10"/>
+    </mc:Choice>
+    <mc:Fallback>
+      <p:transition/>
+    </mc:Fallback>
+  </mc:AlternateContent>
   <p:timing>
     <p:tnLst>
       <p:par>
@@ -20828,9 +21016,14 @@
   <p:clrMapOvr>
     <a:masterClrMapping/>
   </p:clrMapOvr>
-  <p:transition spd="slow">
-    <p:push dir="u"/>
-  </p:transition>
+  <mc:AlternateContent xmlns:mc="http://schemas.openxmlformats.org/markup-compatibility/2006">
+    <mc:Choice xmlns:p14="http://schemas.microsoft.com/office/powerpoint/2010/main" Requires="p14">
+      <p:transition p14:dur="10"/>
+    </mc:Choice>
+    <mc:Fallback>
+      <p:transition/>
+    </mc:Fallback>
+  </mc:AlternateContent>
   <p:timing>
     <p:tnLst>
       <p:par>
@@ -21263,9 +21456,14 @@
   <p:clrMapOvr>
     <a:masterClrMapping/>
   </p:clrMapOvr>
-  <p:transition spd="slow">
-    <p:push dir="u"/>
-  </p:transition>
+  <mc:AlternateContent xmlns:mc="http://schemas.openxmlformats.org/markup-compatibility/2006">
+    <mc:Choice xmlns:p14="http://schemas.microsoft.com/office/powerpoint/2010/main" Requires="p14">
+      <p:transition p14:dur="10"/>
+    </mc:Choice>
+    <mc:Fallback>
+      <p:transition/>
+    </mc:Fallback>
+  </mc:AlternateContent>
   <p:timing>
     <p:tnLst>
       <p:par>
@@ -21873,9 +22071,14 @@
   <p:clrMapOvr>
     <a:masterClrMapping/>
   </p:clrMapOvr>
-  <p:transition spd="slow">
-    <p:push dir="u"/>
-  </p:transition>
+  <mc:AlternateContent xmlns:mc="http://schemas.openxmlformats.org/markup-compatibility/2006">
+    <mc:Choice xmlns:p14="http://schemas.microsoft.com/office/powerpoint/2010/main" Requires="p14">
+      <p:transition p14:dur="10"/>
+    </mc:Choice>
+    <mc:Fallback>
+      <p:transition/>
+    </mc:Fallback>
+  </mc:AlternateContent>
   <p:timing>
     <p:tnLst>
       <p:par>
@@ -22158,9 +22361,14 @@
   <p:clrMapOvr>
     <a:masterClrMapping/>
   </p:clrMapOvr>
-  <p:transition spd="slow">
-    <p:push dir="u"/>
-  </p:transition>
+  <mc:AlternateContent xmlns:mc="http://schemas.openxmlformats.org/markup-compatibility/2006">
+    <mc:Choice xmlns:p14="http://schemas.microsoft.com/office/powerpoint/2010/main" Requires="p14">
+      <p:transition p14:dur="10"/>
+    </mc:Choice>
+    <mc:Fallback>
+      <p:transition/>
+    </mc:Fallback>
+  </mc:AlternateContent>
   <p:timing>
     <p:tnLst>
       <p:par>
@@ -22443,9 +22651,14 @@
   <p:clrMapOvr>
     <a:masterClrMapping/>
   </p:clrMapOvr>
-  <p:transition spd="slow">
-    <p:push dir="u"/>
-  </p:transition>
+  <mc:AlternateContent xmlns:mc="http://schemas.openxmlformats.org/markup-compatibility/2006">
+    <mc:Choice xmlns:p14="http://schemas.microsoft.com/office/powerpoint/2010/main" Requires="p14">
+      <p:transition p14:dur="10"/>
+    </mc:Choice>
+    <mc:Fallback>
+      <p:transition/>
+    </mc:Fallback>
+  </mc:AlternateContent>
   <p:timing>
     <p:tnLst>
       <p:par>
@@ -22728,9 +22941,14 @@
   <p:clrMapOvr>
     <a:masterClrMapping/>
   </p:clrMapOvr>
-  <p:transition spd="slow">
-    <p:push dir="u"/>
-  </p:transition>
+  <mc:AlternateContent xmlns:mc="http://schemas.openxmlformats.org/markup-compatibility/2006">
+    <mc:Choice xmlns:p14="http://schemas.microsoft.com/office/powerpoint/2010/main" Requires="p14">
+      <p:transition p14:dur="10"/>
+    </mc:Choice>
+    <mc:Fallback>
+      <p:transition/>
+    </mc:Fallback>
+  </mc:AlternateContent>
   <p:timing>
     <p:tnLst>
       <p:par>
@@ -23161,9 +23379,14 @@
   <p:clrMapOvr>
     <a:masterClrMapping/>
   </p:clrMapOvr>
-  <p:transition spd="slow">
-    <p:push dir="u"/>
-  </p:transition>
+  <mc:AlternateContent xmlns:mc="http://schemas.openxmlformats.org/markup-compatibility/2006">
+    <mc:Choice xmlns:p14="http://schemas.microsoft.com/office/powerpoint/2010/main" Requires="p14">
+      <p:transition p14:dur="10"/>
+    </mc:Choice>
+    <mc:Fallback>
+      <p:transition/>
+    </mc:Fallback>
+  </mc:AlternateContent>
   <p:timing>
     <p:tnLst>
       <p:par>
@@ -23446,9 +23669,14 @@
   <p:clrMapOvr>
     <a:masterClrMapping/>
   </p:clrMapOvr>
-  <p:transition spd="slow">
-    <p:push dir="u"/>
-  </p:transition>
+  <mc:AlternateContent xmlns:mc="http://schemas.openxmlformats.org/markup-compatibility/2006">
+    <mc:Choice xmlns:p14="http://schemas.microsoft.com/office/powerpoint/2010/main" Requires="p14">
+      <p:transition p14:dur="10"/>
+    </mc:Choice>
+    <mc:Fallback>
+      <p:transition/>
+    </mc:Fallback>
+  </mc:AlternateContent>
   <p:timing>
     <p:tnLst>
       <p:par>
@@ -23731,9 +23959,14 @@
   <p:clrMapOvr>
     <a:masterClrMapping/>
   </p:clrMapOvr>
-  <p:transition spd="slow">
-    <p:push dir="u"/>
-  </p:transition>
+  <mc:AlternateContent xmlns:mc="http://schemas.openxmlformats.org/markup-compatibility/2006">
+    <mc:Choice xmlns:p14="http://schemas.microsoft.com/office/powerpoint/2010/main" Requires="p14">
+      <p:transition p14:dur="10"/>
+    </mc:Choice>
+    <mc:Fallback>
+      <p:transition/>
+    </mc:Fallback>
+  </mc:AlternateContent>
   <p:timing>
     <p:tnLst>
       <p:par>
@@ -24016,9 +24249,14 @@
   <p:clrMapOvr>
     <a:masterClrMapping/>
   </p:clrMapOvr>
-  <p:transition spd="slow">
-    <p:push dir="u"/>
-  </p:transition>
+  <mc:AlternateContent xmlns:mc="http://schemas.openxmlformats.org/markup-compatibility/2006">
+    <mc:Choice xmlns:p14="http://schemas.microsoft.com/office/powerpoint/2010/main" Requires="p14">
+      <p:transition p14:dur="10"/>
+    </mc:Choice>
+    <mc:Fallback>
+      <p:transition/>
+    </mc:Fallback>
+  </mc:AlternateContent>
   <p:timing>
     <p:tnLst>
       <p:par>
@@ -24315,9 +24553,14 @@
   <p:clrMapOvr>
     <a:masterClrMapping/>
   </p:clrMapOvr>
-  <p:transition spd="slow">
-    <p:push dir="u"/>
-  </p:transition>
+  <mc:AlternateContent xmlns:mc="http://schemas.openxmlformats.org/markup-compatibility/2006">
+    <mc:Choice xmlns:p14="http://schemas.microsoft.com/office/powerpoint/2010/main" Requires="p14">
+      <p:transition p14:dur="10"/>
+    </mc:Choice>
+    <mc:Fallback>
+      <p:transition/>
+    </mc:Fallback>
+  </mc:AlternateContent>
   <p:timing>
     <p:tnLst>
       <p:par>
@@ -24600,9 +24843,14 @@
   <p:clrMapOvr>
     <a:masterClrMapping/>
   </p:clrMapOvr>
-  <p:transition spd="slow">
-    <p:push dir="u"/>
-  </p:transition>
+  <mc:AlternateContent xmlns:mc="http://schemas.openxmlformats.org/markup-compatibility/2006">
+    <mc:Choice xmlns:p14="http://schemas.microsoft.com/office/powerpoint/2010/main" Requires="p14">
+      <p:transition p14:dur="10"/>
+    </mc:Choice>
+    <mc:Fallback>
+      <p:transition/>
+    </mc:Fallback>
+  </mc:AlternateContent>
   <p:timing>
     <p:tnLst>
       <p:par>
@@ -24885,9 +25133,14 @@
   <p:clrMapOvr>
     <a:masterClrMapping/>
   </p:clrMapOvr>
-  <p:transition spd="slow">
-    <p:push dir="u"/>
-  </p:transition>
+  <mc:AlternateContent xmlns:mc="http://schemas.openxmlformats.org/markup-compatibility/2006">
+    <mc:Choice xmlns:p14="http://schemas.microsoft.com/office/powerpoint/2010/main" Requires="p14">
+      <p:transition p14:dur="10"/>
+    </mc:Choice>
+    <mc:Fallback>
+      <p:transition/>
+    </mc:Fallback>
+  </mc:AlternateContent>
   <p:timing>
     <p:tnLst>
       <p:par>
@@ -25141,9 +25394,14 @@
   <p:clrMapOvr>
     <a:masterClrMapping/>
   </p:clrMapOvr>
-  <p:transition spd="slow">
-    <p:push dir="u"/>
-  </p:transition>
+  <mc:AlternateContent xmlns:mc="http://schemas.openxmlformats.org/markup-compatibility/2006">
+    <mc:Choice xmlns:p14="http://schemas.microsoft.com/office/powerpoint/2010/main" Requires="p14">
+      <p:transition p14:dur="10"/>
+    </mc:Choice>
+    <mc:Fallback>
+      <p:transition/>
+    </mc:Fallback>
+  </mc:AlternateContent>
   <p:timing>
     <p:tnLst>
       <p:par>
@@ -26376,9 +26634,14 @@
   <p:clrMapOvr>
     <a:masterClrMapping/>
   </p:clrMapOvr>
-  <p:transition spd="slow">
-    <p:push dir="u"/>
-  </p:transition>
+  <mc:AlternateContent xmlns:mc="http://schemas.openxmlformats.org/markup-compatibility/2006">
+    <mc:Choice xmlns:p14="http://schemas.microsoft.com/office/powerpoint/2010/main" Requires="p14">
+      <p:transition p14:dur="10"/>
+    </mc:Choice>
+    <mc:Fallback>
+      <p:transition/>
+    </mc:Fallback>
+  </mc:AlternateContent>
   <p:timing>
     <p:tnLst>
       <p:par>
@@ -26661,9 +26924,14 @@
   <p:clrMapOvr>
     <a:masterClrMapping/>
   </p:clrMapOvr>
-  <p:transition spd="slow">
-    <p:push dir="u"/>
-  </p:transition>
+  <mc:AlternateContent xmlns:mc="http://schemas.openxmlformats.org/markup-compatibility/2006">
+    <mc:Choice xmlns:p14="http://schemas.microsoft.com/office/powerpoint/2010/main" Requires="p14">
+      <p:transition p14:dur="10"/>
+    </mc:Choice>
+    <mc:Fallback>
+      <p:transition/>
+    </mc:Fallback>
+  </mc:AlternateContent>
   <p:timing>
     <p:tnLst>
       <p:par>
@@ -26946,9 +27214,14 @@
   <p:clrMapOvr>
     <a:masterClrMapping/>
   </p:clrMapOvr>
-  <p:transition spd="slow">
-    <p:push dir="u"/>
-  </p:transition>
+  <mc:AlternateContent xmlns:mc="http://schemas.openxmlformats.org/markup-compatibility/2006">
+    <mc:Choice xmlns:p14="http://schemas.microsoft.com/office/powerpoint/2010/main" Requires="p14">
+      <p:transition p14:dur="10"/>
+    </mc:Choice>
+    <mc:Fallback>
+      <p:transition/>
+    </mc:Fallback>
+  </mc:AlternateContent>
   <p:timing>
     <p:tnLst>
       <p:par>
@@ -27404,9 +27677,14 @@
   <p:clrMapOvr>
     <a:masterClrMapping/>
   </p:clrMapOvr>
-  <p:transition spd="slow">
-    <p:push dir="u"/>
-  </p:transition>
+  <mc:AlternateContent xmlns:mc="http://schemas.openxmlformats.org/markup-compatibility/2006">
+    <mc:Choice xmlns:p14="http://schemas.microsoft.com/office/powerpoint/2010/main" Requires="p14">
+      <p:transition p14:dur="10"/>
+    </mc:Choice>
+    <mc:Fallback>
+      <p:transition/>
+    </mc:Fallback>
+  </mc:AlternateContent>
   <p:timing>
     <p:tnLst>
       <p:par>
@@ -27689,9 +27967,14 @@
   <p:clrMapOvr>
     <a:masterClrMapping/>
   </p:clrMapOvr>
-  <p:transition spd="slow">
-    <p:push dir="u"/>
-  </p:transition>
+  <mc:AlternateContent xmlns:mc="http://schemas.openxmlformats.org/markup-compatibility/2006">
+    <mc:Choice xmlns:p14="http://schemas.microsoft.com/office/powerpoint/2010/main" Requires="p14">
+      <p:transition p14:dur="10"/>
+    </mc:Choice>
+    <mc:Fallback>
+      <p:transition/>
+    </mc:Fallback>
+  </mc:AlternateContent>
   <p:timing>
     <p:tnLst>
       <p:par>
@@ -28731,9 +29014,14 @@
   <p:clrMapOvr>
     <a:masterClrMapping/>
   </p:clrMapOvr>
-  <p:transition spd="slow">
-    <p:push dir="u"/>
-  </p:transition>
+  <mc:AlternateContent xmlns:mc="http://schemas.openxmlformats.org/markup-compatibility/2006">
+    <mc:Choice xmlns:p14="http://schemas.microsoft.com/office/powerpoint/2010/main" Requires="p14">
+      <p:transition p14:dur="10"/>
+    </mc:Choice>
+    <mc:Fallback>
+      <p:transition/>
+    </mc:Fallback>
+  </mc:AlternateContent>
   <p:timing>
     <p:tnLst>
       <p:par>
@@ -29079,9 +29367,14 @@
   <p:clrMapOvr>
     <a:masterClrMapping/>
   </p:clrMapOvr>
-  <p:transition spd="slow">
-    <p:push dir="u"/>
-  </p:transition>
+  <mc:AlternateContent xmlns:mc="http://schemas.openxmlformats.org/markup-compatibility/2006">
+    <mc:Choice xmlns:p14="http://schemas.microsoft.com/office/powerpoint/2010/main" Requires="p14">
+      <p:transition p14:dur="10"/>
+    </mc:Choice>
+    <mc:Fallback>
+      <p:transition/>
+    </mc:Fallback>
+  </mc:AlternateContent>
   <p:timing>
     <p:tnLst>
       <p:par>
@@ -29607,9 +29900,14 @@
   <p:clrMapOvr>
     <a:masterClrMapping/>
   </p:clrMapOvr>
-  <p:transition spd="slow">
-    <p:push dir="u"/>
-  </p:transition>
+  <mc:AlternateContent xmlns:mc="http://schemas.openxmlformats.org/markup-compatibility/2006">
+    <mc:Choice xmlns:p14="http://schemas.microsoft.com/office/powerpoint/2010/main" Requires="p14">
+      <p:transition p14:dur="10"/>
+    </mc:Choice>
+    <mc:Fallback>
+      <p:transition/>
+    </mc:Fallback>
+  </mc:AlternateContent>
   <p:timing>
     <p:tnLst>
       <p:par>
@@ -29995,9 +30293,14 @@
   <p:clrMapOvr>
     <a:masterClrMapping/>
   </p:clrMapOvr>
-  <p:transition spd="slow">
-    <p:push dir="u"/>
-  </p:transition>
+  <mc:AlternateContent xmlns:mc="http://schemas.openxmlformats.org/markup-compatibility/2006">
+    <mc:Choice xmlns:p14="http://schemas.microsoft.com/office/powerpoint/2010/main" Requires="p14">
+      <p:transition p14:dur="10"/>
+    </mc:Choice>
+    <mc:Fallback>
+      <p:transition/>
+    </mc:Fallback>
+  </mc:AlternateContent>
   <p:timing>
     <p:tnLst>
       <p:par>
@@ -30525,9 +30828,14 @@
   <p:clrMapOvr>
     <a:masterClrMapping/>
   </p:clrMapOvr>
-  <p:transition spd="slow">
-    <p:push dir="u"/>
-  </p:transition>
+  <mc:AlternateContent xmlns:mc="http://schemas.openxmlformats.org/markup-compatibility/2006">
+    <mc:Choice xmlns:p14="http://schemas.microsoft.com/office/powerpoint/2010/main" Requires="p14">
+      <p:transition p14:dur="10"/>
+    </mc:Choice>
+    <mc:Fallback>
+      <p:transition/>
+    </mc:Fallback>
+  </mc:AlternateContent>
   <p:timing>
     <p:tnLst>
       <p:par>
@@ -31095,9 +31403,14 @@
   <p:clrMapOvr>
     <a:masterClrMapping/>
   </p:clrMapOvr>
-  <p:transition spd="slow">
-    <p:push dir="u"/>
-  </p:transition>
+  <mc:AlternateContent xmlns:mc="http://schemas.openxmlformats.org/markup-compatibility/2006">
+    <mc:Choice xmlns:p14="http://schemas.microsoft.com/office/powerpoint/2010/main" Requires="p14">
+      <p:transition p14:dur="10"/>
+    </mc:Choice>
+    <mc:Fallback>
+      <p:transition/>
+    </mc:Fallback>
+  </mc:AlternateContent>
   <p:timing>
     <p:tnLst>
       <p:par>
@@ -31418,9 +31731,14 @@
   <p:clrMapOvr>
     <a:masterClrMapping/>
   </p:clrMapOvr>
-  <p:transition spd="slow">
-    <p:push dir="u"/>
-  </p:transition>
+  <mc:AlternateContent xmlns:mc="http://schemas.openxmlformats.org/markup-compatibility/2006">
+    <mc:Choice xmlns:p14="http://schemas.microsoft.com/office/powerpoint/2010/main" Requires="p14">
+      <p:transition p14:dur="10"/>
+    </mc:Choice>
+    <mc:Fallback>
+      <p:transition/>
+    </mc:Fallback>
+  </mc:AlternateContent>
   <p:timing>
     <p:tnLst>
       <p:par>
@@ -31789,9 +32107,14 @@
   <p:clrMapOvr>
     <a:masterClrMapping/>
   </p:clrMapOvr>
-  <p:transition spd="slow">
-    <p:push dir="u"/>
-  </p:transition>
+  <mc:AlternateContent xmlns:mc="http://schemas.openxmlformats.org/markup-compatibility/2006">
+    <mc:Choice xmlns:p14="http://schemas.microsoft.com/office/powerpoint/2010/main" Requires="p14">
+      <p:transition p14:dur="10"/>
+    </mc:Choice>
+    <mc:Fallback>
+      <p:transition/>
+    </mc:Fallback>
+  </mc:AlternateContent>
   <p:timing>
     <p:tnLst>
       <p:par>
@@ -32064,9 +32387,14 @@
   <p:clrMapOvr>
     <a:masterClrMapping/>
   </p:clrMapOvr>
-  <p:transition spd="slow">
-    <p:push dir="u"/>
-  </p:transition>
+  <mc:AlternateContent xmlns:mc="http://schemas.openxmlformats.org/markup-compatibility/2006">
+    <mc:Choice xmlns:p14="http://schemas.microsoft.com/office/powerpoint/2010/main" Requires="p14">
+      <p:transition p14:dur="10"/>
+    </mc:Choice>
+    <mc:Fallback>
+      <p:transition/>
+    </mc:Fallback>
+  </mc:AlternateContent>
   <p:timing>
     <p:tnLst>
       <p:par>
@@ -32416,9 +32744,14 @@
   <p:clrMapOvr>
     <a:masterClrMapping/>
   </p:clrMapOvr>
-  <p:transition spd="slow">
-    <p:push dir="u"/>
-  </p:transition>
+  <mc:AlternateContent xmlns:mc="http://schemas.openxmlformats.org/markup-compatibility/2006">
+    <mc:Choice xmlns:p14="http://schemas.microsoft.com/office/powerpoint/2010/main" Requires="p14">
+      <p:transition p14:dur="10"/>
+    </mc:Choice>
+    <mc:Fallback>
+      <p:transition/>
+    </mc:Fallback>
+  </mc:AlternateContent>
   <p:timing>
     <p:tnLst>
       <p:par>
@@ -32763,9 +33096,14 @@
   <p:clrMapOvr>
     <a:masterClrMapping/>
   </p:clrMapOvr>
-  <p:transition spd="slow">
-    <p:push dir="u"/>
-  </p:transition>
+  <mc:AlternateContent xmlns:mc="http://schemas.openxmlformats.org/markup-compatibility/2006">
+    <mc:Choice xmlns:p14="http://schemas.microsoft.com/office/powerpoint/2010/main" Requires="p14">
+      <p:transition p14:dur="10"/>
+    </mc:Choice>
+    <mc:Fallback>
+      <p:transition/>
+    </mc:Fallback>
+  </mc:AlternateContent>
   <p:timing>
     <p:tnLst>
       <p:par>
@@ -33062,9 +33400,14 @@
   <p:clrMapOvr>
     <a:masterClrMapping/>
   </p:clrMapOvr>
-  <p:transition spd="slow">
-    <p:push dir="u"/>
-  </p:transition>
+  <mc:AlternateContent xmlns:mc="http://schemas.openxmlformats.org/markup-compatibility/2006">
+    <mc:Choice xmlns:p14="http://schemas.microsoft.com/office/powerpoint/2010/main" Requires="p14">
+      <p:transition p14:dur="10"/>
+    </mc:Choice>
+    <mc:Fallback>
+      <p:transition/>
+    </mc:Fallback>
+  </mc:AlternateContent>
   <p:timing>
     <p:tnLst>
       <p:par>
@@ -33495,9 +33838,14 @@
   <p:clrMapOvr>
     <a:masterClrMapping/>
   </p:clrMapOvr>
-  <p:transition spd="slow">
-    <p:push dir="u"/>
-  </p:transition>
+  <mc:AlternateContent xmlns:mc="http://schemas.openxmlformats.org/markup-compatibility/2006">
+    <mc:Choice xmlns:p14="http://schemas.microsoft.com/office/powerpoint/2010/main" Requires="p14">
+      <p:transition p14:dur="10"/>
+    </mc:Choice>
+    <mc:Fallback>
+      <p:transition/>
+    </mc:Fallback>
+  </mc:AlternateContent>
   <p:timing>
     <p:tnLst>
       <p:par>
@@ -33765,9 +34113,14 @@
   <p:clrMapOvr>
     <a:masterClrMapping/>
   </p:clrMapOvr>
-  <p:transition spd="slow">
-    <p:push dir="u"/>
-  </p:transition>
+  <mc:AlternateContent xmlns:mc="http://schemas.openxmlformats.org/markup-compatibility/2006">
+    <mc:Choice xmlns:p14="http://schemas.microsoft.com/office/powerpoint/2010/main" Requires="p14">
+      <p:transition p14:dur="10"/>
+    </mc:Choice>
+    <mc:Fallback>
+      <p:transition/>
+    </mc:Fallback>
+  </mc:AlternateContent>
   <p:timing>
     <p:tnLst>
       <p:par>
@@ -34048,9 +34401,14 @@
   <p:clrMapOvr>
     <a:masterClrMapping/>
   </p:clrMapOvr>
-  <p:transition spd="slow">
-    <p:push dir="u"/>
-  </p:transition>
+  <mc:AlternateContent xmlns:mc="http://schemas.openxmlformats.org/markup-compatibility/2006">
+    <mc:Choice xmlns:p14="http://schemas.microsoft.com/office/powerpoint/2010/main" Requires="p14">
+      <p:transition p14:dur="10"/>
+    </mc:Choice>
+    <mc:Fallback>
+      <p:transition/>
+    </mc:Fallback>
+  </mc:AlternateContent>
   <p:timing>
     <p:tnLst>
       <p:par>
@@ -34408,9 +34766,14 @@
   <p:clrMapOvr>
     <a:masterClrMapping/>
   </p:clrMapOvr>
-  <p:transition spd="slow">
-    <p:push dir="u"/>
-  </p:transition>
+  <mc:AlternateContent xmlns:mc="http://schemas.openxmlformats.org/markup-compatibility/2006">
+    <mc:Choice xmlns:p14="http://schemas.microsoft.com/office/powerpoint/2010/main" Requires="p14">
+      <p:transition p14:dur="10"/>
+    </mc:Choice>
+    <mc:Fallback>
+      <p:transition/>
+    </mc:Fallback>
+  </mc:AlternateContent>
   <p:timing>
     <p:tnLst>
       <p:par>
@@ -34796,9 +35159,14 @@
   <p:clrMapOvr>
     <a:masterClrMapping/>
   </p:clrMapOvr>
-  <p:transition spd="slow">
-    <p:push dir="u"/>
-  </p:transition>
+  <mc:AlternateContent xmlns:mc="http://schemas.openxmlformats.org/markup-compatibility/2006">
+    <mc:Choice xmlns:p14="http://schemas.microsoft.com/office/powerpoint/2010/main" Requires="p14">
+      <p:transition p14:dur="10"/>
+    </mc:Choice>
+    <mc:Fallback>
+      <p:transition/>
+    </mc:Fallback>
+  </mc:AlternateContent>
   <p:timing>
     <p:tnLst>
       <p:par>
@@ -35162,9 +35530,14 @@
   <p:clrMapOvr>
     <a:masterClrMapping/>
   </p:clrMapOvr>
-  <p:transition spd="slow">
-    <p:push dir="u"/>
-  </p:transition>
+  <mc:AlternateContent xmlns:mc="http://schemas.openxmlformats.org/markup-compatibility/2006">
+    <mc:Choice xmlns:p14="http://schemas.microsoft.com/office/powerpoint/2010/main" Requires="p14">
+      <p:transition p14:dur="10"/>
+    </mc:Choice>
+    <mc:Fallback>
+      <p:transition/>
+    </mc:Fallback>
+  </mc:AlternateContent>
   <p:timing>
     <p:tnLst>
       <p:par>
@@ -35627,9 +36000,14 @@
   <p:clrMapOvr>
     <a:masterClrMapping/>
   </p:clrMapOvr>
-  <p:transition spd="slow">
-    <p:push dir="u"/>
-  </p:transition>
+  <mc:AlternateContent xmlns:mc="http://schemas.openxmlformats.org/markup-compatibility/2006">
+    <mc:Choice xmlns:p14="http://schemas.microsoft.com/office/powerpoint/2010/main" Requires="p14">
+      <p:transition p14:dur="10"/>
+    </mc:Choice>
+    <mc:Fallback>
+      <p:transition/>
+    </mc:Fallback>
+  </mc:AlternateContent>
   <p:timing>
     <p:tnLst>
       <p:par>
@@ -36185,9 +36563,14 @@
   <p:clrMapOvr>
     <a:masterClrMapping/>
   </p:clrMapOvr>
-  <p:transition spd="slow">
-    <p:push dir="u"/>
-  </p:transition>
+  <mc:AlternateContent xmlns:mc="http://schemas.openxmlformats.org/markup-compatibility/2006">
+    <mc:Choice xmlns:p14="http://schemas.microsoft.com/office/powerpoint/2010/main" Requires="p14">
+      <p:transition p14:dur="10"/>
+    </mc:Choice>
+    <mc:Fallback>
+      <p:transition/>
+    </mc:Fallback>
+  </mc:AlternateContent>
   <p:timing>
     <p:tnLst>
       <p:par>
@@ -36393,27 +36776,7 @@
                 <a:latin typeface="+mj-lt"/>
                 <a:cs typeface="Arial" charset="0"/>
               </a:rPr>
-              <a:t>I sensori idrici inviano i dati rilevati ogni ora </a:t>
-            </a:r>
-            <a:r>
-              <a:rPr lang="it-IT" sz="3200" spc="-100" dirty="0" smtClean="0">
-                <a:ln w="3175">
-                  <a:noFill/>
-                </a:ln>
-                <a:latin typeface="+mj-lt"/>
-                <a:cs typeface="Arial" charset="0"/>
-              </a:rPr>
-              <a:t>(tutti i </a:t>
-            </a:r>
-            <a:r>
-              <a:rPr lang="it-IT" sz="3200" spc="-100" dirty="0" smtClean="0">
-                <a:ln w="3175">
-                  <a:noFill/>
-                </a:ln>
-                <a:latin typeface="+mj-lt"/>
-                <a:cs typeface="Arial" charset="0"/>
-              </a:rPr>
-              <a:t>sensori sono sincronizzati).</a:t>
+              <a:t>I sensori idrici inviano i dati rilevati ogni ora (tutti i sensori sono sincronizzati).</a:t>
             </a:r>
           </a:p>
           <a:p>
@@ -36530,9 +36893,14 @@
   <p:clrMapOvr>
     <a:masterClrMapping/>
   </p:clrMapOvr>
-  <p:transition spd="slow">
-    <p:push dir="u"/>
-  </p:transition>
+  <mc:AlternateContent xmlns:mc="http://schemas.openxmlformats.org/markup-compatibility/2006">
+    <mc:Choice xmlns:p14="http://schemas.microsoft.com/office/powerpoint/2010/main" Requires="p14">
+      <p:transition p14:dur="10"/>
+    </mc:Choice>
+    <mc:Fallback>
+      <p:transition/>
+    </mc:Fallback>
+  </mc:AlternateContent>
   <p:timing>
     <p:tnLst>
       <p:par>
@@ -37065,9 +37433,14 @@
   <p:clrMapOvr>
     <a:masterClrMapping/>
   </p:clrMapOvr>
-  <p:transition spd="slow">
-    <p:push dir="u"/>
-  </p:transition>
+  <mc:AlternateContent xmlns:mc="http://schemas.openxmlformats.org/markup-compatibility/2006">
+    <mc:Choice xmlns:p14="http://schemas.microsoft.com/office/powerpoint/2010/main" Requires="p14">
+      <p:transition p14:dur="10"/>
+    </mc:Choice>
+    <mc:Fallback>
+      <p:transition/>
+    </mc:Fallback>
+  </mc:AlternateContent>
   <p:timing>
     <p:tnLst>
       <p:par>
@@ -37640,9 +38013,14 @@
   <p:clrMapOvr>
     <a:masterClrMapping/>
   </p:clrMapOvr>
-  <p:transition spd="slow">
-    <p:push dir="u"/>
-  </p:transition>
+  <mc:AlternateContent xmlns:mc="http://schemas.openxmlformats.org/markup-compatibility/2006">
+    <mc:Choice xmlns:p14="http://schemas.microsoft.com/office/powerpoint/2010/main" Requires="p14">
+      <p:transition p14:dur="10"/>
+    </mc:Choice>
+    <mc:Fallback>
+      <p:transition/>
+    </mc:Fallback>
+  </mc:AlternateContent>
   <p:timing>
     <p:tnLst>
       <p:par>
@@ -38178,9 +38556,14 @@
   <p:clrMapOvr>
     <a:masterClrMapping/>
   </p:clrMapOvr>
-  <p:transition spd="slow">
-    <p:push dir="u"/>
-  </p:transition>
+  <mc:AlternateContent xmlns:mc="http://schemas.openxmlformats.org/markup-compatibility/2006">
+    <mc:Choice xmlns:p14="http://schemas.microsoft.com/office/powerpoint/2010/main" Requires="p14">
+      <p:transition p14:dur="10"/>
+    </mc:Choice>
+    <mc:Fallback>
+      <p:transition/>
+    </mc:Fallback>
+  </mc:AlternateContent>
   <p:timing>
     <p:tnLst>
       <p:par>
@@ -38606,9 +38989,14 @@
   <p:clrMapOvr>
     <a:masterClrMapping/>
   </p:clrMapOvr>
-  <p:transition spd="slow">
-    <p:push dir="u"/>
-  </p:transition>
+  <mc:AlternateContent xmlns:mc="http://schemas.openxmlformats.org/markup-compatibility/2006">
+    <mc:Choice xmlns:p14="http://schemas.microsoft.com/office/powerpoint/2010/main" Requires="p14">
+      <p:transition p14:dur="10"/>
+    </mc:Choice>
+    <mc:Fallback>
+      <p:transition/>
+    </mc:Fallback>
+  </mc:AlternateContent>
   <p:timing>
     <p:tnLst>
       <p:par>
@@ -39104,9 +39492,14 @@
   <p:clrMapOvr>
     <a:masterClrMapping/>
   </p:clrMapOvr>
-  <p:transition spd="slow">
-    <p:push dir="u"/>
-  </p:transition>
+  <mc:AlternateContent xmlns:mc="http://schemas.openxmlformats.org/markup-compatibility/2006">
+    <mc:Choice xmlns:p14="http://schemas.microsoft.com/office/powerpoint/2010/main" Requires="p14">
+      <p:transition p14:dur="10"/>
+    </mc:Choice>
+    <mc:Fallback>
+      <p:transition/>
+    </mc:Fallback>
+  </mc:AlternateContent>
   <p:timing>
     <p:tnLst>
       <p:par>
@@ -39500,9 +39893,14 @@
   <p:clrMapOvr>
     <a:masterClrMapping/>
   </p:clrMapOvr>
-  <p:transition spd="slow">
-    <p:push dir="u"/>
-  </p:transition>
+  <mc:AlternateContent xmlns:mc="http://schemas.openxmlformats.org/markup-compatibility/2006">
+    <mc:Choice xmlns:p14="http://schemas.microsoft.com/office/powerpoint/2010/main" Requires="p14">
+      <p:transition p14:dur="10"/>
+    </mc:Choice>
+    <mc:Fallback>
+      <p:transition/>
+    </mc:Fallback>
+  </mc:AlternateContent>
   <p:timing>
     <p:tnLst>
       <p:par>
@@ -40032,9 +40430,14 @@
   <p:clrMapOvr>
     <a:masterClrMapping/>
   </p:clrMapOvr>
-  <p:transition spd="slow">
-    <p:push dir="u"/>
-  </p:transition>
+  <mc:AlternateContent xmlns:mc="http://schemas.openxmlformats.org/markup-compatibility/2006">
+    <mc:Choice xmlns:p14="http://schemas.microsoft.com/office/powerpoint/2010/main" Requires="p14">
+      <p:transition p14:dur="10"/>
+    </mc:Choice>
+    <mc:Fallback>
+      <p:transition/>
+    </mc:Fallback>
+  </mc:AlternateContent>
   <p:timing>
     <p:tnLst>
       <p:par>
@@ -40529,9 +40932,14 @@
   <p:clrMapOvr>
     <a:masterClrMapping/>
   </p:clrMapOvr>
-  <p:transition spd="slow">
-    <p:push dir="u"/>
-  </p:transition>
+  <mc:AlternateContent xmlns:mc="http://schemas.openxmlformats.org/markup-compatibility/2006">
+    <mc:Choice xmlns:p14="http://schemas.microsoft.com/office/powerpoint/2010/main" Requires="p14">
+      <p:transition p14:dur="10"/>
+    </mc:Choice>
+    <mc:Fallback>
+      <p:transition/>
+    </mc:Fallback>
+  </mc:AlternateContent>
   <p:timing>
     <p:tnLst>
       <p:par>
@@ -40661,11 +41069,6 @@
               </a:rPr>
               <a:t>Evoluzioni future</a:t>
             </a:r>
-            <a:endParaRPr lang="it-IT" b="1" dirty="0" smtClean="0">
-              <a:solidFill>
-                <a:srgbClr val="0072C6"/>
-              </a:solidFill>
-            </a:endParaRPr>
           </a:p>
           <a:p>
             <a:endParaRPr lang="it-IT" sz="1500" b="1" i="1" dirty="0" smtClean="0">
@@ -40954,13 +41357,6 @@
               </a:rPr>
               <a:t>  </a:t>
             </a:r>
-            <a:endParaRPr lang="it-IT" sz="2800" spc="-100" dirty="0" smtClean="0">
-              <a:ln w="3175">
-                <a:noFill/>
-              </a:ln>
-              <a:latin typeface="+mj-lt"/>
-              <a:cs typeface="Arial" charset="0"/>
-            </a:endParaRPr>
           </a:p>
         </p:txBody>
       </p:sp>
@@ -40974,9 +41370,14 @@
   <p:clrMapOvr>
     <a:masterClrMapping/>
   </p:clrMapOvr>
-  <p:transition spd="slow">
-    <p:push dir="u"/>
-  </p:transition>
+  <mc:AlternateContent xmlns:mc="http://schemas.openxmlformats.org/markup-compatibility/2006">
+    <mc:Choice xmlns:p14="http://schemas.microsoft.com/office/powerpoint/2010/main" Requires="p14">
+      <p:transition p14:dur="10"/>
+    </mc:Choice>
+    <mc:Fallback>
+      <p:transition/>
+    </mc:Fallback>
+  </mc:AlternateContent>
   <p:timing>
     <p:tnLst>
       <p:par>
@@ -41043,12 +41444,6 @@
               </a:rPr>
               <a:t>The End</a:t>
             </a:r>
-            <a:endParaRPr lang="it-IT" sz="6000" b="1" dirty="0" smtClean="0">
-              <a:solidFill>
-                <a:schemeClr val="bg1"/>
-              </a:solidFill>
-              <a:latin typeface="Segoe UI Light" panose="020B0502040204020203" pitchFamily="34" charset="0"/>
-            </a:endParaRPr>
           </a:p>
         </p:txBody>
       </p:sp>
@@ -41062,9 +41457,14 @@
   <p:clrMapOvr>
     <a:masterClrMapping/>
   </p:clrMapOvr>
-  <p:transition spd="slow">
-    <p:push dir="u"/>
-  </p:transition>
+  <mc:AlternateContent xmlns:mc="http://schemas.openxmlformats.org/markup-compatibility/2006">
+    <mc:Choice xmlns:p14="http://schemas.microsoft.com/office/powerpoint/2010/main" Requires="p14">
+      <p:transition p14:dur="10"/>
+    </mc:Choice>
+    <mc:Fallback>
+      <p:transition/>
+    </mc:Fallback>
+  </mc:AlternateContent>
   <p:timing>
     <p:tnLst>
       <p:par>
@@ -41447,9 +41847,14 @@
   <p:clrMapOvr>
     <a:masterClrMapping/>
   </p:clrMapOvr>
-  <p:transition spd="slow">
-    <p:push dir="u"/>
-  </p:transition>
+  <mc:AlternateContent xmlns:mc="http://schemas.openxmlformats.org/markup-compatibility/2006">
+    <mc:Choice xmlns:p14="http://schemas.microsoft.com/office/powerpoint/2010/main" Requires="p14">
+      <p:transition p14:dur="10"/>
+    </mc:Choice>
+    <mc:Fallback>
+      <p:transition/>
+    </mc:Fallback>
+  </mc:AlternateContent>
   <p:timing>
     <p:tnLst>
       <p:par>

</xml_diff>

<commit_message>
Presentazione VDI DWH imgs
</commit_message>
<xml_diff>
--- a/Febbraio 2015.pptx
+++ b/Febbraio 2015.pptx
@@ -205,7 +205,7 @@
   </p:defaultTextStyle>
   <p:extLst>
     <p:ext uri="{EFAFB233-063F-42B5-8137-9DF3F51BA10A}">
-      <p15:sldGuideLst xmlns:p15="http://schemas.microsoft.com/office/powerpoint/2012/main" xmlns="">
+      <p15:sldGuideLst xmlns:p15="http://schemas.microsoft.com/office/powerpoint/2012/main">
         <p15:guide id="1" orient="horz" pos="2160">
           <p15:clr>
             <a:srgbClr val="A4A3A4"/>
@@ -301,28 +301,28 @@
                 <c:formatCode>General</c:formatCode>
                 <c:ptCount val="8"/>
                 <c:pt idx="0">
-                  <c:v>10.0</c:v>
+                  <c:v>10</c:v>
                 </c:pt>
                 <c:pt idx="1">
-                  <c:v>80.0</c:v>
+                  <c:v>80</c:v>
                 </c:pt>
                 <c:pt idx="2">
-                  <c:v>20.0</c:v>
+                  <c:v>20</c:v>
                 </c:pt>
                 <c:pt idx="3">
-                  <c:v>10.0</c:v>
+                  <c:v>10</c:v>
                 </c:pt>
                 <c:pt idx="4">
-                  <c:v>30.0</c:v>
+                  <c:v>30</c:v>
                 </c:pt>
                 <c:pt idx="5">
-                  <c:v>100.0</c:v>
+                  <c:v>100</c:v>
                 </c:pt>
                 <c:pt idx="6">
-                  <c:v>100.0</c:v>
+                  <c:v>100</c:v>
                 </c:pt>
                 <c:pt idx="7">
-                  <c:v>0.0</c:v>
+                  <c:v>0</c:v>
                 </c:pt>
               </c:numCache>
             </c:numRef>
@@ -336,11 +336,11 @@
           <c:showPercent val="0"/>
           <c:showBubbleSize val="0"/>
         </c:dLbls>
-        <c:axId val="-2073803864"/>
-        <c:axId val="-2073800296"/>
+        <c:axId val="149734944"/>
+        <c:axId val="149735504"/>
       </c:radarChart>
       <c:catAx>
-        <c:axId val="-2073803864"/>
+        <c:axId val="149734944"/>
         <c:scaling>
           <c:orientation val="minMax"/>
         </c:scaling>
@@ -383,7 +383,7 @@
             <a:endParaRPr lang="it-IT"/>
           </a:p>
         </c:txPr>
-        <c:crossAx val="-2073800296"/>
+        <c:crossAx val="149735504"/>
         <c:crosses val="autoZero"/>
         <c:auto val="1"/>
         <c:lblAlgn val="ctr"/>
@@ -391,7 +391,7 @@
         <c:noMultiLvlLbl val="0"/>
       </c:catAx>
       <c:valAx>
-        <c:axId val="-2073800296"/>
+        <c:axId val="149735504"/>
         <c:scaling>
           <c:orientation val="minMax"/>
         </c:scaling>
@@ -441,10 +441,10 @@
             <a:endParaRPr lang="it-IT"/>
           </a:p>
         </c:txPr>
-        <c:crossAx val="-2073803864"/>
+        <c:crossAx val="149734944"/>
         <c:crosses val="autoZero"/>
         <c:crossBetween val="between"/>
-        <c:majorUnit val="10.0"/>
+        <c:majorUnit val="10"/>
       </c:valAx>
       <c:spPr>
         <a:noFill/>
@@ -475,7 +475,7 @@
       <a:endParaRPr lang="it-IT"/>
     </a:p>
   </c:txPr>
-  <c:externalData r:id="rId1">
+  <c:externalData r:id="rId3">
     <c:autoUpdate val="0"/>
   </c:externalData>
 </c:chartSpace>
@@ -502,10 +502,10 @@
           <c:layoutTarget val="inner"/>
           <c:xMode val="edge"/>
           <c:yMode val="edge"/>
-          <c:x val="0.258684388589357"/>
-          <c:y val="0.0738863413190105"/>
-          <c:w val="0.46511599843123"/>
-          <c:h val="0.844278982788413"/>
+          <c:x val="0.25868438858935699"/>
+          <c:y val="7.3886341319010507E-2"/>
+          <c:w val="0.46511599843123003"/>
+          <c:h val="0.84427898278841296"/>
         </c:manualLayout>
       </c:layout>
       <c:radarChart>
@@ -562,28 +562,28 @@
                 <c:formatCode>General</c:formatCode>
                 <c:ptCount val="8"/>
                 <c:pt idx="0">
-                  <c:v>10.0</c:v>
+                  <c:v>10</c:v>
                 </c:pt>
                 <c:pt idx="1">
-                  <c:v>10.0</c:v>
+                  <c:v>10</c:v>
                 </c:pt>
                 <c:pt idx="2">
-                  <c:v>20.0</c:v>
+                  <c:v>20</c:v>
                 </c:pt>
                 <c:pt idx="3">
-                  <c:v>10.0</c:v>
+                  <c:v>10</c:v>
                 </c:pt>
                 <c:pt idx="4">
-                  <c:v>30.0</c:v>
+                  <c:v>30</c:v>
                 </c:pt>
                 <c:pt idx="5">
-                  <c:v>100.0</c:v>
+                  <c:v>100</c:v>
                 </c:pt>
                 <c:pt idx="6">
-                  <c:v>60.0</c:v>
+                  <c:v>60</c:v>
                 </c:pt>
                 <c:pt idx="7">
-                  <c:v>50.0</c:v>
+                  <c:v>50</c:v>
                 </c:pt>
               </c:numCache>
             </c:numRef>
@@ -597,11 +597,11 @@
           <c:showPercent val="0"/>
           <c:showBubbleSize val="0"/>
         </c:dLbls>
-        <c:axId val="-2073371672"/>
-        <c:axId val="-2073368024"/>
+        <c:axId val="149737744"/>
+        <c:axId val="149738304"/>
       </c:radarChart>
       <c:catAx>
-        <c:axId val="-2073371672"/>
+        <c:axId val="149737744"/>
         <c:scaling>
           <c:orientation val="minMax"/>
         </c:scaling>
@@ -644,7 +644,7 @@
             <a:endParaRPr lang="it-IT"/>
           </a:p>
         </c:txPr>
-        <c:crossAx val="-2073368024"/>
+        <c:crossAx val="149738304"/>
         <c:crosses val="autoZero"/>
         <c:auto val="1"/>
         <c:lblAlgn val="ctr"/>
@@ -652,7 +652,7 @@
         <c:noMultiLvlLbl val="0"/>
       </c:catAx>
       <c:valAx>
-        <c:axId val="-2073368024"/>
+        <c:axId val="149738304"/>
         <c:scaling>
           <c:orientation val="minMax"/>
         </c:scaling>
@@ -702,10 +702,10 @@
             <a:endParaRPr lang="it-IT"/>
           </a:p>
         </c:txPr>
-        <c:crossAx val="-2073371672"/>
+        <c:crossAx val="149737744"/>
         <c:crosses val="autoZero"/>
         <c:crossBetween val="between"/>
-        <c:majorUnit val="10.0"/>
+        <c:majorUnit val="10"/>
       </c:valAx>
       <c:spPr>
         <a:noFill/>
@@ -736,7 +736,7 @@
       <a:endParaRPr lang="it-IT"/>
     </a:p>
   </c:txPr>
-  <c:externalData r:id="rId1">
+  <c:externalData r:id="rId3">
     <c:autoUpdate val="0"/>
   </c:externalData>
 </c:chartSpace>
@@ -813,28 +813,28 @@
                 <c:formatCode>General</c:formatCode>
                 <c:ptCount val="8"/>
                 <c:pt idx="0">
-                  <c:v>10.0</c:v>
+                  <c:v>10</c:v>
                 </c:pt>
                 <c:pt idx="1">
-                  <c:v>30.0</c:v>
+                  <c:v>30</c:v>
                 </c:pt>
                 <c:pt idx="2">
-                  <c:v>20.0</c:v>
+                  <c:v>20</c:v>
                 </c:pt>
                 <c:pt idx="3">
-                  <c:v>10.0</c:v>
+                  <c:v>10</c:v>
                 </c:pt>
                 <c:pt idx="4">
-                  <c:v>30.0</c:v>
+                  <c:v>30</c:v>
                 </c:pt>
                 <c:pt idx="5">
-                  <c:v>30.0</c:v>
+                  <c:v>30</c:v>
                 </c:pt>
                 <c:pt idx="6">
-                  <c:v>60.0</c:v>
+                  <c:v>60</c:v>
                 </c:pt>
                 <c:pt idx="7">
-                  <c:v>20.0</c:v>
+                  <c:v>20</c:v>
                 </c:pt>
               </c:numCache>
             </c:numRef>
@@ -848,11 +848,11 @@
           <c:showPercent val="0"/>
           <c:showBubbleSize val="0"/>
         </c:dLbls>
-        <c:axId val="-2073063432"/>
-        <c:axId val="-2073059768"/>
+        <c:axId val="149740544"/>
+        <c:axId val="149741104"/>
       </c:radarChart>
       <c:catAx>
-        <c:axId val="-2073063432"/>
+        <c:axId val="149740544"/>
         <c:scaling>
           <c:orientation val="minMax"/>
         </c:scaling>
@@ -895,7 +895,7 @@
             <a:endParaRPr lang="it-IT"/>
           </a:p>
         </c:txPr>
-        <c:crossAx val="-2073059768"/>
+        <c:crossAx val="149741104"/>
         <c:crosses val="autoZero"/>
         <c:auto val="1"/>
         <c:lblAlgn val="ctr"/>
@@ -903,10 +903,10 @@
         <c:noMultiLvlLbl val="0"/>
       </c:catAx>
       <c:valAx>
-        <c:axId val="-2073059768"/>
+        <c:axId val="149741104"/>
         <c:scaling>
           <c:orientation val="minMax"/>
-          <c:max val="100.0"/>
+          <c:max val="100"/>
         </c:scaling>
         <c:delete val="0"/>
         <c:axPos val="l"/>
@@ -954,10 +954,10 @@
             <a:endParaRPr lang="it-IT"/>
           </a:p>
         </c:txPr>
-        <c:crossAx val="-2073063432"/>
+        <c:crossAx val="149740544"/>
         <c:crosses val="autoZero"/>
         <c:crossBetween val="between"/>
-        <c:majorUnit val="10.0"/>
+        <c:majorUnit val="10"/>
       </c:valAx>
       <c:spPr>
         <a:noFill/>
@@ -988,7 +988,7 @@
       <a:endParaRPr lang="it-IT"/>
     </a:p>
   </c:txPr>
-  <c:externalData r:id="rId1">
+  <c:externalData r:id="rId3">
     <c:autoUpdate val="0"/>
   </c:externalData>
 </c:chartSpace>
@@ -1073,28 +1073,28 @@
                 <c:formatCode>General</c:formatCode>
                 <c:ptCount val="8"/>
                 <c:pt idx="0">
-                  <c:v>10.0</c:v>
+                  <c:v>10</c:v>
                 </c:pt>
                 <c:pt idx="1">
-                  <c:v>80.0</c:v>
+                  <c:v>80</c:v>
                 </c:pt>
                 <c:pt idx="2">
-                  <c:v>20.0</c:v>
+                  <c:v>20</c:v>
                 </c:pt>
                 <c:pt idx="3">
-                  <c:v>10.0</c:v>
+                  <c:v>10</c:v>
                 </c:pt>
                 <c:pt idx="4">
-                  <c:v>30.0</c:v>
+                  <c:v>30</c:v>
                 </c:pt>
                 <c:pt idx="5">
-                  <c:v>100.0</c:v>
+                  <c:v>100</c:v>
                 </c:pt>
                 <c:pt idx="6">
-                  <c:v>100.0</c:v>
+                  <c:v>100</c:v>
                 </c:pt>
                 <c:pt idx="7">
-                  <c:v>0.0</c:v>
+                  <c:v>0</c:v>
                 </c:pt>
               </c:numCache>
             </c:numRef>
@@ -1159,28 +1159,28 @@
                 <c:formatCode>General</c:formatCode>
                 <c:ptCount val="8"/>
                 <c:pt idx="0">
-                  <c:v>10.0</c:v>
+                  <c:v>10</c:v>
                 </c:pt>
                 <c:pt idx="1">
-                  <c:v>10.0</c:v>
+                  <c:v>10</c:v>
                 </c:pt>
                 <c:pt idx="2">
-                  <c:v>20.0</c:v>
+                  <c:v>20</c:v>
                 </c:pt>
                 <c:pt idx="3">
-                  <c:v>10.0</c:v>
+                  <c:v>10</c:v>
                 </c:pt>
                 <c:pt idx="4">
-                  <c:v>30.0</c:v>
+                  <c:v>30</c:v>
                 </c:pt>
                 <c:pt idx="5">
-                  <c:v>100.0</c:v>
+                  <c:v>100</c:v>
                 </c:pt>
                 <c:pt idx="6">
-                  <c:v>60.0</c:v>
+                  <c:v>60</c:v>
                 </c:pt>
                 <c:pt idx="7">
-                  <c:v>50.0</c:v>
+                  <c:v>50</c:v>
                 </c:pt>
               </c:numCache>
             </c:numRef>
@@ -1245,28 +1245,28 @@
                 <c:formatCode>General</c:formatCode>
                 <c:ptCount val="8"/>
                 <c:pt idx="0">
-                  <c:v>10.0</c:v>
+                  <c:v>10</c:v>
                 </c:pt>
                 <c:pt idx="1">
-                  <c:v>30.0</c:v>
+                  <c:v>30</c:v>
                 </c:pt>
                 <c:pt idx="2">
-                  <c:v>20.0</c:v>
+                  <c:v>20</c:v>
                 </c:pt>
                 <c:pt idx="3">
-                  <c:v>10.0</c:v>
+                  <c:v>10</c:v>
                 </c:pt>
                 <c:pt idx="4">
-                  <c:v>30.0</c:v>
+                  <c:v>30</c:v>
                 </c:pt>
                 <c:pt idx="5">
-                  <c:v>30.0</c:v>
+                  <c:v>30</c:v>
                 </c:pt>
                 <c:pt idx="6">
-                  <c:v>60.0</c:v>
+                  <c:v>60</c:v>
                 </c:pt>
                 <c:pt idx="7">
-                  <c:v>20.0</c:v>
+                  <c:v>20</c:v>
                 </c:pt>
               </c:numCache>
             </c:numRef>
@@ -1280,11 +1280,11 @@
           <c:showPercent val="0"/>
           <c:showBubbleSize val="0"/>
         </c:dLbls>
-        <c:axId val="-2078310216"/>
-        <c:axId val="-2078823656"/>
+        <c:axId val="149744464"/>
+        <c:axId val="149745024"/>
       </c:radarChart>
       <c:catAx>
-        <c:axId val="-2078310216"/>
+        <c:axId val="149744464"/>
         <c:scaling>
           <c:orientation val="minMax"/>
         </c:scaling>
@@ -1327,7 +1327,7 @@
             <a:endParaRPr lang="it-IT"/>
           </a:p>
         </c:txPr>
-        <c:crossAx val="-2078823656"/>
+        <c:crossAx val="149745024"/>
         <c:crosses val="autoZero"/>
         <c:auto val="1"/>
         <c:lblAlgn val="ctr"/>
@@ -1335,7 +1335,7 @@
         <c:noMultiLvlLbl val="0"/>
       </c:catAx>
       <c:valAx>
-        <c:axId val="-2078823656"/>
+        <c:axId val="149745024"/>
         <c:scaling>
           <c:orientation val="minMax"/>
         </c:scaling>
@@ -1385,10 +1385,10 @@
             <a:endParaRPr lang="it-IT"/>
           </a:p>
         </c:txPr>
-        <c:crossAx val="-2078310216"/>
+        <c:crossAx val="149744464"/>
         <c:crosses val="autoZero"/>
         <c:crossBetween val="between"/>
-        <c:majorUnit val="10.0"/>
+        <c:majorUnit val="10"/>
       </c:valAx>
       <c:spPr>
         <a:noFill/>
@@ -1473,9 +1473,9 @@
         <c:manualLayout>
           <c:xMode val="edge"/>
           <c:yMode val="edge"/>
-          <c:x val="0.757492418616772"/>
-          <c:y val="0.359660701418848"/>
-          <c:w val="0.190766295958586"/>
+          <c:x val="0.75749241861677197"/>
+          <c:y val="0.35966070141884798"/>
+          <c:w val="0.19076629595858599"/>
           <c:h val="0.314528789648088"/>
         </c:manualLayout>
       </c:layout>
@@ -1529,7 +1529,7 @@
       <a:endParaRPr lang="it-IT"/>
     </a:p>
   </c:txPr>
-  <c:externalData r:id="rId1">
+  <c:externalData r:id="rId3">
     <c:autoUpdate val="0"/>
   </c:externalData>
 </c:chartSpace>
@@ -3797,7 +3797,7 @@
           <a:p>
             <a:fld id="{4DC00536-3C86-400C-9F50-1275C6A29586}" type="datetimeFigureOut">
               <a:rPr lang="it-IT" smtClean="0"/>
-              <a:t>23/02/15</a:t>
+              <a:t>23/02/2015</a:t>
             </a:fld>
             <a:endParaRPr lang="it-IT"/>
           </a:p>
@@ -3956,7 +3956,7 @@
           <a:p>
             <a:fld id="{5D3BD91E-6CA1-409C-9187-4AB7B2A7EE76}" type="slidenum">
               <a:rPr lang="it-IT" smtClean="0"/>
-              <a:t>‹n.›</a:t>
+              <a:t>‹N›</a:t>
             </a:fld>
             <a:endParaRPr lang="it-IT"/>
           </a:p>
@@ -4369,7 +4369,7 @@
           <a:p>
             <a:fld id="{0809BC95-6AD5-4D34-9000-81E21223B4F6}" type="datetimeFigureOut">
               <a:rPr lang="it-IT" smtClean="0"/>
-              <a:t>23/02/15</a:t>
+              <a:t>23/02/2015</a:t>
             </a:fld>
             <a:endParaRPr lang="it-IT"/>
           </a:p>
@@ -4411,7 +4411,7 @@
           <a:p>
             <a:fld id="{7506457C-8D0E-4021-BB99-E24A507D8F57}" type="slidenum">
               <a:rPr lang="it-IT" smtClean="0"/>
-              <a:t>‹n.›</a:t>
+              <a:t>‹N›</a:t>
             </a:fld>
             <a:endParaRPr lang="it-IT"/>
           </a:p>
@@ -4547,7 +4547,7 @@
           <a:p>
             <a:fld id="{0809BC95-6AD5-4D34-9000-81E21223B4F6}" type="datetimeFigureOut">
               <a:rPr lang="it-IT" smtClean="0"/>
-              <a:t>23/02/15</a:t>
+              <a:t>23/02/2015</a:t>
             </a:fld>
             <a:endParaRPr lang="it-IT"/>
           </a:p>
@@ -4589,7 +4589,7 @@
           <a:p>
             <a:fld id="{7506457C-8D0E-4021-BB99-E24A507D8F57}" type="slidenum">
               <a:rPr lang="it-IT" smtClean="0"/>
-              <a:t>‹n.›</a:t>
+              <a:t>‹N›</a:t>
             </a:fld>
             <a:endParaRPr lang="it-IT"/>
           </a:p>
@@ -4735,7 +4735,7 @@
           <a:p>
             <a:fld id="{0809BC95-6AD5-4D34-9000-81E21223B4F6}" type="datetimeFigureOut">
               <a:rPr lang="it-IT" smtClean="0"/>
-              <a:t>23/02/15</a:t>
+              <a:t>23/02/2015</a:t>
             </a:fld>
             <a:endParaRPr lang="it-IT"/>
           </a:p>
@@ -4777,7 +4777,7 @@
           <a:p>
             <a:fld id="{7506457C-8D0E-4021-BB99-E24A507D8F57}" type="slidenum">
               <a:rPr lang="it-IT" smtClean="0"/>
-              <a:t>‹n.›</a:t>
+              <a:t>‹N›</a:t>
             </a:fld>
             <a:endParaRPr lang="it-IT"/>
           </a:p>
@@ -4913,7 +4913,7 @@
           <a:p>
             <a:fld id="{0809BC95-6AD5-4D34-9000-81E21223B4F6}" type="datetimeFigureOut">
               <a:rPr lang="it-IT" smtClean="0"/>
-              <a:t>23/02/15</a:t>
+              <a:t>23/02/2015</a:t>
             </a:fld>
             <a:endParaRPr lang="it-IT"/>
           </a:p>
@@ -4955,7 +4955,7 @@
           <a:p>
             <a:fld id="{7506457C-8D0E-4021-BB99-E24A507D8F57}" type="slidenum">
               <a:rPr lang="it-IT" smtClean="0"/>
-              <a:t>‹n.›</a:t>
+              <a:t>‹N›</a:t>
             </a:fld>
             <a:endParaRPr lang="it-IT"/>
           </a:p>
@@ -5167,7 +5167,7 @@
           <a:p>
             <a:fld id="{0809BC95-6AD5-4D34-9000-81E21223B4F6}" type="datetimeFigureOut">
               <a:rPr lang="it-IT" smtClean="0"/>
-              <a:t>23/02/15</a:t>
+              <a:t>23/02/2015</a:t>
             </a:fld>
             <a:endParaRPr lang="it-IT"/>
           </a:p>
@@ -5209,7 +5209,7 @@
           <a:p>
             <a:fld id="{7506457C-8D0E-4021-BB99-E24A507D8F57}" type="slidenum">
               <a:rPr lang="it-IT" smtClean="0"/>
-              <a:t>‹n.›</a:t>
+              <a:t>‹N›</a:t>
             </a:fld>
             <a:endParaRPr lang="it-IT"/>
           </a:p>
@@ -5407,7 +5407,7 @@
           <a:p>
             <a:fld id="{0809BC95-6AD5-4D34-9000-81E21223B4F6}" type="datetimeFigureOut">
               <a:rPr lang="it-IT" smtClean="0"/>
-              <a:t>23/02/15</a:t>
+              <a:t>23/02/2015</a:t>
             </a:fld>
             <a:endParaRPr lang="it-IT"/>
           </a:p>
@@ -5449,7 +5449,7 @@
           <a:p>
             <a:fld id="{7506457C-8D0E-4021-BB99-E24A507D8F57}" type="slidenum">
               <a:rPr lang="it-IT" smtClean="0"/>
-              <a:t>‹n.›</a:t>
+              <a:t>‹N›</a:t>
             </a:fld>
             <a:endParaRPr lang="it-IT"/>
           </a:p>
@@ -5782,7 +5782,7 @@
           <a:p>
             <a:fld id="{0809BC95-6AD5-4D34-9000-81E21223B4F6}" type="datetimeFigureOut">
               <a:rPr lang="it-IT" smtClean="0"/>
-              <a:t>23/02/15</a:t>
+              <a:t>23/02/2015</a:t>
             </a:fld>
             <a:endParaRPr lang="it-IT"/>
           </a:p>
@@ -5824,7 +5824,7 @@
           <a:p>
             <a:fld id="{7506457C-8D0E-4021-BB99-E24A507D8F57}" type="slidenum">
               <a:rPr lang="it-IT" smtClean="0"/>
-              <a:t>‹n.›</a:t>
+              <a:t>‹N›</a:t>
             </a:fld>
             <a:endParaRPr lang="it-IT"/>
           </a:p>
@@ -5908,7 +5908,7 @@
           <a:p>
             <a:fld id="{0809BC95-6AD5-4D34-9000-81E21223B4F6}" type="datetimeFigureOut">
               <a:rPr lang="it-IT" smtClean="0"/>
-              <a:t>23/02/15</a:t>
+              <a:t>23/02/2015</a:t>
             </a:fld>
             <a:endParaRPr lang="it-IT"/>
           </a:p>
@@ -5950,7 +5950,7 @@
           <a:p>
             <a:fld id="{7506457C-8D0E-4021-BB99-E24A507D8F57}" type="slidenum">
               <a:rPr lang="it-IT" smtClean="0"/>
-              <a:t>‹n.›</a:t>
+              <a:t>‹N›</a:t>
             </a:fld>
             <a:endParaRPr lang="it-IT"/>
           </a:p>
@@ -6011,7 +6011,7 @@
           <a:p>
             <a:fld id="{0809BC95-6AD5-4D34-9000-81E21223B4F6}" type="datetimeFigureOut">
               <a:rPr lang="it-IT" smtClean="0"/>
-              <a:t>23/02/15</a:t>
+              <a:t>23/02/2015</a:t>
             </a:fld>
             <a:endParaRPr lang="it-IT"/>
           </a:p>
@@ -6053,7 +6053,7 @@
           <a:p>
             <a:fld id="{7506457C-8D0E-4021-BB99-E24A507D8F57}" type="slidenum">
               <a:rPr lang="it-IT" smtClean="0"/>
-              <a:t>‹n.›</a:t>
+              <a:t>‹N›</a:t>
             </a:fld>
             <a:endParaRPr lang="it-IT"/>
           </a:p>
@@ -6296,7 +6296,7 @@
           <a:p>
             <a:fld id="{0809BC95-6AD5-4D34-9000-81E21223B4F6}" type="datetimeFigureOut">
               <a:rPr lang="it-IT" smtClean="0"/>
-              <a:t>23/02/15</a:t>
+              <a:t>23/02/2015</a:t>
             </a:fld>
             <a:endParaRPr lang="it-IT"/>
           </a:p>
@@ -6338,7 +6338,7 @@
           <a:p>
             <a:fld id="{7506457C-8D0E-4021-BB99-E24A507D8F57}" type="slidenum">
               <a:rPr lang="it-IT" smtClean="0"/>
-              <a:t>‹n.›</a:t>
+              <a:t>‹N›</a:t>
             </a:fld>
             <a:endParaRPr lang="it-IT"/>
           </a:p>
@@ -6557,7 +6557,7 @@
           <a:p>
             <a:fld id="{0809BC95-6AD5-4D34-9000-81E21223B4F6}" type="datetimeFigureOut">
               <a:rPr lang="it-IT" smtClean="0"/>
-              <a:t>23/02/15</a:t>
+              <a:t>23/02/2015</a:t>
             </a:fld>
             <a:endParaRPr lang="it-IT"/>
           </a:p>
@@ -6599,7 +6599,7 @@
           <a:p>
             <a:fld id="{7506457C-8D0E-4021-BB99-E24A507D8F57}" type="slidenum">
               <a:rPr lang="it-IT" smtClean="0"/>
-              <a:t>‹n.›</a:t>
+              <a:t>‹N›</a:t>
             </a:fld>
             <a:endParaRPr lang="it-IT"/>
           </a:p>
@@ -6778,7 +6778,7 @@
           <a:p>
             <a:fld id="{0809BC95-6AD5-4D34-9000-81E21223B4F6}" type="datetimeFigureOut">
               <a:rPr lang="it-IT" smtClean="0"/>
-              <a:t>23/02/15</a:t>
+              <a:t>23/02/2015</a:t>
             </a:fld>
             <a:endParaRPr lang="it-IT"/>
           </a:p>
@@ -6856,7 +6856,7 @@
           <a:p>
             <a:fld id="{7506457C-8D0E-4021-BB99-E24A507D8F57}" type="slidenum">
               <a:rPr lang="it-IT" smtClean="0"/>
-              <a:t>‹n.›</a:t>
+              <a:t>‹N›</a:t>
             </a:fld>
             <a:endParaRPr lang="it-IT"/>
           </a:p>
@@ -7499,7 +7499,7 @@
   <p:timing>
     <p:tnLst>
       <p:par>
-        <p:cTn xmlns:p14="http://schemas.microsoft.com/office/powerpoint/2010/main" id="1" dur="indefinite" restart="never" nodeType="tmRoot"/>
+        <p:cTn id="1" dur="indefinite" restart="never" nodeType="tmRoot"/>
       </p:par>
     </p:tnLst>
   </p:timing>
@@ -7829,7 +7829,7 @@
   <p:timing>
     <p:tnLst>
       <p:par>
-        <p:cTn xmlns:p14="http://schemas.microsoft.com/office/powerpoint/2010/main" id="1" dur="indefinite" restart="never" nodeType="tmRoot"/>
+        <p:cTn id="1" dur="indefinite" restart="never" nodeType="tmRoot"/>
       </p:par>
     </p:tnLst>
   </p:timing>
@@ -8196,7 +8196,7 @@
   <p:timing>
     <p:tnLst>
       <p:par>
-        <p:cTn xmlns:p14="http://schemas.microsoft.com/office/powerpoint/2010/main" id="1" dur="indefinite" restart="never" nodeType="tmRoot"/>
+        <p:cTn id="1" dur="indefinite" restart="never" nodeType="tmRoot"/>
       </p:par>
     </p:tnLst>
   </p:timing>
@@ -8595,7 +8595,7 @@
   <p:timing>
     <p:tnLst>
       <p:par>
-        <p:cTn xmlns:p14="http://schemas.microsoft.com/office/powerpoint/2010/main" id="1" dur="indefinite" restart="never" nodeType="tmRoot"/>
+        <p:cTn id="1" dur="indefinite" restart="never" nodeType="tmRoot"/>
       </p:par>
     </p:tnLst>
   </p:timing>
@@ -9001,7 +9001,7 @@
   <p:timing>
     <p:tnLst>
       <p:par>
-        <p:cTn xmlns:p14="http://schemas.microsoft.com/office/powerpoint/2010/main" id="1" dur="indefinite" restart="never" nodeType="tmRoot"/>
+        <p:cTn id="1" dur="indefinite" restart="never" nodeType="tmRoot"/>
       </p:par>
     </p:tnLst>
   </p:timing>
@@ -9508,7 +9508,7 @@
   <p:timing>
     <p:tnLst>
       <p:par>
-        <p:cTn xmlns:p14="http://schemas.microsoft.com/office/powerpoint/2010/main" id="1" dur="indefinite" restart="never" nodeType="tmRoot"/>
+        <p:cTn id="1" dur="indefinite" restart="never" nodeType="tmRoot"/>
       </p:par>
     </p:tnLst>
   </p:timing>
@@ -9850,7 +9850,7 @@
   <p:timing>
     <p:tnLst>
       <p:par>
-        <p:cTn xmlns:p14="http://schemas.microsoft.com/office/powerpoint/2010/main" id="1" dur="indefinite" restart="never" nodeType="tmRoot"/>
+        <p:cTn id="1" dur="indefinite" restart="never" nodeType="tmRoot"/>
       </p:par>
     </p:tnLst>
   </p:timing>
@@ -10374,7 +10374,7 @@
   <p:timing>
     <p:tnLst>
       <p:par>
-        <p:cTn xmlns:p14="http://schemas.microsoft.com/office/powerpoint/2010/main" id="1" dur="indefinite" restart="never" nodeType="tmRoot"/>
+        <p:cTn id="1" dur="indefinite" restart="never" nodeType="tmRoot"/>
       </p:par>
     </p:tnLst>
   </p:timing>
@@ -10769,7 +10769,7 @@
   <p:timing>
     <p:tnLst>
       <p:par>
-        <p:cTn xmlns:p14="http://schemas.microsoft.com/office/powerpoint/2010/main" id="1" dur="indefinite" restart="never" nodeType="tmRoot"/>
+        <p:cTn id="1" dur="indefinite" restart="never" nodeType="tmRoot"/>
       </p:par>
     </p:tnLst>
   </p:timing>
@@ -11158,7 +11158,7 @@
   <p:timing>
     <p:tnLst>
       <p:par>
-        <p:cTn xmlns:p14="http://schemas.microsoft.com/office/powerpoint/2010/main" id="1" dur="indefinite" restart="never" nodeType="tmRoot"/>
+        <p:cTn id="1" dur="indefinite" restart="never" nodeType="tmRoot"/>
       </p:par>
     </p:tnLst>
   </p:timing>
@@ -11245,7 +11245,7 @@
   <p:timing>
     <p:tnLst>
       <p:par>
-        <p:cTn xmlns:p14="http://schemas.microsoft.com/office/powerpoint/2010/main" id="1" dur="indefinite" restart="never" nodeType="tmRoot"/>
+        <p:cTn id="1" dur="indefinite" restart="never" nodeType="tmRoot"/>
       </p:par>
     </p:tnLst>
   </p:timing>
@@ -11532,7 +11532,7 @@
   <p:timing>
     <p:tnLst>
       <p:par>
-        <p:cTn xmlns:p14="http://schemas.microsoft.com/office/powerpoint/2010/main" id="1" dur="indefinite" restart="never" nodeType="tmRoot"/>
+        <p:cTn id="1" dur="indefinite" restart="never" nodeType="tmRoot"/>
       </p:par>
     </p:tnLst>
   </p:timing>
@@ -11879,7 +11879,7 @@
   <p:timing>
     <p:tnLst>
       <p:par>
-        <p:cTn xmlns:p14="http://schemas.microsoft.com/office/powerpoint/2010/main" id="1" dur="indefinite" restart="never" nodeType="tmRoot"/>
+        <p:cTn id="1" dur="indefinite" restart="never" nodeType="tmRoot"/>
       </p:par>
     </p:tnLst>
   </p:timing>
@@ -12106,7 +12106,7 @@
   <p:timing>
     <p:tnLst>
       <p:par>
-        <p:cTn xmlns:p14="http://schemas.microsoft.com/office/powerpoint/2010/main" id="1" dur="indefinite" restart="never" nodeType="tmRoot"/>
+        <p:cTn id="1" dur="indefinite" restart="never" nodeType="tmRoot"/>
       </p:par>
     </p:tnLst>
   </p:timing>
@@ -12339,7 +12339,7 @@
   <p:timing>
     <p:tnLst>
       <p:par>
-        <p:cTn xmlns:p14="http://schemas.microsoft.com/office/powerpoint/2010/main" id="1" dur="indefinite" restart="never" nodeType="tmRoot"/>
+        <p:cTn id="1" dur="indefinite" restart="never" nodeType="tmRoot"/>
       </p:par>
     </p:tnLst>
   </p:timing>
@@ -12571,7 +12571,7 @@
   <p:timing>
     <p:tnLst>
       <p:par>
-        <p:cTn xmlns:p14="http://schemas.microsoft.com/office/powerpoint/2010/main" id="1" dur="indefinite" restart="never" nodeType="tmRoot"/>
+        <p:cTn id="1" dur="indefinite" restart="never" nodeType="tmRoot"/>
       </p:par>
     </p:tnLst>
   </p:timing>
@@ -12803,7 +12803,7 @@
   <p:timing>
     <p:tnLst>
       <p:par>
-        <p:cTn xmlns:p14="http://schemas.microsoft.com/office/powerpoint/2010/main" id="1" dur="indefinite" restart="never" nodeType="tmRoot"/>
+        <p:cTn id="1" dur="indefinite" restart="never" nodeType="tmRoot"/>
       </p:par>
     </p:tnLst>
   </p:timing>
@@ -13030,7 +13030,7 @@
   <p:timing>
     <p:tnLst>
       <p:par>
-        <p:cTn xmlns:p14="http://schemas.microsoft.com/office/powerpoint/2010/main" id="1" dur="indefinite" restart="never" nodeType="tmRoot"/>
+        <p:cTn id="1" dur="indefinite" restart="never" nodeType="tmRoot"/>
       </p:par>
     </p:tnLst>
   </p:timing>
@@ -13257,7 +13257,7 @@
   <p:timing>
     <p:tnLst>
       <p:par>
-        <p:cTn xmlns:p14="http://schemas.microsoft.com/office/powerpoint/2010/main" id="1" dur="indefinite" restart="never" nodeType="tmRoot"/>
+        <p:cTn id="1" dur="indefinite" restart="never" nodeType="tmRoot"/>
       </p:par>
     </p:tnLst>
   </p:timing>
@@ -13489,7 +13489,7 @@
   <p:timing>
     <p:tnLst>
       <p:par>
-        <p:cTn xmlns:p14="http://schemas.microsoft.com/office/powerpoint/2010/main" id="1" dur="indefinite" restart="never" nodeType="tmRoot"/>
+        <p:cTn id="1" dur="indefinite" restart="never" nodeType="tmRoot"/>
       </p:par>
     </p:tnLst>
   </p:timing>
@@ -13721,7 +13721,7 @@
   <p:timing>
     <p:tnLst>
       <p:par>
-        <p:cTn xmlns:p14="http://schemas.microsoft.com/office/powerpoint/2010/main" id="1" dur="indefinite" restart="never" nodeType="tmRoot"/>
+        <p:cTn id="1" dur="indefinite" restart="never" nodeType="tmRoot"/>
       </p:par>
     </p:tnLst>
   </p:timing>
@@ -13953,7 +13953,7 @@
   <p:timing>
     <p:tnLst>
       <p:par>
-        <p:cTn xmlns:p14="http://schemas.microsoft.com/office/powerpoint/2010/main" id="1" dur="indefinite" restart="never" nodeType="tmRoot"/>
+        <p:cTn id="1" dur="indefinite" restart="never" nodeType="tmRoot"/>
       </p:par>
     </p:tnLst>
   </p:timing>
@@ -14040,7 +14040,7 @@
   <p:timing>
     <p:tnLst>
       <p:par>
-        <p:cTn xmlns:p14="http://schemas.microsoft.com/office/powerpoint/2010/main" id="1" dur="indefinite" restart="never" nodeType="tmRoot"/>
+        <p:cTn id="1" dur="indefinite" restart="never" nodeType="tmRoot"/>
       </p:par>
     </p:tnLst>
   </p:timing>
@@ -14272,7 +14272,7 @@
   <p:timing>
     <p:tnLst>
       <p:par>
-        <p:cTn xmlns:p14="http://schemas.microsoft.com/office/powerpoint/2010/main" id="1" dur="indefinite" restart="never" nodeType="tmRoot"/>
+        <p:cTn id="1" dur="indefinite" restart="never" nodeType="tmRoot"/>
       </p:par>
     </p:tnLst>
   </p:timing>
@@ -14543,7 +14543,7 @@
   <p:timing>
     <p:tnLst>
       <p:par>
-        <p:cTn xmlns:p14="http://schemas.microsoft.com/office/powerpoint/2010/main" id="1" dur="indefinite" restart="never" nodeType="tmRoot"/>
+        <p:cTn id="1" dur="indefinite" restart="never" nodeType="tmRoot"/>
       </p:par>
     </p:tnLst>
   </p:timing>
@@ -14815,7 +14815,7 @@
   <p:timing>
     <p:tnLst>
       <p:par>
-        <p:cTn xmlns:p14="http://schemas.microsoft.com/office/powerpoint/2010/main" id="1" dur="indefinite" restart="never" nodeType="tmRoot"/>
+        <p:cTn id="1" dur="indefinite" restart="never" nodeType="tmRoot"/>
       </p:par>
     </p:tnLst>
   </p:timing>
@@ -15081,7 +15081,7 @@
   <p:timing>
     <p:tnLst>
       <p:par>
-        <p:cTn xmlns:p14="http://schemas.microsoft.com/office/powerpoint/2010/main" id="1" dur="indefinite" restart="never" nodeType="tmRoot"/>
+        <p:cTn id="1" dur="indefinite" restart="never" nodeType="tmRoot"/>
       </p:par>
     </p:tnLst>
   </p:timing>
@@ -15353,7 +15353,7 @@
   <p:timing>
     <p:tnLst>
       <p:par>
-        <p:cTn xmlns:p14="http://schemas.microsoft.com/office/powerpoint/2010/main" id="1" dur="indefinite" restart="never" nodeType="tmRoot"/>
+        <p:cTn id="1" dur="indefinite" restart="never" nodeType="tmRoot"/>
       </p:par>
     </p:tnLst>
   </p:timing>
@@ -15625,7 +15625,7 @@
   <p:timing>
     <p:tnLst>
       <p:par>
-        <p:cTn xmlns:p14="http://schemas.microsoft.com/office/powerpoint/2010/main" id="1" dur="indefinite" restart="never" nodeType="tmRoot"/>
+        <p:cTn id="1" dur="indefinite" restart="never" nodeType="tmRoot"/>
       </p:par>
     </p:tnLst>
   </p:timing>
@@ -15897,7 +15897,7 @@
   <p:timing>
     <p:tnLst>
       <p:par>
-        <p:cTn xmlns:p14="http://schemas.microsoft.com/office/powerpoint/2010/main" id="1" dur="indefinite" restart="never" nodeType="tmRoot"/>
+        <p:cTn id="1" dur="indefinite" restart="never" nodeType="tmRoot"/>
       </p:par>
     </p:tnLst>
   </p:timing>
@@ -16156,7 +16156,7 @@
   <p:timing>
     <p:tnLst>
       <p:par>
-        <p:cTn xmlns:p14="http://schemas.microsoft.com/office/powerpoint/2010/main" id="1" dur="indefinite" restart="never" nodeType="tmRoot"/>
+        <p:cTn id="1" dur="indefinite" restart="never" nodeType="tmRoot"/>
       </p:par>
     </p:tnLst>
   </p:timing>
@@ -17049,7 +17049,7 @@
   <p:timing>
     <p:tnLst>
       <p:par>
-        <p:cTn xmlns:p14="http://schemas.microsoft.com/office/powerpoint/2010/main" id="1" dur="indefinite" restart="never" nodeType="tmRoot"/>
+        <p:cTn id="1" dur="indefinite" restart="never" nodeType="tmRoot"/>
       </p:par>
     </p:tnLst>
   </p:timing>
@@ -17308,7 +17308,7 @@
   <p:timing>
     <p:tnLst>
       <p:par>
-        <p:cTn xmlns:p14="http://schemas.microsoft.com/office/powerpoint/2010/main" id="1" dur="indefinite" restart="never" nodeType="tmRoot"/>
+        <p:cTn id="1" dur="indefinite" restart="never" nodeType="tmRoot"/>
       </p:par>
     </p:tnLst>
   </p:timing>
@@ -17568,7 +17568,7 @@
   <p:timing>
     <p:tnLst>
       <p:par>
-        <p:cTn xmlns:p14="http://schemas.microsoft.com/office/powerpoint/2010/main" id="1" dur="indefinite" restart="never" nodeType="tmRoot"/>
+        <p:cTn id="1" dur="indefinite" restart="never" nodeType="tmRoot"/>
       </p:par>
     </p:tnLst>
   </p:timing>
@@ -18407,7 +18407,7 @@
   <p:timing>
     <p:tnLst>
       <p:par>
-        <p:cTn xmlns:p14="http://schemas.microsoft.com/office/powerpoint/2010/main" id="1" dur="indefinite" restart="never" nodeType="tmRoot"/>
+        <p:cTn id="1" dur="indefinite" restart="never" nodeType="tmRoot"/>
       </p:par>
     </p:tnLst>
   </p:timing>
@@ -18666,7 +18666,7 @@
   <p:timing>
     <p:tnLst>
       <p:par>
-        <p:cTn xmlns:p14="http://schemas.microsoft.com/office/powerpoint/2010/main" id="1" dur="indefinite" restart="never" nodeType="tmRoot"/>
+        <p:cTn id="1" dur="indefinite" restart="never" nodeType="tmRoot"/>
       </p:par>
     </p:tnLst>
   </p:timing>
@@ -19574,7 +19574,7 @@
   <p:timing>
     <p:tnLst>
       <p:par>
-        <p:cTn xmlns:p14="http://schemas.microsoft.com/office/powerpoint/2010/main" id="1" dur="indefinite" restart="never" nodeType="tmRoot"/>
+        <p:cTn id="1" dur="indefinite" restart="never" nodeType="tmRoot"/>
       </p:par>
     </p:tnLst>
   </p:timing>
@@ -19881,7 +19881,7 @@
   <p:timing>
     <p:tnLst>
       <p:par>
-        <p:cTn xmlns:p14="http://schemas.microsoft.com/office/powerpoint/2010/main" id="1" dur="indefinite" restart="never" nodeType="tmRoot"/>
+        <p:cTn id="1" dur="indefinite" restart="never" nodeType="tmRoot"/>
       </p:par>
     </p:tnLst>
   </p:timing>
@@ -20619,7 +20619,7 @@
   <p:timing>
     <p:tnLst>
       <p:par>
-        <p:cTn xmlns:p14="http://schemas.microsoft.com/office/powerpoint/2010/main" id="1" dur="indefinite" restart="never" nodeType="tmRoot"/>
+        <p:cTn id="1" dur="indefinite" restart="never" nodeType="tmRoot"/>
       </p:par>
     </p:tnLst>
   </p:timing>
@@ -21348,7 +21348,7 @@
   <p:timing>
     <p:tnLst>
       <p:par>
-        <p:cTn xmlns:p14="http://schemas.microsoft.com/office/powerpoint/2010/main" id="1" dur="indefinite" restart="never" nodeType="tmRoot"/>
+        <p:cTn id="1" dur="indefinite" restart="never" nodeType="tmRoot"/>
       </p:par>
     </p:tnLst>
   </p:timing>
@@ -21753,7 +21753,7 @@
   <p:timing>
     <p:tnLst>
       <p:par>
-        <p:cTn xmlns:p14="http://schemas.microsoft.com/office/powerpoint/2010/main" id="1" dur="indefinite" restart="never" nodeType="tmRoot"/>
+        <p:cTn id="1" dur="indefinite" restart="never" nodeType="tmRoot"/>
       </p:par>
     </p:tnLst>
   </p:timing>
@@ -22129,7 +22129,7 @@
   <p:timing>
     <p:tnLst>
       <p:par>
-        <p:cTn xmlns:p14="http://schemas.microsoft.com/office/powerpoint/2010/main" id="1" dur="indefinite" restart="never" nodeType="tmRoot"/>
+        <p:cTn id="1" dur="indefinite" restart="never" nodeType="tmRoot"/>
       </p:par>
     </p:tnLst>
   </p:timing>
@@ -22597,7 +22597,7 @@
   <p:timing>
     <p:tnLst>
       <p:par>
-        <p:cTn xmlns:p14="http://schemas.microsoft.com/office/powerpoint/2010/main" id="1" dur="indefinite" restart="never" nodeType="tmRoot"/>
+        <p:cTn id="1" dur="indefinite" restart="never" nodeType="tmRoot"/>
       </p:par>
     </p:tnLst>
   </p:timing>
@@ -23045,7 +23045,7 @@
   <p:timing>
     <p:tnLst>
       <p:par>
-        <p:cTn xmlns:p14="http://schemas.microsoft.com/office/powerpoint/2010/main" id="1" dur="indefinite" restart="never" nodeType="tmRoot"/>
+        <p:cTn id="1" dur="indefinite" restart="never" nodeType="tmRoot"/>
       </p:par>
     </p:tnLst>
   </p:timing>
@@ -23404,7 +23404,7 @@
   <p:timing>
     <p:tnLst>
       <p:par>
-        <p:cTn xmlns:p14="http://schemas.microsoft.com/office/powerpoint/2010/main" id="1" dur="indefinite" restart="never" nodeType="tmRoot"/>
+        <p:cTn id="1" dur="indefinite" restart="never" nodeType="tmRoot"/>
       </p:par>
     </p:tnLst>
   </p:timing>
@@ -24019,7 +24019,7 @@
   <p:timing>
     <p:tnLst>
       <p:par>
-        <p:cTn xmlns:p14="http://schemas.microsoft.com/office/powerpoint/2010/main" id="1" dur="indefinite" restart="never" nodeType="tmRoot"/>
+        <p:cTn id="1" dur="indefinite" restart="never" nodeType="tmRoot"/>
       </p:par>
     </p:tnLst>
   </p:timing>
@@ -24106,7 +24106,7 @@
   <p:timing>
     <p:tnLst>
       <p:par>
-        <p:cTn xmlns:p14="http://schemas.microsoft.com/office/powerpoint/2010/main" id="1" dur="indefinite" restart="never" nodeType="tmRoot"/>
+        <p:cTn id="1" dur="indefinite" restart="never" nodeType="tmRoot"/>
       </p:par>
     </p:tnLst>
   </p:timing>
@@ -24646,7 +24646,7 @@
   <p:timing>
     <p:tnLst>
       <p:par>
-        <p:cTn xmlns:p14="http://schemas.microsoft.com/office/powerpoint/2010/main" id="1" dur="indefinite" restart="never" nodeType="tmRoot"/>
+        <p:cTn id="1" dur="indefinite" restart="never" nodeType="tmRoot"/>
       </p:par>
     </p:tnLst>
   </p:timing>
@@ -24936,7 +24936,7 @@
   <p:timing>
     <p:tnLst>
       <p:par>
-        <p:cTn xmlns:p14="http://schemas.microsoft.com/office/powerpoint/2010/main" id="1" dur="indefinite" restart="never" nodeType="tmRoot"/>
+        <p:cTn id="1" dur="indefinite" restart="never" nodeType="tmRoot"/>
       </p:par>
     </p:tnLst>
   </p:timing>
@@ -25456,7 +25456,7 @@
   <p:timing>
     <p:tnLst>
       <p:par>
-        <p:cTn xmlns:p14="http://schemas.microsoft.com/office/powerpoint/2010/main" id="1" dur="indefinite" restart="never" nodeType="tmRoot"/>
+        <p:cTn id="1" dur="indefinite" restart="never" nodeType="tmRoot"/>
       </p:par>
     </p:tnLst>
   </p:timing>
@@ -25746,7 +25746,7 @@
   <p:timing>
     <p:tnLst>
       <p:par>
-        <p:cTn xmlns:p14="http://schemas.microsoft.com/office/powerpoint/2010/main" id="1" dur="indefinite" restart="never" nodeType="tmRoot"/>
+        <p:cTn id="1" dur="indefinite" restart="never" nodeType="tmRoot"/>
       </p:par>
     </p:tnLst>
   </p:timing>
@@ -26589,7 +26589,7 @@
   <p:timing>
     <p:tnLst>
       <p:par>
-        <p:cTn xmlns:p14="http://schemas.microsoft.com/office/powerpoint/2010/main" id="1" dur="indefinite" restart="never" nodeType="tmRoot"/>
+        <p:cTn id="1" dur="indefinite" restart="never" nodeType="tmRoot"/>
       </p:par>
     </p:tnLst>
   </p:timing>
@@ -26879,7 +26879,7 @@
   <p:timing>
     <p:tnLst>
       <p:par>
-        <p:cTn xmlns:p14="http://schemas.microsoft.com/office/powerpoint/2010/main" id="1" dur="indefinite" restart="never" nodeType="tmRoot"/>
+        <p:cTn id="1" dur="indefinite" restart="never" nodeType="tmRoot"/>
       </p:par>
     </p:tnLst>
   </p:timing>
@@ -27183,7 +27183,7 @@
   <p:timing>
     <p:tnLst>
       <p:par>
-        <p:cTn xmlns:p14="http://schemas.microsoft.com/office/powerpoint/2010/main" id="1" dur="indefinite" restart="never" nodeType="tmRoot"/>
+        <p:cTn id="1" dur="indefinite" restart="never" nodeType="tmRoot"/>
       </p:par>
     </p:tnLst>
   </p:timing>
@@ -28549,7 +28549,7 @@
   <p:timing>
     <p:tnLst>
       <p:par>
-        <p:cTn xmlns:p14="http://schemas.microsoft.com/office/powerpoint/2010/main" id="1" dur="indefinite" restart="never" nodeType="tmRoot"/>
+        <p:cTn id="1" dur="indefinite" restart="never" nodeType="tmRoot"/>
       </p:par>
     </p:tnLst>
   </p:timing>
@@ -28909,7 +28909,7 @@
   <p:timing>
     <p:tnLst>
       <p:par>
-        <p:cTn xmlns:p14="http://schemas.microsoft.com/office/powerpoint/2010/main" id="1" dur="indefinite" restart="never" nodeType="tmRoot"/>
+        <p:cTn id="1" dur="indefinite" restart="never" nodeType="tmRoot"/>
       </p:par>
     </p:tnLst>
   </p:timing>
@@ -29170,7 +29170,7 @@
   <p:timing>
     <p:tnLst>
       <p:par>
-        <p:cTn xmlns:p14="http://schemas.microsoft.com/office/powerpoint/2010/main" id="1" dur="indefinite" restart="never" nodeType="tmRoot"/>
+        <p:cTn id="1" dur="indefinite" restart="never" nodeType="tmRoot"/>
       </p:par>
     </p:tnLst>
   </p:timing>
@@ -30410,7 +30410,7 @@
   <p:timing>
     <p:tnLst>
       <p:par>
-        <p:cTn xmlns:p14="http://schemas.microsoft.com/office/powerpoint/2010/main" id="1" dur="indefinite" restart="never" nodeType="tmRoot"/>
+        <p:cTn id="1" dur="indefinite" restart="never" nodeType="tmRoot"/>
       </p:par>
     </p:tnLst>
   </p:timing>
@@ -30700,7 +30700,7 @@
   <p:timing>
     <p:tnLst>
       <p:par>
-        <p:cTn xmlns:p14="http://schemas.microsoft.com/office/powerpoint/2010/main" id="1" dur="indefinite" restart="never" nodeType="tmRoot"/>
+        <p:cTn id="1" dur="indefinite" restart="never" nodeType="tmRoot"/>
       </p:par>
     </p:tnLst>
   </p:timing>
@@ -30990,7 +30990,7 @@
   <p:timing>
     <p:tnLst>
       <p:par>
-        <p:cTn xmlns:p14="http://schemas.microsoft.com/office/powerpoint/2010/main" id="1" dur="indefinite" restart="never" nodeType="tmRoot"/>
+        <p:cTn id="1" dur="indefinite" restart="never" nodeType="tmRoot"/>
       </p:par>
     </p:tnLst>
   </p:timing>
@@ -31280,7 +31280,7 @@
   <p:timing>
     <p:tnLst>
       <p:par>
-        <p:cTn xmlns:p14="http://schemas.microsoft.com/office/powerpoint/2010/main" id="1" dur="indefinite" restart="never" nodeType="tmRoot"/>
+        <p:cTn id="1" dur="indefinite" restart="never" nodeType="tmRoot"/>
       </p:par>
     </p:tnLst>
   </p:timing>
@@ -32340,7 +32340,7 @@
   <p:timing>
     <p:tnLst>
       <p:par>
-        <p:cTn xmlns:p14="http://schemas.microsoft.com/office/powerpoint/2010/main" id="1" dur="indefinite" restart="never" nodeType="tmRoot"/>
+        <p:cTn id="1" dur="indefinite" restart="never" nodeType="tmRoot"/>
       </p:par>
     </p:tnLst>
   </p:timing>
@@ -32364,6 +32364,387 @@
           <a:chExt cx="0" cy="0"/>
         </a:xfrm>
       </p:grpSpPr>
+      <p:sp>
+        <p:nvSpPr>
+          <p:cNvPr id="5" name="Rettangolo 4"/>
+          <p:cNvSpPr/>
+          <p:nvPr/>
+        </p:nvSpPr>
+        <p:spPr>
+          <a:xfrm>
+            <a:off x="0" y="-28574"/>
+            <a:ext cx="12192000" cy="342900"/>
+          </a:xfrm>
+          <a:prstGeom prst="rect">
+            <a:avLst/>
+          </a:prstGeom>
+          <a:solidFill>
+            <a:srgbClr val="0072C6"/>
+          </a:solidFill>
+        </p:spPr>
+        <p:style>
+          <a:lnRef idx="2">
+            <a:schemeClr val="accent1">
+              <a:shade val="50000"/>
+            </a:schemeClr>
+          </a:lnRef>
+          <a:fillRef idx="1">
+            <a:schemeClr val="accent1"/>
+          </a:fillRef>
+          <a:effectRef idx="0">
+            <a:schemeClr val="accent1"/>
+          </a:effectRef>
+          <a:fontRef idx="minor">
+            <a:schemeClr val="lt1"/>
+          </a:fontRef>
+        </p:style>
+        <p:txBody>
+          <a:bodyPr rtlCol="0" anchor="ctr"/>
+          <a:lstStyle/>
+          <a:p>
+            <a:pPr algn="ctr"/>
+            <a:endParaRPr lang="it-IT"/>
+          </a:p>
+        </p:txBody>
+      </p:sp>
+      <p:sp>
+        <p:nvSpPr>
+          <p:cNvPr id="6" name="Title 2"/>
+          <p:cNvSpPr txBox="1">
+            <a:spLocks/>
+          </p:cNvSpPr>
+          <p:nvPr/>
+        </p:nvSpPr>
+        <p:spPr>
+          <a:xfrm>
+            <a:off x="521495" y="485778"/>
+            <a:ext cx="11149013" cy="1214436"/>
+          </a:xfrm>
+          <a:prstGeom prst="rect">
+            <a:avLst/>
+          </a:prstGeom>
+        </p:spPr>
+        <p:txBody>
+          <a:bodyPr/>
+          <a:lstStyle>
+            <a:lvl1pPr algn="l" defTabSz="914363" rtl="0" eaLnBrk="1" latinLnBrk="0" hangingPunct="1">
+              <a:lnSpc>
+                <a:spcPct val="90000"/>
+              </a:lnSpc>
+              <a:spcBef>
+                <a:spcPct val="0"/>
+              </a:spcBef>
+              <a:buNone/>
+              <a:defRPr lang="en-US" sz="5400" b="0" kern="1200" cap="none" spc="-100" baseline="0" dirty="0" smtClean="0">
+                <a:ln w="3175">
+                  <a:noFill/>
+                </a:ln>
+                <a:gradFill>
+                  <a:gsLst>
+                    <a:gs pos="1250">
+                      <a:schemeClr val="tx2"/>
+                    </a:gs>
+                    <a:gs pos="100000">
+                      <a:schemeClr val="tx2"/>
+                    </a:gs>
+                  </a:gsLst>
+                  <a:lin ang="5400000" scaled="0"/>
+                </a:gradFill>
+                <a:effectLst/>
+                <a:latin typeface="+mj-lt"/>
+                <a:ea typeface="+mn-ea"/>
+                <a:cs typeface="Arial" charset="0"/>
+              </a:defRPr>
+            </a:lvl1pPr>
+          </a:lstStyle>
+          <a:p>
+            <a:r>
+              <a:rPr lang="it-IT" sz="4800" b="1" dirty="0" smtClean="0">
+                <a:solidFill>
+                  <a:srgbClr val="0072C6"/>
+                </a:solidFill>
+              </a:rPr>
+              <a:t>Virtual Data Integration vs </a:t>
+            </a:r>
+            <a:r>
+              <a:rPr lang="it-IT" sz="4800" b="1" dirty="0">
+                <a:solidFill>
+                  <a:srgbClr val="0072C6"/>
+                </a:solidFill>
+              </a:rPr>
+              <a:t>Data </a:t>
+            </a:r>
+            <a:r>
+              <a:rPr lang="it-IT" sz="4800" b="1" dirty="0" err="1">
+                <a:solidFill>
+                  <a:srgbClr val="0072C6"/>
+                </a:solidFill>
+              </a:rPr>
+              <a:t>Warehousing</a:t>
+            </a:r>
+            <a:endParaRPr lang="it-IT" sz="4800" b="1" dirty="0" smtClean="0">
+              <a:solidFill>
+                <a:srgbClr val="0072C6"/>
+              </a:solidFill>
+            </a:endParaRPr>
+          </a:p>
+          <a:p>
+            <a:endParaRPr lang="it-IT" sz="1500" b="1" i="1" dirty="0" smtClean="0">
+              <a:solidFill>
+                <a:srgbClr val="0072C6"/>
+              </a:solidFill>
+            </a:endParaRPr>
+          </a:p>
+          <a:p>
+            <a:pPr marL="457200" lvl="0" indent="-457200">
+              <a:buFont typeface="Arial" panose="020B0604020202020204" pitchFamily="34" charset="0"/>
+              <a:buChar char="•"/>
+            </a:pPr>
+            <a:endParaRPr lang="it-IT" sz="3000" dirty="0"/>
+          </a:p>
+          <a:p>
+            <a:pPr marL="457200" lvl="0" indent="-457200">
+              <a:buFont typeface="Arial" panose="020B0604020202020204" pitchFamily="34" charset="0"/>
+              <a:buChar char="•"/>
+            </a:pPr>
+            <a:endParaRPr lang="it-IT" sz="3000" b="1" i="1" dirty="0" smtClean="0">
+              <a:solidFill>
+                <a:srgbClr val="0072C6"/>
+              </a:solidFill>
+            </a:endParaRPr>
+          </a:p>
+          <a:p>
+            <a:pPr lvl="0"/>
+            <a:endParaRPr lang="it-IT" sz="3000" b="1" i="1" dirty="0" smtClean="0">
+              <a:solidFill>
+                <a:srgbClr val="0072C6"/>
+              </a:solidFill>
+            </a:endParaRPr>
+          </a:p>
+          <a:p>
+            <a:pPr marL="457200" lvl="0" indent="-457200">
+              <a:buFont typeface="Arial" panose="020B0604020202020204" pitchFamily="34" charset="0"/>
+              <a:buChar char="•"/>
+            </a:pPr>
+            <a:endParaRPr lang="it-IT" sz="5000" b="1" i="1" dirty="0">
+              <a:solidFill>
+                <a:srgbClr val="0072C6"/>
+              </a:solidFill>
+            </a:endParaRPr>
+          </a:p>
+          <a:p>
+            <a:endParaRPr lang="it-IT" sz="5000" b="1" i="1" dirty="0" smtClean="0">
+              <a:solidFill>
+                <a:srgbClr val="0072C6"/>
+              </a:solidFill>
+            </a:endParaRPr>
+          </a:p>
+          <a:p>
+            <a:endParaRPr lang="it-IT" sz="3000" b="1" i="1" dirty="0">
+              <a:solidFill>
+                <a:srgbClr val="0072C6"/>
+              </a:solidFill>
+            </a:endParaRPr>
+          </a:p>
+        </p:txBody>
+      </p:sp>
+      <p:pic>
+        <p:nvPicPr>
+          <p:cNvPr id="3" name="Immagine 2"/>
+          <p:cNvPicPr>
+            <a:picLocks noChangeAspect="1"/>
+          </p:cNvPicPr>
+          <p:nvPr/>
+        </p:nvPicPr>
+        <p:blipFill rotWithShape="1">
+          <a:blip r:embed="rId2">
+            <a:extLst>
+              <a:ext uri="{28A0092B-C50C-407E-A947-70E740481C1C}">
+                <a14:useLocalDpi xmlns:a14="http://schemas.microsoft.com/office/drawing/2010/main" val="0"/>
+              </a:ext>
+            </a:extLst>
+          </a:blip>
+          <a:srcRect t="8535" b="9342"/>
+          <a:stretch/>
+        </p:blipFill>
+        <p:spPr>
+          <a:xfrm>
+            <a:off x="2572512" y="1871666"/>
+            <a:ext cx="7546848" cy="4648232"/>
+          </a:xfrm>
+          <a:prstGeom prst="rect">
+            <a:avLst/>
+          </a:prstGeom>
+        </p:spPr>
+      </p:pic>
+      <p:sp>
+        <p:nvSpPr>
+          <p:cNvPr id="7" name="CasellaDiTesto 6"/>
+          <p:cNvSpPr txBox="1"/>
+          <p:nvPr/>
+        </p:nvSpPr>
+        <p:spPr>
+          <a:xfrm>
+            <a:off x="521495" y="1370032"/>
+            <a:ext cx="11149013" cy="2103139"/>
+          </a:xfrm>
+          <a:prstGeom prst="rect">
+            <a:avLst/>
+          </a:prstGeom>
+          <a:noFill/>
+        </p:spPr>
+        <p:txBody>
+          <a:bodyPr wrap="square" rtlCol="0">
+            <a:spAutoFit/>
+          </a:bodyPr>
+          <a:lstStyle/>
+          <a:p>
+            <a:r>
+              <a:rPr lang="it-IT" sz="2800" spc="-100" dirty="0" smtClean="0">
+                <a:ln w="3175">
+                  <a:noFill/>
+                </a:ln>
+                <a:latin typeface="+mj-lt"/>
+                <a:cs typeface="Arial" charset="0"/>
+              </a:rPr>
+              <a:t>L’esistenza di più basi di dati è trasparenze all’utilizzatore dello schema virtuale.</a:t>
+            </a:r>
+            <a:endParaRPr lang="it-IT" sz="2800" spc="-100" baseline="30000" dirty="0" smtClean="0">
+              <a:ln w="3175">
+                <a:noFill/>
+              </a:ln>
+              <a:latin typeface="+mj-lt"/>
+              <a:cs typeface="Arial" charset="0"/>
+            </a:endParaRPr>
+          </a:p>
+          <a:p>
+            <a:endParaRPr lang="en-US" sz="2800" spc="-100" baseline="30000" dirty="0" smtClean="0">
+              <a:ln w="3175">
+                <a:noFill/>
+              </a:ln>
+              <a:latin typeface="+mj-lt"/>
+              <a:cs typeface="Arial" charset="0"/>
+            </a:endParaRPr>
+          </a:p>
+          <a:p>
+            <a:endParaRPr lang="en-US" sz="2800" spc="-100" baseline="30000" dirty="0">
+              <a:ln w="3175">
+                <a:noFill/>
+              </a:ln>
+              <a:latin typeface="+mj-lt"/>
+              <a:cs typeface="Arial" charset="0"/>
+            </a:endParaRPr>
+          </a:p>
+          <a:p>
+            <a:endParaRPr lang="en-US" sz="2800" spc="-100" baseline="30000" dirty="0" smtClean="0">
+              <a:ln w="3175">
+                <a:noFill/>
+              </a:ln>
+              <a:latin typeface="+mj-lt"/>
+              <a:cs typeface="Arial" charset="0"/>
+            </a:endParaRPr>
+          </a:p>
+          <a:p>
+            <a:endParaRPr lang="en-US" sz="2800" spc="-100" baseline="30000" dirty="0">
+              <a:ln w="3175">
+                <a:noFill/>
+              </a:ln>
+              <a:latin typeface="+mj-lt"/>
+              <a:cs typeface="Arial" charset="0"/>
+            </a:endParaRPr>
+          </a:p>
+        </p:txBody>
+      </p:sp>
+      <p:sp>
+        <p:nvSpPr>
+          <p:cNvPr id="8" name="CasellaDiTesto 7"/>
+          <p:cNvSpPr txBox="1"/>
+          <p:nvPr/>
+        </p:nvSpPr>
+        <p:spPr>
+          <a:xfrm>
+            <a:off x="3413760" y="2523508"/>
+            <a:ext cx="719328" cy="369332"/>
+          </a:xfrm>
+          <a:prstGeom prst="rect">
+            <a:avLst/>
+          </a:prstGeom>
+          <a:noFill/>
+        </p:spPr>
+        <p:txBody>
+          <a:bodyPr wrap="square" rtlCol="0">
+            <a:spAutoFit/>
+          </a:bodyPr>
+          <a:lstStyle/>
+          <a:p>
+            <a:r>
+              <a:rPr lang="it-IT" b="1" dirty="0" smtClean="0"/>
+              <a:t>BDM</a:t>
+            </a:r>
+            <a:endParaRPr lang="it-IT" b="1" dirty="0"/>
+          </a:p>
+        </p:txBody>
+      </p:sp>
+      <p:sp>
+        <p:nvSpPr>
+          <p:cNvPr id="9" name="CasellaDiTesto 8"/>
+          <p:cNvSpPr txBox="1"/>
+          <p:nvPr/>
+        </p:nvSpPr>
+        <p:spPr>
+          <a:xfrm>
+            <a:off x="3462528" y="4125717"/>
+            <a:ext cx="719328" cy="369332"/>
+          </a:xfrm>
+          <a:prstGeom prst="rect">
+            <a:avLst/>
+          </a:prstGeom>
+          <a:noFill/>
+        </p:spPr>
+        <p:txBody>
+          <a:bodyPr wrap="square" rtlCol="0">
+            <a:spAutoFit/>
+          </a:bodyPr>
+          <a:lstStyle/>
+          <a:p>
+            <a:r>
+              <a:rPr lang="it-IT" b="1" dirty="0" smtClean="0"/>
+              <a:t>BSE</a:t>
+            </a:r>
+            <a:endParaRPr lang="it-IT" b="1" dirty="0"/>
+          </a:p>
+        </p:txBody>
+      </p:sp>
+      <p:sp>
+        <p:nvSpPr>
+          <p:cNvPr id="10" name="CasellaDiTesto 9"/>
+          <p:cNvSpPr txBox="1"/>
+          <p:nvPr/>
+        </p:nvSpPr>
+        <p:spPr>
+          <a:xfrm>
+            <a:off x="3474720" y="5623362"/>
+            <a:ext cx="719328" cy="369332"/>
+          </a:xfrm>
+          <a:prstGeom prst="rect">
+            <a:avLst/>
+          </a:prstGeom>
+          <a:noFill/>
+        </p:spPr>
+        <p:txBody>
+          <a:bodyPr wrap="square" rtlCol="0">
+            <a:spAutoFit/>
+          </a:bodyPr>
+          <a:lstStyle/>
+          <a:p>
+            <a:r>
+              <a:rPr lang="it-IT" b="1" dirty="0" smtClean="0"/>
+              <a:t>BRI</a:t>
+            </a:r>
+            <a:endParaRPr lang="it-IT" b="1" dirty="0"/>
+          </a:p>
+        </p:txBody>
+      </p:sp>
       <p:sp>
         <p:nvSpPr>
           <p:cNvPr id="4" name="Rettangolo 3"/>
@@ -32407,292 +32788,6 @@
           </a:p>
         </p:txBody>
       </p:sp>
-      <p:sp>
-        <p:nvSpPr>
-          <p:cNvPr id="5" name="Rettangolo 4"/>
-          <p:cNvSpPr/>
-          <p:nvPr/>
-        </p:nvSpPr>
-        <p:spPr>
-          <a:xfrm>
-            <a:off x="0" y="-28574"/>
-            <a:ext cx="12192000" cy="342900"/>
-          </a:xfrm>
-          <a:prstGeom prst="rect">
-            <a:avLst/>
-          </a:prstGeom>
-          <a:solidFill>
-            <a:srgbClr val="0072C6"/>
-          </a:solidFill>
-        </p:spPr>
-        <p:style>
-          <a:lnRef idx="2">
-            <a:schemeClr val="accent1">
-              <a:shade val="50000"/>
-            </a:schemeClr>
-          </a:lnRef>
-          <a:fillRef idx="1">
-            <a:schemeClr val="accent1"/>
-          </a:fillRef>
-          <a:effectRef idx="0">
-            <a:schemeClr val="accent1"/>
-          </a:effectRef>
-          <a:fontRef idx="minor">
-            <a:schemeClr val="lt1"/>
-          </a:fontRef>
-        </p:style>
-        <p:txBody>
-          <a:bodyPr rtlCol="0" anchor="ctr"/>
-          <a:lstStyle/>
-          <a:p>
-            <a:pPr algn="ctr"/>
-            <a:endParaRPr lang="it-IT"/>
-          </a:p>
-        </p:txBody>
-      </p:sp>
-      <p:sp>
-        <p:nvSpPr>
-          <p:cNvPr id="6" name="Title 2"/>
-          <p:cNvSpPr txBox="1">
-            <a:spLocks/>
-          </p:cNvSpPr>
-          <p:nvPr/>
-        </p:nvSpPr>
-        <p:spPr>
-          <a:xfrm>
-            <a:off x="521495" y="485778"/>
-            <a:ext cx="11149013" cy="1214436"/>
-          </a:xfrm>
-          <a:prstGeom prst="rect">
-            <a:avLst/>
-          </a:prstGeom>
-        </p:spPr>
-        <p:txBody>
-          <a:bodyPr/>
-          <a:lstStyle>
-            <a:lvl1pPr algn="l" defTabSz="914363" rtl="0" eaLnBrk="1" latinLnBrk="0" hangingPunct="1">
-              <a:lnSpc>
-                <a:spcPct val="90000"/>
-              </a:lnSpc>
-              <a:spcBef>
-                <a:spcPct val="0"/>
-              </a:spcBef>
-              <a:buNone/>
-              <a:defRPr lang="en-US" sz="5400" b="0" kern="1200" cap="none" spc="-100" baseline="0" dirty="0" smtClean="0">
-                <a:ln w="3175">
-                  <a:noFill/>
-                </a:ln>
-                <a:gradFill>
-                  <a:gsLst>
-                    <a:gs pos="1250">
-                      <a:schemeClr val="tx2"/>
-                    </a:gs>
-                    <a:gs pos="100000">
-                      <a:schemeClr val="tx2"/>
-                    </a:gs>
-                  </a:gsLst>
-                  <a:lin ang="5400000" scaled="0"/>
-                </a:gradFill>
-                <a:effectLst/>
-                <a:latin typeface="+mj-lt"/>
-                <a:ea typeface="+mn-ea"/>
-                <a:cs typeface="Arial" charset="0"/>
-              </a:defRPr>
-            </a:lvl1pPr>
-          </a:lstStyle>
-          <a:p>
-            <a:r>
-              <a:rPr lang="it-IT" sz="4800" b="1" dirty="0" smtClean="0">
-                <a:solidFill>
-                  <a:srgbClr val="0072C6"/>
-                </a:solidFill>
-              </a:rPr>
-              <a:t>Virtual Data Integration vs </a:t>
-            </a:r>
-            <a:r>
-              <a:rPr lang="it-IT" sz="4800" b="1" dirty="0">
-                <a:solidFill>
-                  <a:srgbClr val="0072C6"/>
-                </a:solidFill>
-              </a:rPr>
-              <a:t>Data </a:t>
-            </a:r>
-            <a:r>
-              <a:rPr lang="it-IT" sz="4800" b="1" dirty="0" err="1">
-                <a:solidFill>
-                  <a:srgbClr val="0072C6"/>
-                </a:solidFill>
-              </a:rPr>
-              <a:t>Warehousing</a:t>
-            </a:r>
-            <a:endParaRPr lang="it-IT" sz="4800" b="1" dirty="0" smtClean="0">
-              <a:solidFill>
-                <a:srgbClr val="0072C6"/>
-              </a:solidFill>
-            </a:endParaRPr>
-          </a:p>
-          <a:p>
-            <a:endParaRPr lang="it-IT" sz="1500" b="1" i="1" dirty="0" smtClean="0">
-              <a:solidFill>
-                <a:srgbClr val="0072C6"/>
-              </a:solidFill>
-            </a:endParaRPr>
-          </a:p>
-          <a:p>
-            <a:pPr marL="457200" lvl="0" indent="-457200">
-              <a:buFont typeface="Arial" panose="020B0604020202020204" pitchFamily="34" charset="0"/>
-              <a:buChar char="•"/>
-            </a:pPr>
-            <a:endParaRPr lang="it-IT" sz="3000" dirty="0"/>
-          </a:p>
-          <a:p>
-            <a:pPr marL="457200" lvl="0" indent="-457200">
-              <a:buFont typeface="Arial" panose="020B0604020202020204" pitchFamily="34" charset="0"/>
-              <a:buChar char="•"/>
-            </a:pPr>
-            <a:endParaRPr lang="it-IT" sz="3000" b="1" i="1" dirty="0" smtClean="0">
-              <a:solidFill>
-                <a:srgbClr val="0072C6"/>
-              </a:solidFill>
-            </a:endParaRPr>
-          </a:p>
-          <a:p>
-            <a:pPr lvl="0"/>
-            <a:endParaRPr lang="it-IT" sz="3000" b="1" i="1" dirty="0" smtClean="0">
-              <a:solidFill>
-                <a:srgbClr val="0072C6"/>
-              </a:solidFill>
-            </a:endParaRPr>
-          </a:p>
-          <a:p>
-            <a:pPr marL="457200" lvl="0" indent="-457200">
-              <a:buFont typeface="Arial" panose="020B0604020202020204" pitchFamily="34" charset="0"/>
-              <a:buChar char="•"/>
-            </a:pPr>
-            <a:endParaRPr lang="it-IT" sz="5000" b="1" i="1" dirty="0">
-              <a:solidFill>
-                <a:srgbClr val="0072C6"/>
-              </a:solidFill>
-            </a:endParaRPr>
-          </a:p>
-          <a:p>
-            <a:endParaRPr lang="it-IT" sz="5000" b="1" i="1" dirty="0" smtClean="0">
-              <a:solidFill>
-                <a:srgbClr val="0072C6"/>
-              </a:solidFill>
-            </a:endParaRPr>
-          </a:p>
-          <a:p>
-            <a:endParaRPr lang="it-IT" sz="3000" b="1" i="1" dirty="0">
-              <a:solidFill>
-                <a:srgbClr val="0072C6"/>
-              </a:solidFill>
-            </a:endParaRPr>
-          </a:p>
-        </p:txBody>
-      </p:sp>
-      <p:sp>
-        <p:nvSpPr>
-          <p:cNvPr id="7" name="CasellaDiTesto 6"/>
-          <p:cNvSpPr txBox="1"/>
-          <p:nvPr/>
-        </p:nvSpPr>
-        <p:spPr>
-          <a:xfrm>
-            <a:off x="521495" y="1467568"/>
-            <a:ext cx="11149013" cy="2103139"/>
-          </a:xfrm>
-          <a:prstGeom prst="rect">
-            <a:avLst/>
-          </a:prstGeom>
-          <a:noFill/>
-        </p:spPr>
-        <p:txBody>
-          <a:bodyPr wrap="square" rtlCol="0">
-            <a:spAutoFit/>
-          </a:bodyPr>
-          <a:lstStyle/>
-          <a:p>
-            <a:r>
-              <a:rPr lang="it-IT" sz="2800" spc="-100" dirty="0" smtClean="0">
-                <a:ln w="3175">
-                  <a:noFill/>
-                </a:ln>
-                <a:latin typeface="+mj-lt"/>
-                <a:cs typeface="Arial" charset="0"/>
-              </a:rPr>
-              <a:t>L’esistenza di più basi di dati è trasparenze all’utilizzatore dello schema virtuale.</a:t>
-            </a:r>
-            <a:endParaRPr lang="it-IT" sz="2800" spc="-100" baseline="30000" dirty="0" smtClean="0">
-              <a:ln w="3175">
-                <a:noFill/>
-              </a:ln>
-              <a:latin typeface="+mj-lt"/>
-              <a:cs typeface="Arial" charset="0"/>
-            </a:endParaRPr>
-          </a:p>
-          <a:p>
-            <a:endParaRPr lang="en-US" sz="2800" spc="-100" baseline="30000" dirty="0" smtClean="0">
-              <a:ln w="3175">
-                <a:noFill/>
-              </a:ln>
-              <a:latin typeface="+mj-lt"/>
-              <a:cs typeface="Arial" charset="0"/>
-            </a:endParaRPr>
-          </a:p>
-          <a:p>
-            <a:endParaRPr lang="en-US" sz="2800" spc="-100" baseline="30000" dirty="0">
-              <a:ln w="3175">
-                <a:noFill/>
-              </a:ln>
-              <a:latin typeface="+mj-lt"/>
-              <a:cs typeface="Arial" charset="0"/>
-            </a:endParaRPr>
-          </a:p>
-          <a:p>
-            <a:endParaRPr lang="en-US" sz="2800" spc="-100" baseline="30000" dirty="0" smtClean="0">
-              <a:ln w="3175">
-                <a:noFill/>
-              </a:ln>
-              <a:latin typeface="+mj-lt"/>
-              <a:cs typeface="Arial" charset="0"/>
-            </a:endParaRPr>
-          </a:p>
-          <a:p>
-            <a:endParaRPr lang="en-US" sz="2800" spc="-100" baseline="30000" dirty="0">
-              <a:ln w="3175">
-                <a:noFill/>
-              </a:ln>
-              <a:latin typeface="+mj-lt"/>
-              <a:cs typeface="Arial" charset="0"/>
-            </a:endParaRPr>
-          </a:p>
-        </p:txBody>
-      </p:sp>
-      <p:pic>
-        <p:nvPicPr>
-          <p:cNvPr id="2" name="Immagine 1"/>
-          <p:cNvPicPr>
-            <a:picLocks noChangeAspect="1"/>
-          </p:cNvPicPr>
-          <p:nvPr/>
-        </p:nvPicPr>
-        <p:blipFill>
-          <a:blip r:embed="rId2"/>
-          <a:stretch>
-            <a:fillRect/>
-          </a:stretch>
-        </p:blipFill>
-        <p:spPr>
-          <a:xfrm>
-            <a:off x="3228785" y="2014351"/>
-            <a:ext cx="6183441" cy="4214504"/>
-          </a:xfrm>
-          <a:prstGeom prst="rect">
-            <a:avLst/>
-          </a:prstGeom>
-        </p:spPr>
-      </p:pic>
     </p:spTree>
     <p:extLst>
       <p:ext uri="{BB962C8B-B14F-4D97-AF65-F5344CB8AC3E}">
@@ -32714,7 +32809,7 @@
   <p:timing>
     <p:tnLst>
       <p:par>
-        <p:cTn xmlns:p14="http://schemas.microsoft.com/office/powerpoint/2010/main" id="1" dur="indefinite" restart="never" nodeType="tmRoot"/>
+        <p:cTn id="1" dur="indefinite" restart="never" nodeType="tmRoot"/>
       </p:par>
     </p:tnLst>
   </p:timing>
@@ -33249,7 +33344,7 @@
   <p:timing>
     <p:tnLst>
       <p:par>
-        <p:cTn xmlns:p14="http://schemas.microsoft.com/office/powerpoint/2010/main" id="1" dur="indefinite" restart="never" nodeType="tmRoot"/>
+        <p:cTn id="1" dur="indefinite" restart="never" nodeType="tmRoot"/>
       </p:par>
     </p:tnLst>
   </p:timing>
@@ -33620,28 +33715,123 @@
       </p:sp>
       <p:pic>
         <p:nvPicPr>
-          <p:cNvPr id="2" name="Immagine 1"/>
+          <p:cNvPr id="3" name="Immagine 2"/>
           <p:cNvPicPr>
             <a:picLocks noChangeAspect="1"/>
           </p:cNvPicPr>
           <p:nvPr/>
         </p:nvPicPr>
-        <p:blipFill>
-          <a:blip r:embed="rId2"/>
-          <a:stretch>
-            <a:fillRect/>
-          </a:stretch>
+        <p:blipFill rotWithShape="1">
+          <a:blip r:embed="rId2">
+            <a:extLst>
+              <a:ext uri="{28A0092B-C50C-407E-A947-70E740481C1C}">
+                <a14:useLocalDpi xmlns:a14="http://schemas.microsoft.com/office/drawing/2010/main" val="0"/>
+              </a:ext>
+            </a:extLst>
+          </a:blip>
+          <a:srcRect t="3022" b="2044"/>
+          <a:stretch/>
         </p:blipFill>
         <p:spPr>
           <a:xfrm>
-            <a:off x="3062477" y="2310520"/>
-            <a:ext cx="6286499" cy="4123999"/>
+            <a:off x="2938653" y="2308860"/>
+            <a:ext cx="6508215" cy="4157472"/>
           </a:xfrm>
           <a:prstGeom prst="rect">
             <a:avLst/>
           </a:prstGeom>
         </p:spPr>
       </p:pic>
+      <p:sp>
+        <p:nvSpPr>
+          <p:cNvPr id="8" name="CasellaDiTesto 7"/>
+          <p:cNvSpPr txBox="1"/>
+          <p:nvPr/>
+        </p:nvSpPr>
+        <p:spPr>
+          <a:xfrm>
+            <a:off x="3438144" y="2836331"/>
+            <a:ext cx="719328" cy="369332"/>
+          </a:xfrm>
+          <a:prstGeom prst="rect">
+            <a:avLst/>
+          </a:prstGeom>
+          <a:noFill/>
+        </p:spPr>
+        <p:txBody>
+          <a:bodyPr wrap="square" rtlCol="0">
+            <a:spAutoFit/>
+          </a:bodyPr>
+          <a:lstStyle/>
+          <a:p>
+            <a:r>
+              <a:rPr lang="it-IT" b="1" dirty="0" smtClean="0"/>
+              <a:t>BDM</a:t>
+            </a:r>
+            <a:endParaRPr lang="it-IT" b="1" dirty="0"/>
+          </a:p>
+        </p:txBody>
+      </p:sp>
+      <p:sp>
+        <p:nvSpPr>
+          <p:cNvPr id="9" name="CasellaDiTesto 8"/>
+          <p:cNvSpPr txBox="1"/>
+          <p:nvPr/>
+        </p:nvSpPr>
+        <p:spPr>
+          <a:xfrm>
+            <a:off x="3499104" y="4334470"/>
+            <a:ext cx="719328" cy="369332"/>
+          </a:xfrm>
+          <a:prstGeom prst="rect">
+            <a:avLst/>
+          </a:prstGeom>
+          <a:noFill/>
+        </p:spPr>
+        <p:txBody>
+          <a:bodyPr wrap="square" rtlCol="0">
+            <a:spAutoFit/>
+          </a:bodyPr>
+          <a:lstStyle/>
+          <a:p>
+            <a:r>
+              <a:rPr lang="it-IT" b="1" dirty="0" smtClean="0"/>
+              <a:t>BSE</a:t>
+            </a:r>
+            <a:endParaRPr lang="it-IT" b="1" dirty="0"/>
+          </a:p>
+        </p:txBody>
+      </p:sp>
+      <p:sp>
+        <p:nvSpPr>
+          <p:cNvPr id="10" name="CasellaDiTesto 9"/>
+          <p:cNvSpPr txBox="1"/>
+          <p:nvPr/>
+        </p:nvSpPr>
+        <p:spPr>
+          <a:xfrm>
+            <a:off x="3499104" y="5768293"/>
+            <a:ext cx="719328" cy="369332"/>
+          </a:xfrm>
+          <a:prstGeom prst="rect">
+            <a:avLst/>
+          </a:prstGeom>
+          <a:noFill/>
+        </p:spPr>
+        <p:txBody>
+          <a:bodyPr wrap="square" rtlCol="0">
+            <a:spAutoFit/>
+          </a:bodyPr>
+          <a:lstStyle/>
+          <a:p>
+            <a:r>
+              <a:rPr lang="it-IT" b="1" dirty="0" smtClean="0"/>
+              <a:t>BRI</a:t>
+            </a:r>
+            <a:endParaRPr lang="it-IT" b="1" dirty="0"/>
+          </a:p>
+        </p:txBody>
+      </p:sp>
     </p:spTree>
     <p:extLst>
       <p:ext uri="{BB962C8B-B14F-4D97-AF65-F5344CB8AC3E}">
@@ -33663,7 +33853,7 @@
   <p:timing>
     <p:tnLst>
       <p:par>
-        <p:cTn xmlns:p14="http://schemas.microsoft.com/office/powerpoint/2010/main" id="1" dur="indefinite" restart="never" nodeType="tmRoot"/>
+        <p:cTn id="1" dur="indefinite" restart="never" nodeType="tmRoot"/>
       </p:par>
     </p:tnLst>
   </p:timing>
@@ -34245,7 +34435,7 @@
   <p:timing>
     <p:tnLst>
       <p:par>
-        <p:cTn xmlns:p14="http://schemas.microsoft.com/office/powerpoint/2010/main" id="1" dur="indefinite" restart="never" nodeType="tmRoot"/>
+        <p:cTn id="1" dur="indefinite" restart="never" nodeType="tmRoot"/>
       </p:par>
     </p:tnLst>
   </p:timing>
@@ -34683,7 +34873,7 @@
   <p:timing>
     <p:tnLst>
       <p:par>
-        <p:cTn xmlns:p14="http://schemas.microsoft.com/office/powerpoint/2010/main" id="1" dur="indefinite" restart="never" nodeType="tmRoot"/>
+        <p:cTn id="1" dur="indefinite" restart="never" nodeType="tmRoot"/>
       </p:par>
     </p:tnLst>
   </p:timing>
@@ -35332,7 +35522,7 @@
   <p:timing>
     <p:tnLst>
       <p:par>
-        <p:cTn xmlns:p14="http://schemas.microsoft.com/office/powerpoint/2010/main" id="1" dur="indefinite" restart="never" nodeType="tmRoot"/>
+        <p:cTn id="1" dur="indefinite" restart="never" nodeType="tmRoot"/>
       </p:par>
     </p:tnLst>
   </p:timing>
@@ -35733,7 +35923,7 @@
   <p:timing>
     <p:tnLst>
       <p:par>
-        <p:cTn xmlns:p14="http://schemas.microsoft.com/office/powerpoint/2010/main" id="1" dur="indefinite" restart="never" nodeType="tmRoot"/>
+        <p:cTn id="1" dur="indefinite" restart="never" nodeType="tmRoot"/>
       </p:par>
     </p:tnLst>
   </p:timing>
@@ -36213,7 +36403,7 @@
   <p:timing>
     <p:tnLst>
       <p:par>
-        <p:cTn xmlns:p14="http://schemas.microsoft.com/office/powerpoint/2010/main" id="1" dur="indefinite" restart="never" nodeType="tmRoot"/>
+        <p:cTn id="1" dur="indefinite" restart="never" nodeType="tmRoot"/>
       </p:par>
     </p:tnLst>
   </p:timing>
@@ -36605,7 +36795,7 @@
   <p:timing>
     <p:tnLst>
       <p:par>
-        <p:cTn xmlns:p14="http://schemas.microsoft.com/office/powerpoint/2010/main" id="1" dur="indefinite" restart="never" nodeType="tmRoot"/>
+        <p:cTn id="1" dur="indefinite" restart="never" nodeType="tmRoot"/>
       </p:par>
     </p:tnLst>
   </p:timing>
@@ -37152,7 +37342,7 @@
   <p:timing>
     <p:tnLst>
       <p:par>
-        <p:cTn xmlns:p14="http://schemas.microsoft.com/office/powerpoint/2010/main" id="1" dur="indefinite" restart="never" nodeType="tmRoot"/>
+        <p:cTn id="1" dur="indefinite" restart="never" nodeType="tmRoot"/>
       </p:par>
     </p:tnLst>
   </p:timing>
@@ -37676,7 +37866,7 @@
   <p:timing>
     <p:tnLst>
       <p:par>
-        <p:cTn xmlns:p14="http://schemas.microsoft.com/office/powerpoint/2010/main" id="1" dur="indefinite" restart="never" nodeType="tmRoot"/>
+        <p:cTn id="1" dur="indefinite" restart="never" nodeType="tmRoot"/>
       </p:par>
     </p:tnLst>
   </p:timing>
@@ -38068,7 +38258,7 @@
   <p:timing>
     <p:tnLst>
       <p:par>
-        <p:cTn xmlns:p14="http://schemas.microsoft.com/office/powerpoint/2010/main" id="1" dur="indefinite" restart="never" nodeType="tmRoot"/>
+        <p:cTn id="1" dur="indefinite" restart="never" nodeType="tmRoot"/>
       </p:par>
     </p:tnLst>
   </p:timing>
@@ -38449,7 +38639,7 @@
   <p:timing>
     <p:tnLst>
       <p:par>
-        <p:cTn xmlns:p14="http://schemas.microsoft.com/office/powerpoint/2010/main" id="1" dur="indefinite" restart="never" nodeType="tmRoot"/>
+        <p:cTn id="1" dur="indefinite" restart="never" nodeType="tmRoot"/>
       </p:par>
     </p:tnLst>
   </p:timing>
@@ -38749,7 +38939,7 @@
   <p:timing>
     <p:tnLst>
       <p:par>
-        <p:cTn xmlns:p14="http://schemas.microsoft.com/office/powerpoint/2010/main" id="1" dur="indefinite" restart="never" nodeType="tmRoot"/>
+        <p:cTn id="1" dur="indefinite" restart="never" nodeType="tmRoot"/>
       </p:par>
     </p:tnLst>
   </p:timing>
@@ -39187,7 +39377,7 @@
   <p:timing>
     <p:tnLst>
       <p:par>
-        <p:cTn xmlns:p14="http://schemas.microsoft.com/office/powerpoint/2010/main" id="1" dur="indefinite" restart="never" nodeType="tmRoot"/>
+        <p:cTn id="1" dur="indefinite" restart="never" nodeType="tmRoot"/>
       </p:par>
     </p:tnLst>
   </p:timing>
@@ -39650,7 +39840,7 @@
   <p:timing>
     <p:tnLst>
       <p:par>
-        <p:cTn xmlns:p14="http://schemas.microsoft.com/office/powerpoint/2010/main" id="1" dur="indefinite" restart="never" nodeType="tmRoot"/>
+        <p:cTn id="1" dur="indefinite" restart="never" nodeType="tmRoot"/>
       </p:par>
     </p:tnLst>
   </p:timing>
@@ -40328,7 +40518,7 @@
   <p:timing>
     <p:tnLst>
       <p:par>
-        <p:cTn xmlns:p14="http://schemas.microsoft.com/office/powerpoint/2010/main" id="1" dur="indefinite" restart="never" nodeType="tmRoot"/>
+        <p:cTn id="1" dur="indefinite" restart="never" nodeType="tmRoot"/>
       </p:par>
     </p:tnLst>
   </p:timing>
@@ -40626,15 +40816,7 @@
                   <a:srgbClr val="000000"/>
                 </a:solidFill>
               </a:rPr>
-              <a:t>AND BRI.CorsoAcqua.denominazione</a:t>
-            </a:r>
-            <a:r>
-              <a:rPr lang="it-IT" sz="2400" dirty="0">
-                <a:solidFill>
-                  <a:srgbClr val="000000"/>
-                </a:solidFill>
-              </a:rPr>
-              <a:t> = @</a:t>
+              <a:t>AND BRI.CorsoAcqua.denominazione = @</a:t>
             </a:r>
             <a:r>
               <a:rPr lang="it-IT" sz="2400" dirty="0" err="1" smtClean="0">
@@ -40809,7 +40991,7 @@
   <p:timing>
     <p:tnLst>
       <p:par>
-        <p:cTn xmlns:p14="http://schemas.microsoft.com/office/powerpoint/2010/main" id="1" dur="indefinite" restart="never" nodeType="tmRoot"/>
+        <p:cTn id="1" dur="indefinite" restart="never" nodeType="tmRoot"/>
       </p:par>
     </p:tnLst>
   </p:timing>
@@ -41174,7 +41356,7 @@
   <p:timing>
     <p:tnLst>
       <p:par>
-        <p:cTn xmlns:p14="http://schemas.microsoft.com/office/powerpoint/2010/main" id="1" dur="indefinite" restart="never" nodeType="tmRoot"/>
+        <p:cTn id="1" dur="indefinite" restart="never" nodeType="tmRoot"/>
       </p:par>
     </p:tnLst>
   </p:timing>
@@ -41567,7 +41749,7 @@
   <p:timing>
     <p:tnLst>
       <p:par>
-        <p:cTn xmlns:p14="http://schemas.microsoft.com/office/powerpoint/2010/main" id="1" dur="indefinite" restart="never" nodeType="tmRoot"/>
+        <p:cTn id="1" dur="indefinite" restart="never" nodeType="tmRoot"/>
       </p:par>
     </p:tnLst>
   </p:timing>
@@ -41938,7 +42120,7 @@
   <p:timing>
     <p:tnLst>
       <p:par>
-        <p:cTn xmlns:p14="http://schemas.microsoft.com/office/powerpoint/2010/main" id="1" dur="indefinite" restart="never" nodeType="tmRoot"/>
+        <p:cTn id="1" dur="indefinite" restart="never" nodeType="tmRoot"/>
       </p:par>
     </p:tnLst>
   </p:timing>
@@ -42408,7 +42590,7 @@
   <p:timing>
     <p:tnLst>
       <p:par>
-        <p:cTn xmlns:p14="http://schemas.microsoft.com/office/powerpoint/2010/main" id="1" dur="indefinite" restart="never" nodeType="tmRoot"/>
+        <p:cTn id="1" dur="indefinite" restart="never" nodeType="tmRoot"/>
       </p:par>
     </p:tnLst>
   </p:timing>
@@ -42971,7 +43153,7 @@
   <p:timing>
     <p:tnLst>
       <p:par>
-        <p:cTn xmlns:p14="http://schemas.microsoft.com/office/powerpoint/2010/main" id="1" dur="indefinite" restart="never" nodeType="tmRoot"/>
+        <p:cTn id="1" dur="indefinite" restart="never" nodeType="tmRoot"/>
       </p:par>
     </p:tnLst>
   </p:timing>
@@ -43511,7 +43693,7 @@
   <p:timing>
     <p:tnLst>
       <p:par>
-        <p:cTn xmlns:p14="http://schemas.microsoft.com/office/powerpoint/2010/main" id="1" dur="indefinite" restart="never" nodeType="tmRoot"/>
+        <p:cTn id="1" dur="indefinite" restart="never" nodeType="tmRoot"/>
       </p:par>
     </p:tnLst>
   </p:timing>
@@ -44091,7 +44273,7 @@
   <p:timing>
     <p:tnLst>
       <p:par>
-        <p:cTn xmlns:p14="http://schemas.microsoft.com/office/powerpoint/2010/main" id="1" dur="indefinite" restart="never" nodeType="tmRoot"/>
+        <p:cTn id="1" dur="indefinite" restart="never" nodeType="tmRoot"/>
       </p:par>
     </p:tnLst>
   </p:timing>
@@ -44634,7 +44816,7 @@
   <p:timing>
     <p:tnLst>
       <p:par>
-        <p:cTn xmlns:p14="http://schemas.microsoft.com/office/powerpoint/2010/main" id="1" dur="indefinite" restart="never" nodeType="tmRoot"/>
+        <p:cTn id="1" dur="indefinite" restart="never" nodeType="tmRoot"/>
       </p:par>
     </p:tnLst>
   </p:timing>
@@ -44977,7 +45159,7 @@
   <p:timing>
     <p:tnLst>
       <p:par>
-        <p:cTn xmlns:p14="http://schemas.microsoft.com/office/powerpoint/2010/main" id="1" dur="indefinite" restart="never" nodeType="tmRoot"/>
+        <p:cTn id="1" dur="indefinite" restart="never" nodeType="tmRoot"/>
       </p:par>
     </p:tnLst>
   </p:timing>
@@ -45064,7 +45246,7 @@
   <p:timing>
     <p:tnLst>
       <p:par>
-        <p:cTn xmlns:p14="http://schemas.microsoft.com/office/powerpoint/2010/main" id="1" dur="indefinite" restart="never" nodeType="tmRoot"/>
+        <p:cTn id="1" dur="indefinite" restart="never" nodeType="tmRoot"/>
       </p:par>
     </p:tnLst>
   </p:timing>
@@ -45567,7 +45749,7 @@
   <p:timing>
     <p:tnLst>
       <p:par>
-        <p:cTn xmlns:p14="http://schemas.microsoft.com/office/powerpoint/2010/main" id="1" dur="indefinite" restart="never" nodeType="tmRoot"/>
+        <p:cTn id="1" dur="indefinite" restart="never" nodeType="tmRoot"/>
       </p:par>
     </p:tnLst>
   </p:timing>
@@ -45968,7 +46150,7 @@
   <p:timing>
     <p:tnLst>
       <p:par>
-        <p:cTn xmlns:p14="http://schemas.microsoft.com/office/powerpoint/2010/main" id="1" dur="indefinite" restart="never" nodeType="tmRoot"/>
+        <p:cTn id="1" dur="indefinite" restart="never" nodeType="tmRoot"/>
       </p:par>
     </p:tnLst>
   </p:timing>
@@ -46505,7 +46687,7 @@
   <p:timing>
     <p:tnLst>
       <p:par>
-        <p:cTn xmlns:p14="http://schemas.microsoft.com/office/powerpoint/2010/main" id="1" dur="indefinite" restart="never" nodeType="tmRoot"/>
+        <p:cTn id="1" dur="indefinite" restart="never" nodeType="tmRoot"/>
       </p:par>
     </p:tnLst>
   </p:timing>
@@ -46938,7 +47120,7 @@
   <p:timing>
     <p:tnLst>
       <p:par>
-        <p:cTn xmlns:p14="http://schemas.microsoft.com/office/powerpoint/2010/main" id="1" dur="indefinite" restart="never" nodeType="tmRoot"/>
+        <p:cTn id="1" dur="indefinite" restart="never" nodeType="tmRoot"/>
       </p:par>
     </p:tnLst>
   </p:timing>
@@ -47440,7 +47622,7 @@
   <p:timing>
     <p:tnLst>
       <p:par>
-        <p:cTn xmlns:p14="http://schemas.microsoft.com/office/powerpoint/2010/main" id="1" dur="indefinite" restart="never" nodeType="tmRoot"/>
+        <p:cTn id="1" dur="indefinite" restart="never" nodeType="tmRoot"/>
       </p:par>
     </p:tnLst>
   </p:timing>
@@ -47878,7 +48060,7 @@
   <p:timing>
     <p:tnLst>
       <p:par>
-        <p:cTn xmlns:p14="http://schemas.microsoft.com/office/powerpoint/2010/main" id="1" dur="indefinite" restart="never" nodeType="tmRoot"/>
+        <p:cTn id="1" dur="indefinite" restart="never" nodeType="tmRoot"/>
       </p:par>
     </p:tnLst>
   </p:timing>
@@ -47965,7 +48147,7 @@
   <p:timing>
     <p:tnLst>
       <p:par>
-        <p:cTn xmlns:p14="http://schemas.microsoft.com/office/powerpoint/2010/main" id="1" dur="indefinite" restart="never" nodeType="tmRoot"/>
+        <p:cTn id="1" dur="indefinite" restart="never" nodeType="tmRoot"/>
       </p:par>
     </p:tnLst>
   </p:timing>
@@ -48227,7 +48409,7 @@
   <a:extraClrSchemeLst/>
   <a:extLst>
     <a:ext uri="{05A4C25C-085E-4340-85A3-A5531E510DB2}">
-      <thm15:themeFamily xmlns:thm15="http://schemas.microsoft.com/office/thememl/2012/main" xmlns="" name="Office Theme" id="{62F939B6-93AF-4DB8-9C6B-D6C7DFDC589F}" vid="{4A3C46E8-61CC-4603-A589-7422A47A8E4A}"/>
+      <thm15:themeFamily xmlns:thm15="http://schemas.microsoft.com/office/thememl/2012/main" name="Office Theme" id="{62F939B6-93AF-4DB8-9C6B-D6C7DFDC589F}" vid="{4A3C46E8-61CC-4603-A589-7422A47A8E4A}"/>
     </a:ext>
   </a:extLst>
 </a:theme>
@@ -48488,7 +48670,7 @@
   <a:extraClrSchemeLst/>
   <a:extLst>
     <a:ext uri="{05A4C25C-085E-4340-85A3-A5531E510DB2}">
-      <thm15:themeFamily xmlns:thm15="http://schemas.microsoft.com/office/thememl/2012/main" xmlns="" name="Office Theme" id="{62F939B6-93AF-4DB8-9C6B-D6C7DFDC589F}" vid="{4A3C46E8-61CC-4603-A589-7422A47A8E4A}"/>
+      <thm15:themeFamily xmlns:thm15="http://schemas.microsoft.com/office/thememl/2012/main" name="Office Theme" id="{62F939B6-93AF-4DB8-9C6B-D6C7DFDC589F}" vid="{4A3C46E8-61CC-4603-A589-7422A47A8E4A}"/>
     </a:ext>
   </a:extLst>
 </a:theme>

</xml_diff>

<commit_message>
Presentazione VDI DWH imgs v2
</commit_message>
<xml_diff>
--- a/Febbraio 2015.pptx
+++ b/Febbraio 2015.pptx
@@ -336,11 +336,11 @@
           <c:showPercent val="0"/>
           <c:showBubbleSize val="0"/>
         </c:dLbls>
-        <c:axId val="149734944"/>
-        <c:axId val="149735504"/>
+        <c:axId val="114866416"/>
+        <c:axId val="114866976"/>
       </c:radarChart>
       <c:catAx>
-        <c:axId val="149734944"/>
+        <c:axId val="114866416"/>
         <c:scaling>
           <c:orientation val="minMax"/>
         </c:scaling>
@@ -383,7 +383,7 @@
             <a:endParaRPr lang="it-IT"/>
           </a:p>
         </c:txPr>
-        <c:crossAx val="149735504"/>
+        <c:crossAx val="114866976"/>
         <c:crosses val="autoZero"/>
         <c:auto val="1"/>
         <c:lblAlgn val="ctr"/>
@@ -391,7 +391,7 @@
         <c:noMultiLvlLbl val="0"/>
       </c:catAx>
       <c:valAx>
-        <c:axId val="149735504"/>
+        <c:axId val="114866976"/>
         <c:scaling>
           <c:orientation val="minMax"/>
         </c:scaling>
@@ -441,7 +441,7 @@
             <a:endParaRPr lang="it-IT"/>
           </a:p>
         </c:txPr>
-        <c:crossAx val="149734944"/>
+        <c:crossAx val="114866416"/>
         <c:crosses val="autoZero"/>
         <c:crossBetween val="between"/>
         <c:majorUnit val="10"/>
@@ -597,11 +597,11 @@
           <c:showPercent val="0"/>
           <c:showBubbleSize val="0"/>
         </c:dLbls>
-        <c:axId val="149737744"/>
-        <c:axId val="149738304"/>
+        <c:axId val="114869216"/>
+        <c:axId val="114869776"/>
       </c:radarChart>
       <c:catAx>
-        <c:axId val="149737744"/>
+        <c:axId val="114869216"/>
         <c:scaling>
           <c:orientation val="minMax"/>
         </c:scaling>
@@ -644,7 +644,7 @@
             <a:endParaRPr lang="it-IT"/>
           </a:p>
         </c:txPr>
-        <c:crossAx val="149738304"/>
+        <c:crossAx val="114869776"/>
         <c:crosses val="autoZero"/>
         <c:auto val="1"/>
         <c:lblAlgn val="ctr"/>
@@ -652,7 +652,7 @@
         <c:noMultiLvlLbl val="0"/>
       </c:catAx>
       <c:valAx>
-        <c:axId val="149738304"/>
+        <c:axId val="114869776"/>
         <c:scaling>
           <c:orientation val="minMax"/>
         </c:scaling>
@@ -702,7 +702,7 @@
             <a:endParaRPr lang="it-IT"/>
           </a:p>
         </c:txPr>
-        <c:crossAx val="149737744"/>
+        <c:crossAx val="114869216"/>
         <c:crosses val="autoZero"/>
         <c:crossBetween val="between"/>
         <c:majorUnit val="10"/>
@@ -848,11 +848,11 @@
           <c:showPercent val="0"/>
           <c:showBubbleSize val="0"/>
         </c:dLbls>
-        <c:axId val="149740544"/>
-        <c:axId val="149741104"/>
+        <c:axId val="114872016"/>
+        <c:axId val="114872576"/>
       </c:radarChart>
       <c:catAx>
-        <c:axId val="149740544"/>
+        <c:axId val="114872016"/>
         <c:scaling>
           <c:orientation val="minMax"/>
         </c:scaling>
@@ -895,7 +895,7 @@
             <a:endParaRPr lang="it-IT"/>
           </a:p>
         </c:txPr>
-        <c:crossAx val="149741104"/>
+        <c:crossAx val="114872576"/>
         <c:crosses val="autoZero"/>
         <c:auto val="1"/>
         <c:lblAlgn val="ctr"/>
@@ -903,7 +903,7 @@
         <c:noMultiLvlLbl val="0"/>
       </c:catAx>
       <c:valAx>
-        <c:axId val="149741104"/>
+        <c:axId val="114872576"/>
         <c:scaling>
           <c:orientation val="minMax"/>
           <c:max val="100"/>
@@ -954,7 +954,7 @@
             <a:endParaRPr lang="it-IT"/>
           </a:p>
         </c:txPr>
-        <c:crossAx val="149740544"/>
+        <c:crossAx val="114872016"/>
         <c:crosses val="autoZero"/>
         <c:crossBetween val="between"/>
         <c:majorUnit val="10"/>
@@ -1280,11 +1280,11 @@
           <c:showPercent val="0"/>
           <c:showBubbleSize val="0"/>
         </c:dLbls>
-        <c:axId val="149744464"/>
-        <c:axId val="149745024"/>
+        <c:axId val="144210064"/>
+        <c:axId val="144210624"/>
       </c:radarChart>
       <c:catAx>
-        <c:axId val="149744464"/>
+        <c:axId val="144210064"/>
         <c:scaling>
           <c:orientation val="minMax"/>
         </c:scaling>
@@ -1327,7 +1327,7 @@
             <a:endParaRPr lang="it-IT"/>
           </a:p>
         </c:txPr>
-        <c:crossAx val="149745024"/>
+        <c:crossAx val="144210624"/>
         <c:crosses val="autoZero"/>
         <c:auto val="1"/>
         <c:lblAlgn val="ctr"/>
@@ -1335,7 +1335,7 @@
         <c:noMultiLvlLbl val="0"/>
       </c:catAx>
       <c:valAx>
-        <c:axId val="149745024"/>
+        <c:axId val="144210624"/>
         <c:scaling>
           <c:orientation val="minMax"/>
         </c:scaling>
@@ -1385,7 +1385,7 @@
             <a:endParaRPr lang="it-IT"/>
           </a:p>
         </c:txPr>
-        <c:crossAx val="149744464"/>
+        <c:crossAx val="144210064"/>
         <c:crosses val="autoZero"/>
         <c:crossBetween val="between"/>
         <c:majorUnit val="10"/>
@@ -13997,7 +13997,7 @@
         </p:nvSpPr>
         <p:spPr>
           <a:xfrm>
-            <a:off x="1100140" y="1367913"/>
+            <a:off x="1051372" y="1550793"/>
             <a:ext cx="10006013" cy="3627325"/>
           </a:xfrm>
         </p:spPr>
@@ -19845,13 +19845,13 @@
           <p:nvPr>
             <p:extLst>
               <p:ext uri="{D42A27DB-BD31-4B8C-83A1-F6EECF244321}">
-                <p14:modId xmlns:p14="http://schemas.microsoft.com/office/powerpoint/2010/main" val="3211837326"/>
+                <p14:modId xmlns:p14="http://schemas.microsoft.com/office/powerpoint/2010/main" val="2965081165"/>
               </p:ext>
             </p:extLst>
           </p:nvPr>
         </p:nvGraphicFramePr>
         <p:xfrm>
-          <a:off x="1624964" y="2133600"/>
+          <a:off x="1588388" y="2048256"/>
           <a:ext cx="9286876" cy="4381500"/>
         </p:xfrm>
         <a:graphic>
@@ -24063,7 +24063,7 @@
         </p:nvSpPr>
         <p:spPr>
           <a:xfrm>
-            <a:off x="1100140" y="1367913"/>
+            <a:off x="1002604" y="1538601"/>
             <a:ext cx="10006013" cy="3627325"/>
           </a:xfrm>
         </p:spPr>
@@ -48104,7 +48104,7 @@
         </p:nvSpPr>
         <p:spPr>
           <a:xfrm>
-            <a:off x="4376931" y="2769993"/>
+            <a:off x="4498851" y="2769993"/>
             <a:ext cx="2937511" cy="911995"/>
           </a:xfrm>
         </p:spPr>

</xml_diff>